<commit_message>
Moved code inspection task into it's own solution again. Finished presentation parts for navigate to and code inspections.
</commit_message>
<xml_diff>
--- a/Presentations/2 - Exercises - ReSharper Course.pptx
+++ b/Presentations/2 - Exercises - ReSharper Course.pptx
@@ -5,27 +5,28 @@
     <p:sldMasterId id="2147483648" r:id="rId1"/>
   </p:sldMasterIdLst>
   <p:notesMasterIdLst>
-    <p:notesMasterId r:id="rId20"/>
+    <p:notesMasterId r:id="rId21"/>
   </p:notesMasterIdLst>
   <p:sldIdLst>
-    <p:sldId id="292" r:id="rId2"/>
-    <p:sldId id="272" r:id="rId3"/>
+    <p:sldId id="272" r:id="rId2"/>
+    <p:sldId id="292" r:id="rId3"/>
     <p:sldId id="280" r:id="rId4"/>
     <p:sldId id="290" r:id="rId5"/>
     <p:sldId id="291" r:id="rId6"/>
-    <p:sldId id="294" r:id="rId7"/>
-    <p:sldId id="293" r:id="rId8"/>
-    <p:sldId id="281" r:id="rId9"/>
-    <p:sldId id="276" r:id="rId10"/>
-    <p:sldId id="284" r:id="rId11"/>
-    <p:sldId id="285" r:id="rId12"/>
-    <p:sldId id="288" r:id="rId13"/>
-    <p:sldId id="286" r:id="rId14"/>
-    <p:sldId id="275" r:id="rId15"/>
-    <p:sldId id="278" r:id="rId16"/>
-    <p:sldId id="287" r:id="rId17"/>
-    <p:sldId id="289" r:id="rId18"/>
-    <p:sldId id="279" r:id="rId19"/>
+    <p:sldId id="293" r:id="rId7"/>
+    <p:sldId id="281" r:id="rId8"/>
+    <p:sldId id="276" r:id="rId9"/>
+    <p:sldId id="295" r:id="rId10"/>
+    <p:sldId id="294" r:id="rId11"/>
+    <p:sldId id="284" r:id="rId12"/>
+    <p:sldId id="285" r:id="rId13"/>
+    <p:sldId id="288" r:id="rId14"/>
+    <p:sldId id="286" r:id="rId15"/>
+    <p:sldId id="275" r:id="rId16"/>
+    <p:sldId id="278" r:id="rId17"/>
+    <p:sldId id="287" r:id="rId18"/>
+    <p:sldId id="289" r:id="rId19"/>
+    <p:sldId id="279" r:id="rId20"/>
   </p:sldIdLst>
   <p:sldSz cx="9144000" cy="6858000" type="screen4x3"/>
   <p:notesSz cx="6858000" cy="9144000"/>
@@ -379,7 +380,7 @@
     </p:spTree>
     <p:extLst>
       <p:ext uri="{BB962C8B-B14F-4D97-AF65-F5344CB8AC3E}">
-        <p14:creationId xmlns="" xmlns:p14="http://schemas.microsoft.com/office/powerpoint/2010/main" val="1746408167"/>
+        <p14:creationId xmlns:p14="http://schemas.microsoft.com/office/powerpoint/2010/main" xmlns="" val="1746408167"/>
       </p:ext>
     </p:extLst>
   </p:cSld>
@@ -3448,15 +3449,7 @@
           <a:p>
             <a:r>
               <a:rPr lang="da-DK" dirty="0" smtClean="0"/>
-              <a:t>Go </a:t>
-            </a:r>
-            <a:r>
-              <a:rPr lang="da-DK" dirty="0" smtClean="0"/>
-              <a:t>to </a:t>
-            </a:r>
-            <a:r>
-              <a:rPr lang="da-DK" dirty="0" smtClean="0"/>
-              <a:t>...</a:t>
+              <a:t>Navigation</a:t>
             </a:r>
             <a:endParaRPr lang="da-DK" dirty="0"/>
           </a:p>
@@ -3482,58 +3475,66 @@
           <a:p>
             <a:r>
               <a:rPr lang="da-DK" dirty="0" smtClean="0"/>
-              <a:t>Go to</a:t>
+              <a:t>We remember strange things</a:t>
+            </a:r>
+          </a:p>
+          <a:p>
+            <a:endParaRPr lang="da-DK" dirty="0"/>
+          </a:p>
+          <a:p>
+            <a:r>
+              <a:rPr lang="da-DK" dirty="0" smtClean="0"/>
+              <a:t>Navigational axis</a:t>
             </a:r>
           </a:p>
           <a:p>
             <a:pPr lvl="1"/>
             <a:r>
               <a:rPr lang="da-DK" dirty="0" smtClean="0"/>
-              <a:t>Type</a:t>
+              <a:t>Type name</a:t>
             </a:r>
           </a:p>
           <a:p>
             <a:pPr lvl="1"/>
             <a:r>
               <a:rPr lang="da-DK" dirty="0" smtClean="0"/>
-              <a:t>File</a:t>
+              <a:t>Method</a:t>
             </a:r>
           </a:p>
           <a:p>
             <a:pPr lvl="1"/>
             <a:r>
               <a:rPr lang="da-DK" dirty="0" smtClean="0"/>
-              <a:t>Symbol</a:t>
-            </a:r>
-          </a:p>
-          <a:p>
-            <a:pPr lvl="1"/>
-            <a:r>
-              <a:rPr lang="da-DK" dirty="0" smtClean="0"/>
-              <a:t>Member</a:t>
+              <a:t>Proximity</a:t>
             </a:r>
             <a:endParaRPr lang="da-DK" dirty="0"/>
           </a:p>
         </p:txBody>
       </p:sp>
     </p:spTree>
+    <p:extLst>
+      <p:ext uri="{BB962C8B-B14F-4D97-AF65-F5344CB8AC3E}">
+        <p14:creationId xmlns:p14="http://schemas.microsoft.com/office/powerpoint/2010/main" xmlns="" val="1917661024"/>
+      </p:ext>
+    </p:extLst>
   </p:cSld>
   <p:clrMapOvr>
     <a:masterClrMapping/>
   </p:clrMapOvr>
-  <p:timing>
-    <p:tnLst>
-      <p:par>
-        <p:cTn id="1" dur="indefinite" restart="never" nodeType="tmRoot"/>
-      </p:par>
-    </p:tnLst>
-  </p:timing>
 </p:sld>
 </file>
 
 <file path=ppt/slides/slide10.xml><?xml version="1.0" encoding="utf-8"?>
 <p:sld xmlns:a="http://schemas.openxmlformats.org/drawingml/2006/main" xmlns:r="http://schemas.openxmlformats.org/officeDocument/2006/relationships" xmlns:p="http://schemas.openxmlformats.org/presentationml/2006/main">
   <p:cSld>
+    <p:bg>
+      <p:bgPr>
+        <a:solidFill>
+          <a:srgbClr val="00B050"/>
+        </a:solidFill>
+        <a:effectLst/>
+      </p:bgPr>
+    </p:bg>
     <p:spTree>
       <p:nvGrpSpPr>
         <p:cNvPr id="1" name=""/>
@@ -3548,48 +3549,6 @@
           <a:chExt cx="0" cy="0"/>
         </a:xfrm>
       </p:grpSpPr>
-      <p:sp>
-        <p:nvSpPr>
-          <p:cNvPr id="2" name="Title 1"/>
-          <p:cNvSpPr>
-            <a:spLocks noGrp="1"/>
-          </p:cNvSpPr>
-          <p:nvPr>
-            <p:ph type="title"/>
-          </p:nvPr>
-        </p:nvSpPr>
-        <p:spPr/>
-        <p:txBody>
-          <a:bodyPr/>
-          <a:lstStyle/>
-          <a:p>
-            <a:r>
-              <a:rPr lang="da-DK" dirty="0" smtClean="0"/>
-              <a:t>Reduce Mechanical Steps</a:t>
-            </a:r>
-            <a:endParaRPr lang="da-DK" dirty="0"/>
-          </a:p>
-        </p:txBody>
-      </p:sp>
-      <p:sp>
-        <p:nvSpPr>
-          <p:cNvPr id="3" name="Content Placeholder 2"/>
-          <p:cNvSpPr>
-            <a:spLocks noGrp="1"/>
-          </p:cNvSpPr>
-          <p:nvPr>
-            <p:ph idx="1"/>
-          </p:nvPr>
-        </p:nvSpPr>
-        <p:spPr/>
-        <p:txBody>
-          <a:bodyPr/>
-          <a:lstStyle/>
-          <a:p>
-            <a:endParaRPr lang="da-DK" dirty="0"/>
-          </a:p>
-        </p:txBody>
-      </p:sp>
     </p:spTree>
   </p:cSld>
   <p:clrMapOvr>
@@ -3632,7 +3591,7 @@
           <a:p>
             <a:r>
               <a:rPr lang="da-DK" dirty="0" smtClean="0"/>
-              <a:t>Generate Code</a:t>
+              <a:t>Reduce Mechanical Steps</a:t>
             </a:r>
             <a:endParaRPr lang="da-DK" dirty="0"/>
           </a:p>
@@ -3653,22 +3612,6 @@
           <a:bodyPr/>
           <a:lstStyle/>
           <a:p>
-            <a:r>
-              <a:rPr lang="da-DK" dirty="0" smtClean="0"/>
-              <a:t>Generate code</a:t>
-            </a:r>
-          </a:p>
-          <a:p>
-            <a:endParaRPr lang="da-DK" dirty="0" smtClean="0"/>
-          </a:p>
-          <a:p>
-            <a:endParaRPr lang="da-DK" dirty="0" smtClean="0"/>
-          </a:p>
-          <a:p>
-            <a:r>
-              <a:rPr lang="da-DK" dirty="0" smtClean="0"/>
-              <a:t>Quick Fix</a:t>
-            </a:r>
             <a:endParaRPr lang="da-DK" dirty="0"/>
           </a:p>
         </p:txBody>
@@ -3715,7 +3658,7 @@
           <a:p>
             <a:r>
               <a:rPr lang="da-DK" dirty="0" smtClean="0"/>
-              <a:t>Refactor This!</a:t>
+              <a:t>Generate Code</a:t>
             </a:r>
             <a:endParaRPr lang="da-DK" dirty="0"/>
           </a:p>
@@ -3736,7 +3679,23 @@
           <a:bodyPr/>
           <a:lstStyle/>
           <a:p>
-            <a:endParaRPr lang="da-DK"/>
+            <a:r>
+              <a:rPr lang="da-DK" dirty="0" smtClean="0"/>
+              <a:t>Generate code</a:t>
+            </a:r>
+          </a:p>
+          <a:p>
+            <a:endParaRPr lang="da-DK" dirty="0" smtClean="0"/>
+          </a:p>
+          <a:p>
+            <a:endParaRPr lang="da-DK" dirty="0" smtClean="0"/>
+          </a:p>
+          <a:p>
+            <a:r>
+              <a:rPr lang="da-DK" dirty="0" smtClean="0"/>
+              <a:t>Quick Fix</a:t>
+            </a:r>
+            <a:endParaRPr lang="da-DK" dirty="0"/>
           </a:p>
         </p:txBody>
       </p:sp>
@@ -3782,7 +3741,7 @@
           <a:p>
             <a:r>
               <a:rPr lang="da-DK" dirty="0" smtClean="0"/>
-              <a:t>Completion Modes</a:t>
+              <a:t>Refactor This!</a:t>
             </a:r>
             <a:endParaRPr lang="da-DK" dirty="0"/>
           </a:p>
@@ -3803,38 +3762,7 @@
           <a:bodyPr/>
           <a:lstStyle/>
           <a:p>
-            <a:r>
-              <a:rPr lang="da-DK" dirty="0" smtClean="0"/>
-              <a:t>IntelliSense</a:t>
-            </a:r>
-          </a:p>
-          <a:p>
-            <a:endParaRPr lang="da-DK" dirty="0" smtClean="0"/>
-          </a:p>
-          <a:p>
-            <a:r>
-              <a:rPr lang="da-DK" dirty="0" smtClean="0"/>
-              <a:t>Import Completion</a:t>
-            </a:r>
-          </a:p>
-          <a:p>
-            <a:endParaRPr lang="da-DK" dirty="0" smtClean="0"/>
-          </a:p>
-          <a:p>
-            <a:r>
-              <a:rPr lang="da-DK" dirty="0" smtClean="0"/>
-              <a:t>Smart Completion</a:t>
-            </a:r>
-          </a:p>
-          <a:p>
-            <a:pPr>
-              <a:buNone/>
-            </a:pPr>
-            <a:r>
-              <a:rPr lang="da-DK" dirty="0" smtClean="0"/>
-              <a:t>	</a:t>
-            </a:r>
-            <a:endParaRPr lang="da-DK" dirty="0"/>
+            <a:endParaRPr lang="da-DK"/>
           </a:p>
         </p:txBody>
       </p:sp>
@@ -3875,14 +3803,12 @@
         </p:nvSpPr>
         <p:spPr/>
         <p:txBody>
-          <a:bodyPr>
-            <a:normAutofit/>
-          </a:bodyPr>
-          <a:lstStyle/>
-          <a:p>
-            <a:r>
-              <a:rPr lang="da-DK" dirty="0" smtClean="0"/>
-              <a:t>Usage Inspection</a:t>
+          <a:bodyPr/>
+          <a:lstStyle/>
+          <a:p>
+            <a:r>
+              <a:rPr lang="da-DK" dirty="0" smtClean="0"/>
+              <a:t>Completion Modes</a:t>
             </a:r>
             <a:endParaRPr lang="da-DK" dirty="0"/>
           </a:p>
@@ -3905,51 +3831,35 @@
           <a:p>
             <a:r>
               <a:rPr lang="da-DK" dirty="0" smtClean="0"/>
-              <a:t>Highlight symbols</a:t>
-            </a:r>
-          </a:p>
-          <a:p>
-            <a:pPr lvl="1"/>
-            <a:r>
-              <a:rPr lang="da-DK" dirty="0" smtClean="0"/>
-              <a:t>Single method or small class</a:t>
-            </a:r>
-          </a:p>
-          <a:p>
-            <a:pPr lvl="1"/>
+              <a:t>IntelliSense</a:t>
+            </a:r>
+          </a:p>
+          <a:p>
             <a:endParaRPr lang="da-DK" dirty="0" smtClean="0"/>
           </a:p>
           <a:p>
             <a:r>
               <a:rPr lang="da-DK" dirty="0" smtClean="0"/>
-              <a:t>Find usages</a:t>
-            </a:r>
-          </a:p>
-          <a:p>
-            <a:pPr lvl="1"/>
-            <a:r>
-              <a:rPr lang="da-DK" dirty="0" smtClean="0"/>
-              <a:t>Single public method or property</a:t>
-            </a:r>
-          </a:p>
-          <a:p>
-            <a:pPr lvl="1"/>
+              <a:t>Import Completion</a:t>
+            </a:r>
+          </a:p>
+          <a:p>
             <a:endParaRPr lang="da-DK" dirty="0" smtClean="0"/>
           </a:p>
           <a:p>
             <a:r>
               <a:rPr lang="da-DK" dirty="0" smtClean="0"/>
-              <a:t>Method tracking</a:t>
-            </a:r>
-          </a:p>
-          <a:p>
-            <a:pPr lvl="1"/>
-            <a:r>
-              <a:rPr lang="da-DK" dirty="0" smtClean="0"/>
-              <a:t>Entire flows</a:t>
-            </a:r>
-          </a:p>
-          <a:p>
+              <a:t>Smart Completion</a:t>
+            </a:r>
+          </a:p>
+          <a:p>
+            <a:pPr>
+              <a:buNone/>
+            </a:pPr>
+            <a:r>
+              <a:rPr lang="da-DK" dirty="0" smtClean="0"/>
+              <a:t>	</a:t>
+            </a:r>
             <a:endParaRPr lang="da-DK" dirty="0"/>
           </a:p>
         </p:txBody>
@@ -3991,12 +3901,14 @@
         </p:nvSpPr>
         <p:spPr/>
         <p:txBody>
-          <a:bodyPr/>
-          <a:lstStyle/>
-          <a:p>
-            <a:r>
-              <a:rPr lang="da-DK" dirty="0" smtClean="0"/>
-              <a:t>Navigating Hierarchies</a:t>
+          <a:bodyPr>
+            <a:normAutofit/>
+          </a:bodyPr>
+          <a:lstStyle/>
+          <a:p>
+            <a:r>
+              <a:rPr lang="da-DK" dirty="0" smtClean="0"/>
+              <a:t>Usage Inspection</a:t>
             </a:r>
             <a:endParaRPr lang="da-DK" dirty="0"/>
           </a:p>
@@ -4019,41 +3931,52 @@
           <a:p>
             <a:r>
               <a:rPr lang="da-DK" dirty="0" smtClean="0"/>
-              <a:t>Type Hierarchy</a:t>
-            </a:r>
-          </a:p>
-          <a:p>
+              <a:t>Highlight symbols</a:t>
+            </a:r>
+          </a:p>
+          <a:p>
+            <a:pPr lvl="1"/>
+            <a:r>
+              <a:rPr lang="da-DK" dirty="0" smtClean="0"/>
+              <a:t>Single method or small class</a:t>
+            </a:r>
+          </a:p>
+          <a:p>
+            <a:pPr lvl="1"/>
             <a:endParaRPr lang="da-DK" dirty="0" smtClean="0"/>
           </a:p>
           <a:p>
+            <a:r>
+              <a:rPr lang="da-DK" dirty="0" smtClean="0"/>
+              <a:t>Find usages</a:t>
+            </a:r>
+          </a:p>
+          <a:p>
+            <a:pPr lvl="1"/>
+            <a:r>
+              <a:rPr lang="da-DK" dirty="0" smtClean="0"/>
+              <a:t>Single public method or property</a:t>
+            </a:r>
+          </a:p>
+          <a:p>
+            <a:pPr lvl="1"/>
             <a:endParaRPr lang="da-DK" dirty="0" smtClean="0"/>
           </a:p>
           <a:p>
             <a:r>
               <a:rPr lang="da-DK" dirty="0" smtClean="0"/>
-              <a:t>Go to</a:t>
+              <a:t>Method tracking</a:t>
             </a:r>
           </a:p>
           <a:p>
             <a:pPr lvl="1"/>
             <a:r>
               <a:rPr lang="da-DK" dirty="0" smtClean="0"/>
-              <a:t>Declaration</a:t>
-            </a:r>
-          </a:p>
-          <a:p>
-            <a:pPr lvl="1"/>
-            <a:r>
-              <a:rPr lang="da-DK" dirty="0" smtClean="0"/>
-              <a:t>Base</a:t>
-            </a:r>
-          </a:p>
-          <a:p>
-            <a:pPr lvl="1"/>
-            <a:r>
-              <a:rPr lang="da-DK" dirty="0" smtClean="0"/>
-              <a:t>Derived</a:t>
-            </a:r>
+              <a:t>Entire flows</a:t>
+            </a:r>
+          </a:p>
+          <a:p>
+            <a:endParaRPr lang="da-DK" dirty="0"/>
           </a:p>
         </p:txBody>
       </p:sp>
@@ -4099,7 +4022,7 @@
           <a:p>
             <a:r>
               <a:rPr lang="da-DK" dirty="0" smtClean="0"/>
-              <a:t>Solution Explorer Refactorings</a:t>
+              <a:t>Navigating Hierarchies</a:t>
             </a:r>
             <a:endParaRPr lang="da-DK" dirty="0"/>
           </a:p>
@@ -4122,27 +4045,41 @@
           <a:p>
             <a:r>
               <a:rPr lang="da-DK" dirty="0" smtClean="0"/>
-              <a:t>Move types into matching files</a:t>
+              <a:t>Type Hierarchy</a:t>
             </a:r>
           </a:p>
           <a:p>
             <a:endParaRPr lang="da-DK" dirty="0" smtClean="0"/>
           </a:p>
           <a:p>
-            <a:r>
-              <a:rPr lang="da-DK" dirty="0" smtClean="0"/>
-              <a:t>Adjust namespaces</a:t>
-            </a:r>
-          </a:p>
-          <a:p>
             <a:endParaRPr lang="da-DK" dirty="0" smtClean="0"/>
           </a:p>
           <a:p>
             <a:r>
               <a:rPr lang="da-DK" dirty="0" smtClean="0"/>
-              <a:t>Move files into folder</a:t>
-            </a:r>
-            <a:endParaRPr lang="da-DK" dirty="0"/>
+              <a:t>Go to</a:t>
+            </a:r>
+          </a:p>
+          <a:p>
+            <a:pPr lvl="1"/>
+            <a:r>
+              <a:rPr lang="da-DK" dirty="0" smtClean="0"/>
+              <a:t>Declaration</a:t>
+            </a:r>
+          </a:p>
+          <a:p>
+            <a:pPr lvl="1"/>
+            <a:r>
+              <a:rPr lang="da-DK" dirty="0" smtClean="0"/>
+              <a:t>Base</a:t>
+            </a:r>
+          </a:p>
+          <a:p>
+            <a:pPr lvl="1"/>
+            <a:r>
+              <a:rPr lang="da-DK" dirty="0" smtClean="0"/>
+              <a:t>Derived</a:t>
+            </a:r>
           </a:p>
         </p:txBody>
       </p:sp>
@@ -4188,7 +4125,7 @@
           <a:p>
             <a:r>
               <a:rPr lang="da-DK" dirty="0" smtClean="0"/>
-              <a:t>Move Code</a:t>
+              <a:t>Solution Explorer Refactorings</a:t>
             </a:r>
             <a:endParaRPr lang="da-DK" dirty="0"/>
           </a:p>
@@ -4209,6 +4146,28 @@
           <a:bodyPr/>
           <a:lstStyle/>
           <a:p>
+            <a:r>
+              <a:rPr lang="da-DK" dirty="0" smtClean="0"/>
+              <a:t>Move types into matching files</a:t>
+            </a:r>
+          </a:p>
+          <a:p>
+            <a:endParaRPr lang="da-DK" dirty="0" smtClean="0"/>
+          </a:p>
+          <a:p>
+            <a:r>
+              <a:rPr lang="da-DK" dirty="0" smtClean="0"/>
+              <a:t>Adjust namespaces</a:t>
+            </a:r>
+          </a:p>
+          <a:p>
+            <a:endParaRPr lang="da-DK" dirty="0" smtClean="0"/>
+          </a:p>
+          <a:p>
+            <a:r>
+              <a:rPr lang="da-DK" dirty="0" smtClean="0"/>
+              <a:t>Move files into folder</a:t>
+            </a:r>
             <a:endParaRPr lang="da-DK" dirty="0"/>
           </a:p>
         </p:txBody>
@@ -4250,6 +4209,73 @@
         </p:nvSpPr>
         <p:spPr/>
         <p:txBody>
+          <a:bodyPr/>
+          <a:lstStyle/>
+          <a:p>
+            <a:r>
+              <a:rPr lang="da-DK" dirty="0" smtClean="0"/>
+              <a:t>Move Code</a:t>
+            </a:r>
+            <a:endParaRPr lang="da-DK" dirty="0"/>
+          </a:p>
+        </p:txBody>
+      </p:sp>
+      <p:sp>
+        <p:nvSpPr>
+          <p:cNvPr id="3" name="Content Placeholder 2"/>
+          <p:cNvSpPr>
+            <a:spLocks noGrp="1"/>
+          </p:cNvSpPr>
+          <p:nvPr>
+            <p:ph idx="1"/>
+          </p:nvPr>
+        </p:nvSpPr>
+        <p:spPr/>
+        <p:txBody>
+          <a:bodyPr/>
+          <a:lstStyle/>
+          <a:p>
+            <a:endParaRPr lang="da-DK" dirty="0"/>
+          </a:p>
+        </p:txBody>
+      </p:sp>
+    </p:spTree>
+  </p:cSld>
+  <p:clrMapOvr>
+    <a:masterClrMapping/>
+  </p:clrMapOvr>
+</p:sld>
+</file>
+
+<file path=ppt/slides/slide19.xml><?xml version="1.0" encoding="utf-8"?>
+<p:sld xmlns:a="http://schemas.openxmlformats.org/drawingml/2006/main" xmlns:r="http://schemas.openxmlformats.org/officeDocument/2006/relationships" xmlns:p="http://schemas.openxmlformats.org/presentationml/2006/main">
+  <p:cSld>
+    <p:spTree>
+      <p:nvGrpSpPr>
+        <p:cNvPr id="1" name=""/>
+        <p:cNvGrpSpPr/>
+        <p:nvPr/>
+      </p:nvGrpSpPr>
+      <p:grpSpPr>
+        <a:xfrm>
+          <a:off x="0" y="0"/>
+          <a:ext cx="0" cy="0"/>
+          <a:chOff x="0" y="0"/>
+          <a:chExt cx="0" cy="0"/>
+        </a:xfrm>
+      </p:grpSpPr>
+      <p:sp>
+        <p:nvSpPr>
+          <p:cNvPr id="2" name="Title 1"/>
+          <p:cNvSpPr>
+            <a:spLocks noGrp="1"/>
+          </p:cNvSpPr>
+          <p:nvPr>
+            <p:ph type="title"/>
+          </p:nvPr>
+        </p:nvSpPr>
+        <p:spPr/>
+        <p:txBody>
           <a:bodyPr>
             <a:normAutofit/>
           </a:bodyPr>
@@ -4348,7 +4374,7 @@
           <a:p>
             <a:r>
               <a:rPr lang="da-DK" dirty="0" smtClean="0"/>
-              <a:t>Navigational Axis</a:t>
+              <a:t>Go to ...</a:t>
             </a:r>
             <a:endParaRPr lang="da-DK" dirty="0"/>
           </a:p>
@@ -4374,56 +4400,52 @@
           <a:p>
             <a:r>
               <a:rPr lang="da-DK" dirty="0" smtClean="0"/>
-              <a:t>We remember strange things</a:t>
-            </a:r>
-          </a:p>
-          <a:p>
+              <a:t>Go to</a:t>
+            </a:r>
+          </a:p>
+          <a:p>
+            <a:pPr lvl="1"/>
+            <a:r>
+              <a:rPr lang="da-DK" dirty="0" smtClean="0"/>
+              <a:t>Type</a:t>
+            </a:r>
+          </a:p>
+          <a:p>
+            <a:pPr lvl="1"/>
+            <a:r>
+              <a:rPr lang="da-DK" dirty="0" smtClean="0"/>
+              <a:t>File</a:t>
+            </a:r>
+          </a:p>
+          <a:p>
+            <a:pPr lvl="1"/>
+            <a:r>
+              <a:rPr lang="da-DK" dirty="0" smtClean="0"/>
+              <a:t>Symbol</a:t>
+            </a:r>
+          </a:p>
+          <a:p>
+            <a:pPr lvl="1"/>
+            <a:r>
+              <a:rPr lang="da-DK" dirty="0" smtClean="0"/>
+              <a:t>Member</a:t>
+            </a:r>
             <a:endParaRPr lang="da-DK" dirty="0"/>
           </a:p>
-          <a:p>
-            <a:r>
-              <a:rPr lang="da-DK" dirty="0" smtClean="0"/>
-              <a:t>Navigational </a:t>
-            </a:r>
-            <a:r>
-              <a:rPr lang="da-DK" dirty="0" smtClean="0"/>
-              <a:t>axis</a:t>
-            </a:r>
-          </a:p>
-          <a:p>
-            <a:pPr lvl="1"/>
-            <a:r>
-              <a:rPr lang="da-DK" dirty="0" smtClean="0"/>
-              <a:t>Type name</a:t>
-            </a:r>
-          </a:p>
-          <a:p>
-            <a:pPr lvl="1"/>
-            <a:r>
-              <a:rPr lang="da-DK" dirty="0" smtClean="0"/>
-              <a:t>Method</a:t>
-            </a:r>
-          </a:p>
-          <a:p>
-            <a:pPr lvl="1"/>
-            <a:r>
-              <a:rPr lang="da-DK" dirty="0" smtClean="0"/>
-              <a:t>Proximity</a:t>
-            </a:r>
-            <a:endParaRPr lang="da-DK" dirty="0"/>
-          </a:p>
         </p:txBody>
       </p:sp>
     </p:spTree>
-    <p:extLst>
-      <p:ext uri="{BB962C8B-B14F-4D97-AF65-F5344CB8AC3E}">
-        <p14:creationId xmlns="" xmlns:p14="http://schemas.microsoft.com/office/powerpoint/2010/main" val="1917661024"/>
-      </p:ext>
-    </p:extLst>
   </p:cSld>
   <p:clrMapOvr>
     <a:masterClrMapping/>
   </p:clrMapOvr>
+  <p:timing>
+    <p:tnLst>
+      <p:par>
+        <p:cTn id="1" dur="indefinite" restart="never" nodeType="tmRoot"/>
+      </p:par>
+    </p:tnLst>
+  </p:timing>
 </p:sld>
 </file>
 
@@ -4486,7 +4508,6 @@
               <a:rPr lang="da-DK" dirty="0" smtClean="0"/>
               <a:t>Powerful search filters</a:t>
             </a:r>
-            <a:endParaRPr lang="da-DK" dirty="0" smtClean="0"/>
           </a:p>
           <a:p>
             <a:endParaRPr lang="da-DK" dirty="0" smtClean="0"/>
@@ -4813,7 +4834,7 @@
     </p:spTree>
     <p:extLst>
       <p:ext uri="{BB962C8B-B14F-4D97-AF65-F5344CB8AC3E}">
-        <p14:creationId xmlns="" xmlns:p14="http://schemas.microsoft.com/office/powerpoint/2010/main" val="1712164881"/>
+        <p14:creationId xmlns:p14="http://schemas.microsoft.com/office/powerpoint/2010/main" xmlns="" val="1712164881"/>
       </p:ext>
     </p:extLst>
   </p:cSld>
@@ -4964,11 +4985,7 @@
           <a:p>
             <a:r>
               <a:rPr lang="da-DK" dirty="0" smtClean="0"/>
-              <a:t>rwrit </a:t>
-            </a:r>
-            <a:r>
-              <a:rPr lang="da-DK" dirty="0" smtClean="0"/>
-              <a:t>	→ 	</a:t>
+              <a:t>rwrit 	→ 	</a:t>
             </a:r>
             <a:r>
               <a:rPr lang="da-DK" b="1" dirty="0" smtClean="0">
@@ -4994,16 +5011,11 @@
               <a:rPr lang="da-DK" dirty="0" smtClean="0"/>
               <a:t>erLock</a:t>
             </a:r>
-            <a:endParaRPr lang="da-DK" dirty="0" smtClean="0"/>
-          </a:p>
-          <a:p>
-            <a:r>
-              <a:rPr lang="da-DK" dirty="0" smtClean="0"/>
-              <a:t>w</a:t>
-            </a:r>
-            <a:r>
-              <a:rPr lang="da-DK" dirty="0" smtClean="0"/>
-              <a:t>rit 	→ 	Reader</a:t>
+          </a:p>
+          <a:p>
+            <a:r>
+              <a:rPr lang="da-DK" dirty="0" smtClean="0"/>
+              <a:t>writ 	→ 	Reader</a:t>
             </a:r>
             <a:r>
               <a:rPr lang="da-DK" b="1" dirty="0" smtClean="0">
@@ -5032,23 +5044,11 @@
                   <a:srgbClr val="FF0000"/>
                 </a:solidFill>
               </a:rPr>
-              <a:t>s</a:t>
-            </a:r>
-            <a:r>
-              <a:rPr lang="da-DK" b="1" dirty="0" smtClean="0">
-                <a:solidFill>
-                  <a:srgbClr val="FF0000"/>
-                </a:solidFill>
-              </a:rPr>
-              <a:t>		</a:t>
-            </a:r>
-            <a:r>
-              <a:rPr lang="da-DK" dirty="0" smtClean="0"/>
-              <a:t> </a:t>
-            </a:r>
-            <a:r>
-              <a:rPr lang="da-DK" dirty="0" smtClean="0"/>
-              <a:t>→	</a:t>
+              <a:t>s		</a:t>
+            </a:r>
+            <a:r>
+              <a:rPr lang="da-DK" dirty="0" smtClean="0"/>
+              <a:t> →	</a:t>
             </a:r>
             <a:r>
               <a:rPr lang="da-DK" b="1" dirty="0" smtClean="0">
@@ -5082,7 +5082,6 @@
               <a:rPr lang="da-DK" dirty="0" smtClean="0"/>
               <a:t>riterLock</a:t>
             </a:r>
-            <a:endParaRPr lang="da-DK" dirty="0" smtClean="0"/>
           </a:p>
           <a:p>
             <a:endParaRPr lang="da-DK" b="1" dirty="0" smtClean="0">
@@ -5181,11 +5180,7 @@
             <a:pPr lvl="1"/>
             <a:r>
               <a:rPr lang="da-DK" dirty="0" smtClean="0"/>
-              <a:t>rwlcs </a:t>
-            </a:r>
-            <a:r>
-              <a:rPr lang="da-DK" dirty="0" smtClean="0"/>
-              <a:t>	→ 	</a:t>
+              <a:t>rwlcs 	→ 	</a:t>
             </a:r>
             <a:r>
               <a:rPr lang="da-DK" b="1" dirty="0" smtClean="0">
@@ -5231,11 +5226,6 @@
               </a:rPr>
               <a:t>cs</a:t>
             </a:r>
-            <a:endParaRPr lang="da-DK" b="1" dirty="0" smtClean="0">
-              <a:solidFill>
-                <a:srgbClr val="00B050"/>
-              </a:solidFill>
-            </a:endParaRPr>
           </a:p>
           <a:p>
             <a:endParaRPr lang="da-DK" dirty="0" smtClean="0"/>
@@ -5250,19 +5240,7 @@
             <a:pPr lvl="1"/>
             <a:r>
               <a:rPr lang="da-DK" dirty="0" smtClean="0"/>
-              <a:t>t</a:t>
-            </a:r>
-            <a:r>
-              <a:rPr lang="da-DK" dirty="0" smtClean="0"/>
-              <a:t> r </a:t>
-            </a:r>
-            <a:r>
-              <a:rPr lang="da-DK" dirty="0" smtClean="0"/>
-              <a:t>	→ 	</a:t>
-            </a:r>
-            <a:r>
-              <a:rPr lang="da-DK" dirty="0" smtClean="0"/>
-              <a:t>System.</a:t>
+              <a:t>t r 	→ 	System.</a:t>
             </a:r>
             <a:r>
               <a:rPr lang="da-DK" b="1" dirty="0" smtClean="0">
@@ -5298,11 +5276,7 @@
             <a:pPr lvl="1"/>
             <a:r>
               <a:rPr lang="da-DK" dirty="0" smtClean="0"/>
-              <a:t>t</a:t>
-            </a:r>
-            <a:r>
-              <a:rPr lang="da-DK" dirty="0" smtClean="0"/>
-              <a:t> r 	→	\</a:t>
+              <a:t>t r 	→	\</a:t>
             </a:r>
             <a:r>
               <a:rPr lang="da-DK" b="1" dirty="0" smtClean="0">
@@ -5333,15 +5307,7 @@
             <a:pPr lvl="1"/>
             <a:r>
               <a:rPr lang="da-DK" dirty="0" smtClean="0"/>
-              <a:t>r rl</a:t>
-            </a:r>
-            <a:r>
-              <a:rPr lang="da-DK" dirty="0" smtClean="0"/>
-              <a:t>	</a:t>
-            </a:r>
-            <a:r>
-              <a:rPr lang="da-DK" dirty="0" smtClean="0"/>
-              <a:t>→	</a:t>
+              <a:t>r rl	→	</a:t>
             </a:r>
             <a:r>
               <a:rPr lang="da-DK" b="1" dirty="0" smtClean="0">
@@ -5409,39 +5375,6 @@
 </file>
 
 <file path=ppt/slides/slide6.xml><?xml version="1.0" encoding="utf-8"?>
-<p:sld xmlns:a="http://schemas.openxmlformats.org/drawingml/2006/main" xmlns:r="http://schemas.openxmlformats.org/officeDocument/2006/relationships" xmlns:p="http://schemas.openxmlformats.org/presentationml/2006/main">
-  <p:cSld>
-    <p:bg>
-      <p:bgPr>
-        <a:solidFill>
-          <a:srgbClr val="00B050"/>
-        </a:solidFill>
-        <a:effectLst/>
-      </p:bgPr>
-    </p:bg>
-    <p:spTree>
-      <p:nvGrpSpPr>
-        <p:cNvPr id="1" name=""/>
-        <p:cNvGrpSpPr/>
-        <p:nvPr/>
-      </p:nvGrpSpPr>
-      <p:grpSpPr>
-        <a:xfrm>
-          <a:off x="0" y="0"/>
-          <a:ext cx="0" cy="0"/>
-          <a:chOff x="0" y="0"/>
-          <a:chExt cx="0" cy="0"/>
-        </a:xfrm>
-      </p:grpSpPr>
-    </p:spTree>
-  </p:cSld>
-  <p:clrMapOvr>
-    <a:masterClrMapping/>
-  </p:clrMapOvr>
-</p:sld>
-</file>
-
-<file path=ppt/slides/slide7.xml><?xml version="1.0" encoding="utf-8"?>
 <p:sld xmlns:a="http://schemas.openxmlformats.org/drawingml/2006/main" xmlns:r="http://schemas.openxmlformats.org/officeDocument/2006/relationships" xmlns:p="http://schemas.openxmlformats.org/presentationml/2006/main">
   <p:cSld>
     <p:bg>
@@ -5518,7 +5451,32 @@
                   <a:schemeClr val="bg1"/>
                 </a:solidFill>
               </a:rPr>
-              <a:t>Go to ...</a:t>
+              <a:t>Go to </a:t>
+            </a:r>
+            <a:r>
+              <a:rPr lang="da-DK" dirty="0" smtClean="0">
+                <a:solidFill>
+                  <a:schemeClr val="bg1"/>
+                </a:solidFill>
+              </a:rPr>
+              <a:t>...</a:t>
+            </a:r>
+          </a:p>
+          <a:p>
+            <a:endParaRPr lang="da-DK" dirty="0" smtClean="0">
+              <a:solidFill>
+                <a:schemeClr val="bg1"/>
+              </a:solidFill>
+            </a:endParaRPr>
+          </a:p>
+          <a:p>
+            <a:r>
+              <a:rPr lang="da-DK" dirty="0" smtClean="0">
+                <a:solidFill>
+                  <a:schemeClr val="bg1"/>
+                </a:solidFill>
+              </a:rPr>
+              <a:t>Find shortest key sequence</a:t>
             </a:r>
             <a:endParaRPr lang="da-DK" dirty="0">
               <a:solidFill>
@@ -5529,6 +5487,144 @@
         </p:txBody>
       </p:sp>
     </p:spTree>
+  </p:cSld>
+  <p:clrMapOvr>
+    <a:masterClrMapping/>
+  </p:clrMapOvr>
+</p:sld>
+</file>
+
+<file path=ppt/slides/slide7.xml><?xml version="1.0" encoding="utf-8"?>
+<p:sld xmlns:a="http://schemas.openxmlformats.org/drawingml/2006/main" xmlns:r="http://schemas.openxmlformats.org/officeDocument/2006/relationships" xmlns:p="http://schemas.openxmlformats.org/presentationml/2006/main">
+  <p:cSld>
+    <p:spTree>
+      <p:nvGrpSpPr>
+        <p:cNvPr id="1" name=""/>
+        <p:cNvGrpSpPr/>
+        <p:nvPr/>
+      </p:nvGrpSpPr>
+      <p:grpSpPr>
+        <a:xfrm>
+          <a:off x="0" y="0"/>
+          <a:ext cx="0" cy="0"/>
+          <a:chOff x="0" y="0"/>
+          <a:chExt cx="0" cy="0"/>
+        </a:xfrm>
+      </p:grpSpPr>
+      <p:sp>
+        <p:nvSpPr>
+          <p:cNvPr id="2" name="Title 1"/>
+          <p:cNvSpPr>
+            <a:spLocks noGrp="1"/>
+          </p:cNvSpPr>
+          <p:nvPr>
+            <p:ph type="title"/>
+          </p:nvPr>
+        </p:nvSpPr>
+        <p:spPr/>
+        <p:txBody>
+          <a:bodyPr/>
+          <a:lstStyle/>
+          <a:p>
+            <a:r>
+              <a:rPr lang="da-DK" dirty="0" smtClean="0"/>
+              <a:t>Code Interaction</a:t>
+            </a:r>
+            <a:endParaRPr lang="da-DK" dirty="0"/>
+          </a:p>
+        </p:txBody>
+      </p:sp>
+      <p:sp>
+        <p:nvSpPr>
+          <p:cNvPr id="3" name="Content Placeholder 2"/>
+          <p:cNvSpPr>
+            <a:spLocks noGrp="1"/>
+          </p:cNvSpPr>
+          <p:nvPr>
+            <p:ph idx="1"/>
+          </p:nvPr>
+        </p:nvSpPr>
+        <p:spPr/>
+        <p:txBody>
+          <a:bodyPr>
+            <a:normAutofit fontScale="92500" lnSpcReduction="20000"/>
+          </a:bodyPr>
+          <a:lstStyle/>
+          <a:p>
+            <a:endParaRPr lang="da-DK" dirty="0" smtClean="0"/>
+          </a:p>
+          <a:p>
+            <a:r>
+              <a:rPr lang="da-DK" dirty="0" smtClean="0"/>
+              <a:t>Based on</a:t>
+            </a:r>
+          </a:p>
+          <a:p>
+            <a:pPr lvl="1"/>
+            <a:r>
+              <a:rPr lang="da-DK" dirty="0" smtClean="0"/>
+              <a:t>Selection</a:t>
+            </a:r>
+          </a:p>
+          <a:p>
+            <a:pPr lvl="1"/>
+            <a:r>
+              <a:rPr lang="da-DK" dirty="0" smtClean="0"/>
+              <a:t>Caret placement</a:t>
+            </a:r>
+          </a:p>
+          <a:p>
+            <a:endParaRPr lang="da-DK" dirty="0" smtClean="0"/>
+          </a:p>
+          <a:p>
+            <a:r>
+              <a:rPr lang="da-DK" dirty="0" smtClean="0"/>
+              <a:t>Contextual actions</a:t>
+            </a:r>
+          </a:p>
+          <a:p>
+            <a:pPr lvl="1"/>
+            <a:r>
+              <a:rPr lang="da-DK" dirty="0" smtClean="0"/>
+              <a:t>Quick fixes</a:t>
+            </a:r>
+          </a:p>
+          <a:p>
+            <a:pPr lvl="1"/>
+            <a:r>
+              <a:rPr lang="da-DK" dirty="0" smtClean="0"/>
+              <a:t>Navigation</a:t>
+            </a:r>
+          </a:p>
+          <a:p>
+            <a:pPr lvl="1"/>
+            <a:r>
+              <a:rPr lang="da-DK" dirty="0" smtClean="0"/>
+              <a:t>Refactoring</a:t>
+            </a:r>
+          </a:p>
+          <a:p>
+            <a:pPr lvl="1"/>
+            <a:r>
+              <a:rPr lang="da-DK" dirty="0" smtClean="0"/>
+              <a:t>Inspection</a:t>
+            </a:r>
+          </a:p>
+          <a:p>
+            <a:pPr lvl="1"/>
+            <a:endParaRPr lang="da-DK" dirty="0" smtClean="0"/>
+          </a:p>
+          <a:p>
+            <a:endParaRPr lang="da-DK" dirty="0"/>
+          </a:p>
+        </p:txBody>
+      </p:sp>
+    </p:spTree>
+    <p:extLst>
+      <p:ext uri="{BB962C8B-B14F-4D97-AF65-F5344CB8AC3E}">
+        <p14:creationId xmlns:p14="http://schemas.microsoft.com/office/powerpoint/2010/main" xmlns="" val="1649822022"/>
+      </p:ext>
+    </p:extLst>
   </p:cSld>
   <p:clrMapOvr>
     <a:masterClrMapping/>
@@ -5565,12 +5661,14 @@
         </p:nvSpPr>
         <p:spPr/>
         <p:txBody>
-          <a:bodyPr/>
-          <a:lstStyle/>
-          <a:p>
-            <a:r>
-              <a:rPr lang="da-DK" dirty="0" smtClean="0"/>
-              <a:t>Caret Placement</a:t>
+          <a:bodyPr>
+            <a:normAutofit/>
+          </a:bodyPr>
+          <a:lstStyle/>
+          <a:p>
+            <a:r>
+              <a:rPr lang="da-DK" dirty="0" smtClean="0"/>
+              <a:t>Code Inspections</a:t>
             </a:r>
             <a:endParaRPr lang="da-DK" dirty="0"/>
           </a:p>
@@ -5588,19 +5686,359 @@
         </p:nvSpPr>
         <p:spPr/>
         <p:txBody>
-          <a:bodyPr/>
-          <a:lstStyle/>
-          <a:p>
-            <a:endParaRPr lang="da-DK"/>
-          </a:p>
-        </p:txBody>
-      </p:sp>
+          <a:bodyPr>
+            <a:normAutofit fontScale="92500" lnSpcReduction="20000"/>
+          </a:bodyPr>
+          <a:lstStyle/>
+          <a:p>
+            <a:r>
+              <a:rPr lang="da-DK" dirty="0" smtClean="0"/>
+              <a:t>Contextual </a:t>
+            </a:r>
+            <a:r>
+              <a:rPr lang="da-DK" dirty="0" smtClean="0"/>
+              <a:t>help</a:t>
+            </a:r>
+            <a:endParaRPr lang="da-DK" dirty="0" smtClean="0"/>
+          </a:p>
+          <a:p>
+            <a:endParaRPr lang="da-DK" dirty="0" smtClean="0"/>
+          </a:p>
+          <a:p>
+            <a:r>
+              <a:rPr lang="da-DK" dirty="0" smtClean="0"/>
+              <a:t>Hints</a:t>
+            </a:r>
+          </a:p>
+          <a:p>
+            <a:r>
+              <a:rPr lang="da-DK" dirty="0" smtClean="0"/>
+              <a:t>Suggestions</a:t>
+            </a:r>
+          </a:p>
+          <a:p>
+            <a:r>
+              <a:rPr lang="da-DK" dirty="0" smtClean="0"/>
+              <a:t>Dead code</a:t>
+            </a:r>
+          </a:p>
+          <a:p>
+            <a:r>
+              <a:rPr lang="da-DK" dirty="0" smtClean="0"/>
+              <a:t>Warnings</a:t>
+            </a:r>
+            <a:endParaRPr lang="da-DK" dirty="0" smtClean="0"/>
+          </a:p>
+          <a:p>
+            <a:r>
+              <a:rPr lang="da-DK" dirty="0" smtClean="0"/>
+              <a:t>Errors</a:t>
+            </a:r>
+            <a:endParaRPr lang="da-DK" dirty="0" smtClean="0"/>
+          </a:p>
+          <a:p>
+            <a:endParaRPr lang="da-DK" dirty="0" smtClean="0"/>
+          </a:p>
+          <a:p>
+            <a:r>
+              <a:rPr lang="da-DK" dirty="0" smtClean="0"/>
+              <a:t>Side bar</a:t>
+            </a:r>
+            <a:endParaRPr lang="da-DK" dirty="0"/>
+          </a:p>
+        </p:txBody>
+      </p:sp>
+      <p:pic>
+        <p:nvPicPr>
+          <p:cNvPr id="1027" name="Picture 3"/>
+          <p:cNvPicPr>
+            <a:picLocks noChangeAspect="1" noChangeArrowheads="1"/>
+          </p:cNvPicPr>
+          <p:nvPr/>
+        </p:nvPicPr>
+        <p:blipFill>
+          <a:blip r:embed="rId2" cstate="print"/>
+          <a:srcRect/>
+          <a:stretch>
+            <a:fillRect/>
+          </a:stretch>
+        </p:blipFill>
+        <p:spPr bwMode="auto">
+          <a:xfrm>
+            <a:off x="5029200" y="5486400"/>
+            <a:ext cx="1427922" cy="903913"/>
+          </a:xfrm>
+          <a:prstGeom prst="rect">
+            <a:avLst/>
+          </a:prstGeom>
+          <a:ln>
+            <a:headEnd/>
+            <a:tailEnd/>
+          </a:ln>
+        </p:spPr>
+        <p:style>
+          <a:lnRef idx="2">
+            <a:schemeClr val="accent1"/>
+          </a:lnRef>
+          <a:fillRef idx="1">
+            <a:schemeClr val="lt1"/>
+          </a:fillRef>
+          <a:effectRef idx="0">
+            <a:schemeClr val="accent1"/>
+          </a:effectRef>
+          <a:fontRef idx="minor">
+            <a:schemeClr val="dk1"/>
+          </a:fontRef>
+        </p:style>
+      </p:pic>
+      <p:pic>
+        <p:nvPicPr>
+          <p:cNvPr id="1028" name="Picture 4"/>
+          <p:cNvPicPr>
+            <a:picLocks noChangeAspect="1" noChangeArrowheads="1"/>
+          </p:cNvPicPr>
+          <p:nvPr/>
+        </p:nvPicPr>
+        <p:blipFill>
+          <a:blip r:embed="rId3" cstate="print"/>
+          <a:srcRect/>
+          <a:stretch>
+            <a:fillRect/>
+          </a:stretch>
+        </p:blipFill>
+        <p:spPr bwMode="auto">
+          <a:xfrm>
+            <a:off x="3180521" y="5475028"/>
+            <a:ext cx="1722965" cy="925772"/>
+          </a:xfrm>
+          <a:prstGeom prst="rect">
+            <a:avLst/>
+          </a:prstGeom>
+          <a:ln>
+            <a:headEnd/>
+            <a:tailEnd/>
+          </a:ln>
+        </p:spPr>
+        <p:style>
+          <a:lnRef idx="2">
+            <a:schemeClr val="accent1"/>
+          </a:lnRef>
+          <a:fillRef idx="1">
+            <a:schemeClr val="lt1"/>
+          </a:fillRef>
+          <a:effectRef idx="0">
+            <a:schemeClr val="accent1"/>
+          </a:effectRef>
+          <a:fontRef idx="minor">
+            <a:schemeClr val="dk1"/>
+          </a:fontRef>
+        </p:style>
+      </p:pic>
+      <p:pic>
+        <p:nvPicPr>
+          <p:cNvPr id="1029" name="Picture 5"/>
+          <p:cNvPicPr>
+            <a:picLocks noChangeAspect="1" noChangeArrowheads="1"/>
+          </p:cNvPicPr>
+          <p:nvPr/>
+        </p:nvPicPr>
+        <p:blipFill>
+          <a:blip r:embed="rId4" cstate="print"/>
+          <a:srcRect/>
+          <a:stretch>
+            <a:fillRect/>
+          </a:stretch>
+        </p:blipFill>
+        <p:spPr bwMode="auto">
+          <a:xfrm>
+            <a:off x="2971801" y="4419601"/>
+            <a:ext cx="3886200" cy="840688"/>
+          </a:xfrm>
+          <a:prstGeom prst="rect">
+            <a:avLst/>
+          </a:prstGeom>
+          <a:ln>
+            <a:headEnd/>
+            <a:tailEnd/>
+          </a:ln>
+        </p:spPr>
+        <p:style>
+          <a:lnRef idx="2">
+            <a:schemeClr val="accent1"/>
+          </a:lnRef>
+          <a:fillRef idx="1">
+            <a:schemeClr val="lt1"/>
+          </a:fillRef>
+          <a:effectRef idx="0">
+            <a:schemeClr val="accent1"/>
+          </a:effectRef>
+          <a:fontRef idx="minor">
+            <a:schemeClr val="dk1"/>
+          </a:fontRef>
+        </p:style>
+      </p:pic>
+      <p:pic>
+        <p:nvPicPr>
+          <p:cNvPr id="1030" name="Picture 6"/>
+          <p:cNvPicPr>
+            <a:picLocks noChangeAspect="1" noChangeArrowheads="1"/>
+          </p:cNvPicPr>
+          <p:nvPr/>
+        </p:nvPicPr>
+        <p:blipFill>
+          <a:blip r:embed="rId5" cstate="print"/>
+          <a:srcRect/>
+          <a:stretch>
+            <a:fillRect/>
+          </a:stretch>
+        </p:blipFill>
+        <p:spPr bwMode="auto">
+          <a:xfrm>
+            <a:off x="3657600" y="3352800"/>
+            <a:ext cx="2286000" cy="852985"/>
+          </a:xfrm>
+          <a:prstGeom prst="rect">
+            <a:avLst/>
+          </a:prstGeom>
+          <a:ln>
+            <a:headEnd/>
+            <a:tailEnd/>
+          </a:ln>
+        </p:spPr>
+        <p:style>
+          <a:lnRef idx="2">
+            <a:schemeClr val="accent1"/>
+          </a:lnRef>
+          <a:fillRef idx="1">
+            <a:schemeClr val="lt1"/>
+          </a:fillRef>
+          <a:effectRef idx="0">
+            <a:schemeClr val="accent1"/>
+          </a:effectRef>
+          <a:fontRef idx="minor">
+            <a:schemeClr val="dk1"/>
+          </a:fontRef>
+        </p:style>
+      </p:pic>
+      <p:pic>
+        <p:nvPicPr>
+          <p:cNvPr id="1031" name="Picture 7"/>
+          <p:cNvPicPr>
+            <a:picLocks noChangeAspect="1" noChangeArrowheads="1"/>
+          </p:cNvPicPr>
+          <p:nvPr/>
+        </p:nvPicPr>
+        <p:blipFill>
+          <a:blip r:embed="rId6" cstate="print"/>
+          <a:srcRect/>
+          <a:stretch>
+            <a:fillRect/>
+          </a:stretch>
+        </p:blipFill>
+        <p:spPr bwMode="auto">
+          <a:xfrm>
+            <a:off x="3813110" y="2343464"/>
+            <a:ext cx="2133600" cy="856936"/>
+          </a:xfrm>
+          <a:prstGeom prst="rect">
+            <a:avLst/>
+          </a:prstGeom>
+          <a:ln>
+            <a:headEnd/>
+            <a:tailEnd/>
+          </a:ln>
+        </p:spPr>
+        <p:style>
+          <a:lnRef idx="2">
+            <a:schemeClr val="accent1"/>
+          </a:lnRef>
+          <a:fillRef idx="1">
+            <a:schemeClr val="lt1"/>
+          </a:fillRef>
+          <a:effectRef idx="0">
+            <a:schemeClr val="accent1"/>
+          </a:effectRef>
+          <a:fontRef idx="minor">
+            <a:schemeClr val="dk1"/>
+          </a:fontRef>
+        </p:style>
+      </p:pic>
+      <p:pic>
+        <p:nvPicPr>
+          <p:cNvPr id="1032" name="Picture 8"/>
+          <p:cNvPicPr>
+            <a:picLocks noChangeAspect="1" noChangeArrowheads="1"/>
+          </p:cNvPicPr>
+          <p:nvPr/>
+        </p:nvPicPr>
+        <p:blipFill>
+          <a:blip r:embed="rId7" cstate="print"/>
+          <a:srcRect/>
+          <a:stretch>
+            <a:fillRect/>
+          </a:stretch>
+        </p:blipFill>
+        <p:spPr bwMode="auto">
+          <a:xfrm>
+            <a:off x="4038600" y="1371600"/>
+            <a:ext cx="1594888" cy="762000"/>
+          </a:xfrm>
+          <a:prstGeom prst="rect">
+            <a:avLst/>
+          </a:prstGeom>
+          <a:ln>
+            <a:headEnd/>
+            <a:tailEnd/>
+          </a:ln>
+        </p:spPr>
+        <p:style>
+          <a:lnRef idx="2">
+            <a:schemeClr val="accent1"/>
+          </a:lnRef>
+          <a:fillRef idx="1">
+            <a:schemeClr val="lt1"/>
+          </a:fillRef>
+          <a:effectRef idx="0">
+            <a:schemeClr val="accent1"/>
+          </a:effectRef>
+          <a:fontRef idx="minor">
+            <a:schemeClr val="dk1"/>
+          </a:fontRef>
+        </p:style>
+      </p:pic>
+      <p:pic>
+        <p:nvPicPr>
+          <p:cNvPr id="1033" name="Picture 9"/>
+          <p:cNvPicPr>
+            <a:picLocks noChangeAspect="1" noChangeArrowheads="1"/>
+          </p:cNvPicPr>
+          <p:nvPr/>
+        </p:nvPicPr>
+        <p:blipFill>
+          <a:blip r:embed="rId8" cstate="print"/>
+          <a:srcRect/>
+          <a:stretch>
+            <a:fillRect/>
+          </a:stretch>
+        </p:blipFill>
+        <p:spPr bwMode="auto">
+          <a:xfrm>
+            <a:off x="7620000" y="990600"/>
+            <a:ext cx="1255066" cy="5350543"/>
+          </a:xfrm>
+          <a:prstGeom prst="rect">
+            <a:avLst/>
+          </a:prstGeom>
+          <a:noFill/>
+          <a:ln w="9525">
+            <a:noFill/>
+            <a:miter lim="800000"/>
+            <a:headEnd/>
+            <a:tailEnd/>
+          </a:ln>
+        </p:spPr>
+      </p:pic>
     </p:spTree>
-    <p:extLst>
-      <p:ext uri="{BB962C8B-B14F-4D97-AF65-F5344CB8AC3E}">
-        <p14:creationId xmlns="" xmlns:p14="http://schemas.microsoft.com/office/powerpoint/2010/main" val="1649822022"/>
-      </p:ext>
-    </p:extLst>
   </p:cSld>
   <p:clrMapOvr>
     <a:masterClrMapping/>
@@ -5611,6 +6049,14 @@
 <file path=ppt/slides/slide9.xml><?xml version="1.0" encoding="utf-8"?>
 <p:sld xmlns:a="http://schemas.openxmlformats.org/drawingml/2006/main" xmlns:r="http://schemas.openxmlformats.org/officeDocument/2006/relationships" xmlns:p="http://schemas.openxmlformats.org/presentationml/2006/main">
   <p:cSld>
+    <p:bg>
+      <p:bgPr>
+        <a:solidFill>
+          <a:schemeClr val="tx1"/>
+        </a:solidFill>
+        <a:effectLst/>
+      </p:bgPr>
+    </p:bg>
     <p:spTree>
       <p:nvGrpSpPr>
         <p:cNvPr id="1" name=""/>
@@ -5637,77 +6083,78 @@
         </p:nvSpPr>
         <p:spPr/>
         <p:txBody>
-          <a:bodyPr>
-            <a:normAutofit/>
-          </a:bodyPr>
-          <a:lstStyle/>
-          <a:p>
-            <a:r>
-              <a:rPr lang="da-DK" dirty="0" smtClean="0"/>
+          <a:bodyPr/>
+          <a:lstStyle/>
+          <a:p>
+            <a:r>
+              <a:rPr lang="da-DK" dirty="0" smtClean="0">
+                <a:solidFill>
+                  <a:schemeClr val="bg1"/>
+                </a:solidFill>
+              </a:rPr>
+              <a:t>Exercise</a:t>
+            </a:r>
+            <a:endParaRPr lang="da-DK" dirty="0">
+              <a:solidFill>
+                <a:schemeClr val="bg1"/>
+              </a:solidFill>
+            </a:endParaRPr>
+          </a:p>
+        </p:txBody>
+      </p:sp>
+      <p:sp>
+        <p:nvSpPr>
+          <p:cNvPr id="3" name="Content Placeholder 2"/>
+          <p:cNvSpPr>
+            <a:spLocks noGrp="1"/>
+          </p:cNvSpPr>
+          <p:nvPr>
+            <p:ph idx="1"/>
+          </p:nvPr>
+        </p:nvSpPr>
+        <p:spPr/>
+        <p:txBody>
+          <a:bodyPr/>
+          <a:lstStyle/>
+          <a:p>
+            <a:r>
+              <a:rPr lang="da-DK" dirty="0" smtClean="0">
+                <a:solidFill>
+                  <a:schemeClr val="bg1"/>
+                </a:solidFill>
+              </a:rPr>
               <a:t>Code Inspections</a:t>
             </a:r>
-            <a:endParaRPr lang="da-DK" dirty="0"/>
-          </a:p>
-        </p:txBody>
-      </p:sp>
-      <p:sp>
-        <p:nvSpPr>
-          <p:cNvPr id="3" name="Content Placeholder 2"/>
-          <p:cNvSpPr>
-            <a:spLocks noGrp="1"/>
-          </p:cNvSpPr>
-          <p:nvPr>
-            <p:ph idx="1"/>
-          </p:nvPr>
-        </p:nvSpPr>
-        <p:spPr/>
-        <p:txBody>
-          <a:bodyPr>
-            <a:normAutofit lnSpcReduction="10000"/>
-          </a:bodyPr>
-          <a:lstStyle/>
-          <a:p>
-            <a:r>
-              <a:rPr lang="da-DK" dirty="0" smtClean="0"/>
-              <a:t>Contextual Help</a:t>
-            </a:r>
-          </a:p>
-          <a:p>
-            <a:endParaRPr lang="da-DK" dirty="0" smtClean="0"/>
-          </a:p>
-          <a:p>
-            <a:r>
-              <a:rPr lang="da-DK" dirty="0" smtClean="0"/>
-              <a:t>Hints</a:t>
-            </a:r>
-          </a:p>
-          <a:p>
-            <a:r>
-              <a:rPr lang="da-DK" dirty="0" smtClean="0"/>
-              <a:t>Suggestions</a:t>
-            </a:r>
-          </a:p>
-          <a:p>
-            <a:r>
-              <a:rPr lang="da-DK" dirty="0" smtClean="0"/>
-              <a:t>Dead code</a:t>
-            </a:r>
-          </a:p>
-          <a:p>
-            <a:r>
-              <a:rPr lang="da-DK" dirty="0" smtClean="0"/>
-              <a:t>Errors</a:t>
-            </a:r>
-          </a:p>
-          <a:p>
-            <a:endParaRPr lang="da-DK" dirty="0" smtClean="0"/>
-          </a:p>
-          <a:p>
-            <a:r>
-              <a:rPr lang="da-DK" dirty="0" smtClean="0"/>
-              <a:t>Side bar</a:t>
-            </a:r>
-            <a:endParaRPr lang="da-DK" dirty="0"/>
+          </a:p>
+          <a:p>
+            <a:endParaRPr lang="da-DK" dirty="0" smtClean="0">
+              <a:solidFill>
+                <a:schemeClr val="bg1"/>
+              </a:solidFill>
+            </a:endParaRPr>
+          </a:p>
+          <a:p>
+            <a:r>
+              <a:rPr lang="da-DK" dirty="0" smtClean="0">
+                <a:solidFill>
+                  <a:schemeClr val="bg1"/>
+                </a:solidFill>
+              </a:rPr>
+              <a:t>Note: </a:t>
+            </a:r>
+            <a:r>
+              <a:rPr lang="da-DK" b="1" dirty="0" smtClean="0">
+                <a:solidFill>
+                  <a:schemeClr val="bg1"/>
+                </a:solidFill>
+              </a:rPr>
+              <a:t>CodeInspections.sln</a:t>
+            </a:r>
+            <a:endParaRPr lang="da-DK" b="1" dirty="0" smtClean="0">
+              <a:solidFill>
+                <a:schemeClr val="bg1"/>
+              </a:solidFill>
+            </a:endParaRPr>
           </a:p>
         </p:txBody>
       </p:sp>

</xml_diff>

<commit_message>
Started work on generate code presentation part.
</commit_message>
<xml_diff>
--- a/Presentations/2 - Exercises - ReSharper Course.pptx
+++ b/Presentations/2 - Exercises - ReSharper Course.pptx
@@ -5,7 +5,7 @@
     <p:sldMasterId id="2147483648" r:id="rId1"/>
   </p:sldMasterIdLst>
   <p:notesMasterIdLst>
-    <p:notesMasterId r:id="rId21"/>
+    <p:notesMasterId r:id="rId23"/>
   </p:notesMasterIdLst>
   <p:sldIdLst>
     <p:sldId id="272" r:id="rId2"/>
@@ -17,16 +17,18 @@
     <p:sldId id="281" r:id="rId8"/>
     <p:sldId id="276" r:id="rId9"/>
     <p:sldId id="295" r:id="rId10"/>
-    <p:sldId id="294" r:id="rId11"/>
-    <p:sldId id="284" r:id="rId12"/>
-    <p:sldId id="285" r:id="rId13"/>
-    <p:sldId id="288" r:id="rId14"/>
-    <p:sldId id="286" r:id="rId15"/>
-    <p:sldId id="275" r:id="rId16"/>
-    <p:sldId id="278" r:id="rId17"/>
-    <p:sldId id="287" r:id="rId18"/>
-    <p:sldId id="289" r:id="rId19"/>
-    <p:sldId id="279" r:id="rId20"/>
+    <p:sldId id="284" r:id="rId11"/>
+    <p:sldId id="294" r:id="rId12"/>
+    <p:sldId id="297" r:id="rId13"/>
+    <p:sldId id="285" r:id="rId14"/>
+    <p:sldId id="298" r:id="rId15"/>
+    <p:sldId id="288" r:id="rId16"/>
+    <p:sldId id="286" r:id="rId17"/>
+    <p:sldId id="275" r:id="rId18"/>
+    <p:sldId id="278" r:id="rId19"/>
+    <p:sldId id="287" r:id="rId20"/>
+    <p:sldId id="289" r:id="rId21"/>
+    <p:sldId id="279" r:id="rId22"/>
   </p:sldIdLst>
   <p:sldSz cx="9144000" cy="6858000" type="screen4x3"/>
   <p:notesSz cx="6858000" cy="9144000"/>
@@ -380,7 +382,7 @@
     </p:spTree>
     <p:extLst>
       <p:ext uri="{BB962C8B-B14F-4D97-AF65-F5344CB8AC3E}">
-        <p14:creationId xmlns:p14="http://schemas.microsoft.com/office/powerpoint/2010/main" xmlns="" val="1746408167"/>
+        <p14:creationId xmlns="" xmlns:p14="http://schemas.microsoft.com/office/powerpoint/2010/main" val="1746408167"/>
       </p:ext>
     </p:extLst>
   </p:cSld>
@@ -3514,7 +3516,7 @@
     </p:spTree>
     <p:extLst>
       <p:ext uri="{BB962C8B-B14F-4D97-AF65-F5344CB8AC3E}">
-        <p14:creationId xmlns:p14="http://schemas.microsoft.com/office/powerpoint/2010/main" xmlns="" val="1917661024"/>
+        <p14:creationId xmlns="" xmlns:p14="http://schemas.microsoft.com/office/powerpoint/2010/main" val="1917661024"/>
       </p:ext>
     </p:extLst>
   </p:cSld>
@@ -3525,6 +3527,170 @@
 </file>
 
 <file path=ppt/slides/slide10.xml><?xml version="1.0" encoding="utf-8"?>
+<p:sld xmlns:a="http://schemas.openxmlformats.org/drawingml/2006/main" xmlns:r="http://schemas.openxmlformats.org/officeDocument/2006/relationships" xmlns:p="http://schemas.openxmlformats.org/presentationml/2006/main">
+  <p:cSld>
+    <p:spTree>
+      <p:nvGrpSpPr>
+        <p:cNvPr id="1" name=""/>
+        <p:cNvGrpSpPr/>
+        <p:nvPr/>
+      </p:nvGrpSpPr>
+      <p:grpSpPr>
+        <a:xfrm>
+          <a:off x="0" y="0"/>
+          <a:ext cx="0" cy="0"/>
+          <a:chOff x="0" y="0"/>
+          <a:chExt cx="0" cy="0"/>
+        </a:xfrm>
+      </p:grpSpPr>
+      <p:sp>
+        <p:nvSpPr>
+          <p:cNvPr id="2" name="Title 1"/>
+          <p:cNvSpPr>
+            <a:spLocks noGrp="1"/>
+          </p:cNvSpPr>
+          <p:nvPr>
+            <p:ph type="title"/>
+          </p:nvPr>
+        </p:nvSpPr>
+        <p:spPr/>
+        <p:txBody>
+          <a:bodyPr/>
+          <a:lstStyle/>
+          <a:p>
+            <a:r>
+              <a:rPr lang="da-DK" dirty="0" smtClean="0"/>
+              <a:t>Reduce Mechanical Steps</a:t>
+            </a:r>
+            <a:endParaRPr lang="da-DK" dirty="0"/>
+          </a:p>
+        </p:txBody>
+      </p:sp>
+      <p:sp>
+        <p:nvSpPr>
+          <p:cNvPr id="3" name="Content Placeholder 2"/>
+          <p:cNvSpPr>
+            <a:spLocks noGrp="1"/>
+          </p:cNvSpPr>
+          <p:nvPr>
+            <p:ph idx="1"/>
+          </p:nvPr>
+        </p:nvSpPr>
+        <p:spPr/>
+        <p:txBody>
+          <a:bodyPr>
+            <a:normAutofit fontScale="70000" lnSpcReduction="20000"/>
+          </a:bodyPr>
+          <a:lstStyle/>
+          <a:p>
+            <a:r>
+              <a:rPr lang="da-DK" dirty="0" smtClean="0"/>
+              <a:t>Raise abstraction for actions</a:t>
+            </a:r>
+          </a:p>
+          <a:p>
+            <a:pPr lvl="1"/>
+            <a:r>
+              <a:rPr lang="da-DK" dirty="0" smtClean="0"/>
+              <a:t>Working with code instead of text</a:t>
+            </a:r>
+          </a:p>
+          <a:p>
+            <a:pPr>
+              <a:buNone/>
+            </a:pPr>
+            <a:endParaRPr lang="da-DK" dirty="0" smtClean="0"/>
+          </a:p>
+          <a:p>
+            <a:r>
+              <a:rPr lang="da-DK" dirty="0" smtClean="0"/>
+              <a:t>Type: </a:t>
+            </a:r>
+            <a:r>
+              <a:rPr lang="da-DK" b="1" dirty="0" smtClean="0"/>
+              <a:t>public SomeClass(string text) { }</a:t>
+            </a:r>
+          </a:p>
+          <a:p>
+            <a:r>
+              <a:rPr lang="da-DK" dirty="0" smtClean="0"/>
+              <a:t>Type: </a:t>
+            </a:r>
+            <a:r>
+              <a:rPr lang="da-DK" b="1" dirty="0" smtClean="0"/>
+              <a:t>private string text;</a:t>
+            </a:r>
+          </a:p>
+          <a:p>
+            <a:r>
+              <a:rPr lang="da-DK" dirty="0" smtClean="0"/>
+              <a:t>Type: </a:t>
+            </a:r>
+            <a:r>
+              <a:rPr lang="da-DK" b="1" dirty="0" smtClean="0"/>
+              <a:t>this.text = text;</a:t>
+            </a:r>
+          </a:p>
+          <a:p>
+            <a:endParaRPr lang="da-DK" b="1" dirty="0" smtClean="0"/>
+          </a:p>
+          <a:p>
+            <a:pPr>
+              <a:buNone/>
+            </a:pPr>
+            <a:r>
+              <a:rPr lang="da-DK" b="1" dirty="0" smtClean="0"/>
+              <a:t>VS</a:t>
+            </a:r>
+          </a:p>
+          <a:p>
+            <a:pPr>
+              <a:buNone/>
+            </a:pPr>
+            <a:endParaRPr lang="da-DK" b="1" dirty="0" smtClean="0"/>
+          </a:p>
+          <a:p>
+            <a:r>
+              <a:rPr lang="da-DK" dirty="0" smtClean="0"/>
+              <a:t>Action: </a:t>
+            </a:r>
+            <a:r>
+              <a:rPr lang="da-DK" b="1" dirty="0" smtClean="0"/>
+              <a:t>Generate constructor</a:t>
+            </a:r>
+          </a:p>
+          <a:p>
+            <a:r>
+              <a:rPr lang="da-DK" dirty="0" smtClean="0"/>
+              <a:t>Type: </a:t>
+            </a:r>
+            <a:r>
+              <a:rPr lang="da-DK" b="1" dirty="0" smtClean="0"/>
+              <a:t>string text</a:t>
+            </a:r>
+          </a:p>
+          <a:p>
+            <a:r>
+              <a:rPr lang="da-DK" dirty="0" smtClean="0"/>
+              <a:t>Action: </a:t>
+            </a:r>
+            <a:r>
+              <a:rPr lang="da-DK" b="1" dirty="0" smtClean="0"/>
+              <a:t>Assign constructor parameter to field</a:t>
+            </a:r>
+            <a:endParaRPr lang="da-DK" b="1" dirty="0" smtClean="0"/>
+          </a:p>
+        </p:txBody>
+      </p:sp>
+    </p:spTree>
+  </p:cSld>
+  <p:clrMapOvr>
+    <a:masterClrMapping/>
+  </p:clrMapOvr>
+</p:sld>
+</file>
+
+<file path=ppt/slides/slide11.xml><?xml version="1.0" encoding="utf-8"?>
 <p:sld xmlns:a="http://schemas.openxmlformats.org/drawingml/2006/main" xmlns:r="http://schemas.openxmlformats.org/officeDocument/2006/relationships" xmlns:p="http://schemas.openxmlformats.org/presentationml/2006/main">
   <p:cSld>
     <p:bg>
@@ -3554,73 +3720,13 @@
   <p:clrMapOvr>
     <a:masterClrMapping/>
   </p:clrMapOvr>
-</p:sld>
-</file>
-
-<file path=ppt/slides/slide11.xml><?xml version="1.0" encoding="utf-8"?>
-<p:sld xmlns:a="http://schemas.openxmlformats.org/drawingml/2006/main" xmlns:r="http://schemas.openxmlformats.org/officeDocument/2006/relationships" xmlns:p="http://schemas.openxmlformats.org/presentationml/2006/main">
-  <p:cSld>
-    <p:spTree>
-      <p:nvGrpSpPr>
-        <p:cNvPr id="1" name=""/>
-        <p:cNvGrpSpPr/>
-        <p:nvPr/>
-      </p:nvGrpSpPr>
-      <p:grpSpPr>
-        <a:xfrm>
-          <a:off x="0" y="0"/>
-          <a:ext cx="0" cy="0"/>
-          <a:chOff x="0" y="0"/>
-          <a:chExt cx="0" cy="0"/>
-        </a:xfrm>
-      </p:grpSpPr>
-      <p:sp>
-        <p:nvSpPr>
-          <p:cNvPr id="2" name="Title 1"/>
-          <p:cNvSpPr>
-            <a:spLocks noGrp="1"/>
-          </p:cNvSpPr>
-          <p:nvPr>
-            <p:ph type="title"/>
-          </p:nvPr>
-        </p:nvSpPr>
-        <p:spPr/>
-        <p:txBody>
-          <a:bodyPr/>
-          <a:lstStyle/>
-          <a:p>
-            <a:r>
-              <a:rPr lang="da-DK" dirty="0" smtClean="0"/>
-              <a:t>Reduce Mechanical Steps</a:t>
-            </a:r>
-            <a:endParaRPr lang="da-DK" dirty="0"/>
-          </a:p>
-        </p:txBody>
-      </p:sp>
-      <p:sp>
-        <p:nvSpPr>
-          <p:cNvPr id="3" name="Content Placeholder 2"/>
-          <p:cNvSpPr>
-            <a:spLocks noGrp="1"/>
-          </p:cNvSpPr>
-          <p:nvPr>
-            <p:ph idx="1"/>
-          </p:nvPr>
-        </p:nvSpPr>
-        <p:spPr/>
-        <p:txBody>
-          <a:bodyPr/>
-          <a:lstStyle/>
-          <a:p>
-            <a:endParaRPr lang="da-DK" dirty="0"/>
-          </a:p>
-        </p:txBody>
-      </p:sp>
-    </p:spTree>
-  </p:cSld>
-  <p:clrMapOvr>
-    <a:masterClrMapping/>
-  </p:clrMapOvr>
+  <p:timing>
+    <p:tnLst>
+      <p:par>
+        <p:cTn id="1" dur="indefinite" restart="never" nodeType="tmRoot"/>
+      </p:par>
+    </p:tnLst>
+  </p:timing>
 </p:sld>
 </file>
 
@@ -3681,20 +3787,22 @@
           <a:p>
             <a:r>
               <a:rPr lang="da-DK" dirty="0" smtClean="0"/>
-              <a:t>Generate code</a:t>
+              <a:t>Quick Fix</a:t>
             </a:r>
           </a:p>
           <a:p>
             <a:endParaRPr lang="da-DK" dirty="0" smtClean="0"/>
           </a:p>
           <a:p>
+            <a:r>
+              <a:rPr lang="da-DK" dirty="0" smtClean="0"/>
+              <a:t>Create scaffolding for new code</a:t>
+            </a:r>
+          </a:p>
+          <a:p>
             <a:endParaRPr lang="da-DK" dirty="0" smtClean="0"/>
           </a:p>
           <a:p>
-            <a:r>
-              <a:rPr lang="da-DK" dirty="0" smtClean="0"/>
-              <a:t>Quick Fix</a:t>
-            </a:r>
             <a:endParaRPr lang="da-DK" dirty="0"/>
           </a:p>
         </p:txBody>
@@ -3741,7 +3849,7 @@
           <a:p>
             <a:r>
               <a:rPr lang="da-DK" dirty="0" smtClean="0"/>
-              <a:t>Refactor This!</a:t>
+              <a:t>Generate Code</a:t>
             </a:r>
             <a:endParaRPr lang="da-DK" dirty="0"/>
           </a:p>
@@ -3762,7 +3870,30 @@
           <a:bodyPr/>
           <a:lstStyle/>
           <a:p>
-            <a:endParaRPr lang="da-DK"/>
+            <a:r>
+              <a:rPr lang="da-DK" dirty="0" smtClean="0"/>
+              <a:t>Generate </a:t>
+            </a:r>
+            <a:r>
+              <a:rPr lang="da-DK" dirty="0" smtClean="0"/>
+              <a:t>code</a:t>
+            </a:r>
+          </a:p>
+          <a:p>
+            <a:endParaRPr lang="da-DK" dirty="0" smtClean="0"/>
+          </a:p>
+          <a:p>
+            <a:endParaRPr lang="da-DK" dirty="0" smtClean="0"/>
+          </a:p>
+          <a:p>
+            <a:endParaRPr lang="da-DK" dirty="0" smtClean="0"/>
+          </a:p>
+          <a:p>
+            <a:r>
+              <a:rPr lang="da-DK" dirty="0" smtClean="0"/>
+              <a:t>Generate file (Solution Explorer)</a:t>
+            </a:r>
+            <a:endParaRPr lang="da-DK" dirty="0" smtClean="0"/>
           </a:p>
         </p:txBody>
       </p:sp>
@@ -3777,6 +3908,14 @@
 <file path=ppt/slides/slide14.xml><?xml version="1.0" encoding="utf-8"?>
 <p:sld xmlns:a="http://schemas.openxmlformats.org/drawingml/2006/main" xmlns:r="http://schemas.openxmlformats.org/officeDocument/2006/relationships" xmlns:p="http://schemas.openxmlformats.org/presentationml/2006/main">
   <p:cSld>
+    <p:bg>
+      <p:bgPr>
+        <a:solidFill>
+          <a:schemeClr val="tx1"/>
+        </a:solidFill>
+        <a:effectLst/>
+      </p:bgPr>
+    </p:bg>
     <p:spTree>
       <p:nvGrpSpPr>
         <p:cNvPr id="1" name=""/>
@@ -3807,10 +3946,18 @@
           <a:lstStyle/>
           <a:p>
             <a:r>
-              <a:rPr lang="da-DK" dirty="0" smtClean="0"/>
-              <a:t>Completion Modes</a:t>
-            </a:r>
-            <a:endParaRPr lang="da-DK" dirty="0"/>
+              <a:rPr lang="da-DK" dirty="0" smtClean="0">
+                <a:solidFill>
+                  <a:schemeClr val="bg1"/>
+                </a:solidFill>
+              </a:rPr>
+              <a:t>Exercise:  Generate Code</a:t>
+            </a:r>
+            <a:endParaRPr lang="da-DK" dirty="0">
+              <a:solidFill>
+                <a:schemeClr val="bg1"/>
+              </a:solidFill>
+            </a:endParaRPr>
           </a:p>
         </p:txBody>
       </p:sp>
@@ -3826,41 +3973,94 @@
         </p:nvSpPr>
         <p:spPr/>
         <p:txBody>
-          <a:bodyPr/>
-          <a:lstStyle/>
-          <a:p>
-            <a:r>
-              <a:rPr lang="da-DK" dirty="0" smtClean="0"/>
-              <a:t>IntelliSense</a:t>
-            </a:r>
-          </a:p>
-          <a:p>
-            <a:endParaRPr lang="da-DK" dirty="0" smtClean="0"/>
-          </a:p>
-          <a:p>
-            <a:r>
-              <a:rPr lang="da-DK" dirty="0" smtClean="0"/>
-              <a:t>Import Completion</a:t>
-            </a:r>
-          </a:p>
-          <a:p>
-            <a:endParaRPr lang="da-DK" dirty="0" smtClean="0"/>
-          </a:p>
-          <a:p>
-            <a:r>
-              <a:rPr lang="da-DK" dirty="0" smtClean="0"/>
-              <a:t>Smart Completion</a:t>
-            </a:r>
-          </a:p>
-          <a:p>
-            <a:pPr>
-              <a:buNone/>
-            </a:pPr>
-            <a:r>
-              <a:rPr lang="da-DK" dirty="0" smtClean="0"/>
-              <a:t>	</a:t>
-            </a:r>
-            <a:endParaRPr lang="da-DK" dirty="0"/>
+          <a:bodyPr>
+            <a:normAutofit/>
+          </a:bodyPr>
+          <a:lstStyle/>
+          <a:p>
+            <a:endParaRPr lang="da-DK" dirty="0" smtClean="0">
+              <a:solidFill>
+                <a:schemeClr val="bg1"/>
+              </a:solidFill>
+            </a:endParaRPr>
+          </a:p>
+          <a:p>
+            <a:r>
+              <a:rPr lang="da-DK" dirty="0" smtClean="0">
+                <a:solidFill>
+                  <a:schemeClr val="bg1"/>
+                </a:solidFill>
+              </a:rPr>
+              <a:t>Quick fix</a:t>
+            </a:r>
+          </a:p>
+          <a:p>
+            <a:pPr lvl="1"/>
+            <a:r>
+              <a:rPr lang="da-DK" b="1" dirty="0" smtClean="0">
+                <a:solidFill>
+                  <a:schemeClr val="accent6"/>
+                </a:solidFill>
+              </a:rPr>
+              <a:t>Alt + Enter</a:t>
+            </a:r>
+            <a:endParaRPr lang="da-DK" dirty="0" smtClean="0">
+              <a:solidFill>
+                <a:schemeClr val="bg1"/>
+              </a:solidFill>
+            </a:endParaRPr>
+          </a:p>
+          <a:p>
+            <a:r>
+              <a:rPr lang="da-DK" dirty="0" smtClean="0">
+                <a:solidFill>
+                  <a:schemeClr val="bg1"/>
+                </a:solidFill>
+              </a:rPr>
+              <a:t>Generate code</a:t>
+            </a:r>
+            <a:endParaRPr lang="da-DK" dirty="0" smtClean="0">
+              <a:solidFill>
+                <a:schemeClr val="bg1"/>
+              </a:solidFill>
+            </a:endParaRPr>
+          </a:p>
+          <a:p>
+            <a:pPr lvl="1"/>
+            <a:r>
+              <a:rPr lang="da-DK" b="1" dirty="0" smtClean="0">
+                <a:solidFill>
+                  <a:schemeClr val="accent6"/>
+                </a:solidFill>
+              </a:rPr>
+              <a:t>Alt + Insert</a:t>
+            </a:r>
+            <a:endParaRPr lang="da-DK" b="1" dirty="0" smtClean="0">
+              <a:solidFill>
+                <a:schemeClr val="accent6"/>
+              </a:solidFill>
+            </a:endParaRPr>
+          </a:p>
+          <a:p>
+            <a:r>
+              <a:rPr lang="da-DK" dirty="0" smtClean="0">
+                <a:solidFill>
+                  <a:schemeClr val="bg1"/>
+                </a:solidFill>
+              </a:rPr>
+              <a:t>Generate file (Solution Explorer)</a:t>
+            </a:r>
+          </a:p>
+          <a:p>
+            <a:pPr lvl="1"/>
+            <a:r>
+              <a:rPr lang="da-DK" b="1" dirty="0" smtClean="0">
+                <a:solidFill>
+                  <a:schemeClr val="accent6"/>
+                </a:solidFill>
+              </a:rPr>
+              <a:t>Alt + Insert</a:t>
+            </a:r>
           </a:p>
         </p:txBody>
       </p:sp>
@@ -3869,6 +4069,13 @@
   <p:clrMapOvr>
     <a:masterClrMapping/>
   </p:clrMapOvr>
+  <p:timing>
+    <p:tnLst>
+      <p:par>
+        <p:cTn id="1" dur="indefinite" restart="never" nodeType="tmRoot"/>
+      </p:par>
+    </p:tnLst>
+  </p:timing>
 </p:sld>
 </file>
 
@@ -3901,14 +4108,12 @@
         </p:nvSpPr>
         <p:spPr/>
         <p:txBody>
-          <a:bodyPr>
-            <a:normAutofit/>
-          </a:bodyPr>
-          <a:lstStyle/>
-          <a:p>
-            <a:r>
-              <a:rPr lang="da-DK" dirty="0" smtClean="0"/>
-              <a:t>Usage Inspection</a:t>
+          <a:bodyPr/>
+          <a:lstStyle/>
+          <a:p>
+            <a:r>
+              <a:rPr lang="da-DK" dirty="0" smtClean="0"/>
+              <a:t>Refactor This!</a:t>
             </a:r>
             <a:endParaRPr lang="da-DK" dirty="0"/>
           </a:p>
@@ -3929,54 +4134,7 @@
           <a:bodyPr/>
           <a:lstStyle/>
           <a:p>
-            <a:r>
-              <a:rPr lang="da-DK" dirty="0" smtClean="0"/>
-              <a:t>Highlight symbols</a:t>
-            </a:r>
-          </a:p>
-          <a:p>
-            <a:pPr lvl="1"/>
-            <a:r>
-              <a:rPr lang="da-DK" dirty="0" smtClean="0"/>
-              <a:t>Single method or small class</a:t>
-            </a:r>
-          </a:p>
-          <a:p>
-            <a:pPr lvl="1"/>
-            <a:endParaRPr lang="da-DK" dirty="0" smtClean="0"/>
-          </a:p>
-          <a:p>
-            <a:r>
-              <a:rPr lang="da-DK" dirty="0" smtClean="0"/>
-              <a:t>Find usages</a:t>
-            </a:r>
-          </a:p>
-          <a:p>
-            <a:pPr lvl="1"/>
-            <a:r>
-              <a:rPr lang="da-DK" dirty="0" smtClean="0"/>
-              <a:t>Single public method or property</a:t>
-            </a:r>
-          </a:p>
-          <a:p>
-            <a:pPr lvl="1"/>
-            <a:endParaRPr lang="da-DK" dirty="0" smtClean="0"/>
-          </a:p>
-          <a:p>
-            <a:r>
-              <a:rPr lang="da-DK" dirty="0" smtClean="0"/>
-              <a:t>Method tracking</a:t>
-            </a:r>
-          </a:p>
-          <a:p>
-            <a:pPr lvl="1"/>
-            <a:r>
-              <a:rPr lang="da-DK" dirty="0" smtClean="0"/>
-              <a:t>Entire flows</a:t>
-            </a:r>
-          </a:p>
-          <a:p>
-            <a:endParaRPr lang="da-DK" dirty="0"/>
+            <a:endParaRPr lang="da-DK"/>
           </a:p>
         </p:txBody>
       </p:sp>
@@ -4022,7 +4180,7 @@
           <a:p>
             <a:r>
               <a:rPr lang="da-DK" dirty="0" smtClean="0"/>
-              <a:t>Navigating Hierarchies</a:t>
+              <a:t>Completion Modes</a:t>
             </a:r>
             <a:endParaRPr lang="da-DK" dirty="0"/>
           </a:p>
@@ -4045,41 +4203,36 @@
           <a:p>
             <a:r>
               <a:rPr lang="da-DK" dirty="0" smtClean="0"/>
-              <a:t>Type Hierarchy</a:t>
+              <a:t>IntelliSense</a:t>
             </a:r>
           </a:p>
           <a:p>
             <a:endParaRPr lang="da-DK" dirty="0" smtClean="0"/>
           </a:p>
           <a:p>
+            <a:r>
+              <a:rPr lang="da-DK" dirty="0" smtClean="0"/>
+              <a:t>Import Completion</a:t>
+            </a:r>
+          </a:p>
+          <a:p>
             <a:endParaRPr lang="da-DK" dirty="0" smtClean="0"/>
           </a:p>
           <a:p>
             <a:r>
               <a:rPr lang="da-DK" dirty="0" smtClean="0"/>
-              <a:t>Go to</a:t>
-            </a:r>
-          </a:p>
-          <a:p>
-            <a:pPr lvl="1"/>
-            <a:r>
-              <a:rPr lang="da-DK" dirty="0" smtClean="0"/>
-              <a:t>Declaration</a:t>
-            </a:r>
-          </a:p>
-          <a:p>
-            <a:pPr lvl="1"/>
-            <a:r>
-              <a:rPr lang="da-DK" dirty="0" smtClean="0"/>
-              <a:t>Base</a:t>
-            </a:r>
-          </a:p>
-          <a:p>
-            <a:pPr lvl="1"/>
-            <a:r>
-              <a:rPr lang="da-DK" dirty="0" smtClean="0"/>
-              <a:t>Derived</a:t>
-            </a:r>
+              <a:t>Smart Completion</a:t>
+            </a:r>
+          </a:p>
+          <a:p>
+            <a:pPr>
+              <a:buNone/>
+            </a:pPr>
+            <a:r>
+              <a:rPr lang="da-DK" dirty="0" smtClean="0"/>
+              <a:t>	</a:t>
+            </a:r>
+            <a:endParaRPr lang="da-DK" dirty="0"/>
           </a:p>
         </p:txBody>
       </p:sp>
@@ -4120,12 +4273,14 @@
         </p:nvSpPr>
         <p:spPr/>
         <p:txBody>
-          <a:bodyPr/>
-          <a:lstStyle/>
-          <a:p>
-            <a:r>
-              <a:rPr lang="da-DK" dirty="0" smtClean="0"/>
-              <a:t>Solution Explorer Refactorings</a:t>
+          <a:bodyPr>
+            <a:normAutofit/>
+          </a:bodyPr>
+          <a:lstStyle/>
+          <a:p>
+            <a:r>
+              <a:rPr lang="da-DK" dirty="0" smtClean="0"/>
+              <a:t>Usage Inspection</a:t>
             </a:r>
             <a:endParaRPr lang="da-DK" dirty="0"/>
           </a:p>
@@ -4148,26 +4303,51 @@
           <a:p>
             <a:r>
               <a:rPr lang="da-DK" dirty="0" smtClean="0"/>
-              <a:t>Move types into matching files</a:t>
-            </a:r>
-          </a:p>
-          <a:p>
+              <a:t>Highlight symbols</a:t>
+            </a:r>
+          </a:p>
+          <a:p>
+            <a:pPr lvl="1"/>
+            <a:r>
+              <a:rPr lang="da-DK" dirty="0" smtClean="0"/>
+              <a:t>Single method or small class</a:t>
+            </a:r>
+          </a:p>
+          <a:p>
+            <a:pPr lvl="1"/>
             <a:endParaRPr lang="da-DK" dirty="0" smtClean="0"/>
           </a:p>
           <a:p>
             <a:r>
               <a:rPr lang="da-DK" dirty="0" smtClean="0"/>
-              <a:t>Adjust namespaces</a:t>
-            </a:r>
-          </a:p>
-          <a:p>
+              <a:t>Find usages</a:t>
+            </a:r>
+          </a:p>
+          <a:p>
+            <a:pPr lvl="1"/>
+            <a:r>
+              <a:rPr lang="da-DK" dirty="0" smtClean="0"/>
+              <a:t>Single public method or property</a:t>
+            </a:r>
+          </a:p>
+          <a:p>
+            <a:pPr lvl="1"/>
             <a:endParaRPr lang="da-DK" dirty="0" smtClean="0"/>
           </a:p>
           <a:p>
             <a:r>
               <a:rPr lang="da-DK" dirty="0" smtClean="0"/>
-              <a:t>Move files into folder</a:t>
-            </a:r>
+              <a:t>Method tracking</a:t>
+            </a:r>
+          </a:p>
+          <a:p>
+            <a:pPr lvl="1"/>
+            <a:r>
+              <a:rPr lang="da-DK" dirty="0" smtClean="0"/>
+              <a:t>Entire flows</a:t>
+            </a:r>
+          </a:p>
+          <a:p>
             <a:endParaRPr lang="da-DK" dirty="0"/>
           </a:p>
         </p:txBody>
@@ -4214,7 +4394,7 @@
           <a:p>
             <a:r>
               <a:rPr lang="da-DK" dirty="0" smtClean="0"/>
-              <a:t>Move Code</a:t>
+              <a:t>Navigating Hierarchies</a:t>
             </a:r>
             <a:endParaRPr lang="da-DK" dirty="0"/>
           </a:p>
@@ -4235,7 +4415,43 @@
           <a:bodyPr/>
           <a:lstStyle/>
           <a:p>
-            <a:endParaRPr lang="da-DK" dirty="0"/>
+            <a:r>
+              <a:rPr lang="da-DK" dirty="0" smtClean="0"/>
+              <a:t>Type Hierarchy</a:t>
+            </a:r>
+          </a:p>
+          <a:p>
+            <a:endParaRPr lang="da-DK" dirty="0" smtClean="0"/>
+          </a:p>
+          <a:p>
+            <a:endParaRPr lang="da-DK" dirty="0" smtClean="0"/>
+          </a:p>
+          <a:p>
+            <a:r>
+              <a:rPr lang="da-DK" dirty="0" smtClean="0"/>
+              <a:t>Go to</a:t>
+            </a:r>
+          </a:p>
+          <a:p>
+            <a:pPr lvl="1"/>
+            <a:r>
+              <a:rPr lang="da-DK" dirty="0" smtClean="0"/>
+              <a:t>Declaration</a:t>
+            </a:r>
+          </a:p>
+          <a:p>
+            <a:pPr lvl="1"/>
+            <a:r>
+              <a:rPr lang="da-DK" dirty="0" smtClean="0"/>
+              <a:t>Base</a:t>
+            </a:r>
+          </a:p>
+          <a:p>
+            <a:pPr lvl="1"/>
+            <a:r>
+              <a:rPr lang="da-DK" dirty="0" smtClean="0"/>
+              <a:t>Derived</a:t>
+            </a:r>
           </a:p>
         </p:txBody>
       </p:sp>
@@ -4276,14 +4492,12 @@
         </p:nvSpPr>
         <p:spPr/>
         <p:txBody>
-          <a:bodyPr>
-            <a:normAutofit/>
-          </a:bodyPr>
-          <a:lstStyle/>
-          <a:p>
-            <a:r>
-              <a:rPr lang="da-DK" dirty="0" smtClean="0"/>
-              <a:t>Inspect This!</a:t>
+          <a:bodyPr/>
+          <a:lstStyle/>
+          <a:p>
+            <a:r>
+              <a:rPr lang="da-DK" dirty="0" smtClean="0"/>
+              <a:t>Solution Explorer Refactorings</a:t>
             </a:r>
             <a:endParaRPr lang="da-DK" dirty="0"/>
           </a:p>
@@ -4306,28 +4520,26 @@
           <a:p>
             <a:r>
               <a:rPr lang="da-DK" dirty="0" smtClean="0"/>
-              <a:t>Powerful analysis</a:t>
-            </a:r>
-          </a:p>
-          <a:p>
-            <a:pPr lvl="1"/>
-            <a:r>
-              <a:rPr lang="da-DK" dirty="0" smtClean="0"/>
-              <a:t>Values</a:t>
-            </a:r>
-          </a:p>
-          <a:p>
-            <a:pPr lvl="1"/>
-            <a:r>
-              <a:rPr lang="da-DK" dirty="0" smtClean="0"/>
-              <a:t>Methods</a:t>
+              <a:t>Move types into matching files</a:t>
             </a:r>
           </a:p>
           <a:p>
             <a:endParaRPr lang="da-DK" dirty="0" smtClean="0"/>
           </a:p>
           <a:p>
-            <a:pPr lvl="1"/>
+            <a:r>
+              <a:rPr lang="da-DK" dirty="0" smtClean="0"/>
+              <a:t>Adjust namespaces</a:t>
+            </a:r>
+          </a:p>
+          <a:p>
+            <a:endParaRPr lang="da-DK" dirty="0" smtClean="0"/>
+          </a:p>
+          <a:p>
+            <a:r>
+              <a:rPr lang="da-DK" dirty="0" smtClean="0"/>
+              <a:t>Move files into folder</a:t>
+            </a:r>
             <a:endParaRPr lang="da-DK" dirty="0"/>
           </a:p>
         </p:txBody>
@@ -4446,6 +4658,166 @@
       </p:par>
     </p:tnLst>
   </p:timing>
+</p:sld>
+</file>
+
+<file path=ppt/slides/slide20.xml><?xml version="1.0" encoding="utf-8"?>
+<p:sld xmlns:a="http://schemas.openxmlformats.org/drawingml/2006/main" xmlns:r="http://schemas.openxmlformats.org/officeDocument/2006/relationships" xmlns:p="http://schemas.openxmlformats.org/presentationml/2006/main">
+  <p:cSld>
+    <p:spTree>
+      <p:nvGrpSpPr>
+        <p:cNvPr id="1" name=""/>
+        <p:cNvGrpSpPr/>
+        <p:nvPr/>
+      </p:nvGrpSpPr>
+      <p:grpSpPr>
+        <a:xfrm>
+          <a:off x="0" y="0"/>
+          <a:ext cx="0" cy="0"/>
+          <a:chOff x="0" y="0"/>
+          <a:chExt cx="0" cy="0"/>
+        </a:xfrm>
+      </p:grpSpPr>
+      <p:sp>
+        <p:nvSpPr>
+          <p:cNvPr id="2" name="Title 1"/>
+          <p:cNvSpPr>
+            <a:spLocks noGrp="1"/>
+          </p:cNvSpPr>
+          <p:nvPr>
+            <p:ph type="title"/>
+          </p:nvPr>
+        </p:nvSpPr>
+        <p:spPr/>
+        <p:txBody>
+          <a:bodyPr/>
+          <a:lstStyle/>
+          <a:p>
+            <a:r>
+              <a:rPr lang="da-DK" dirty="0" smtClean="0"/>
+              <a:t>Move Code</a:t>
+            </a:r>
+            <a:endParaRPr lang="da-DK" dirty="0"/>
+          </a:p>
+        </p:txBody>
+      </p:sp>
+      <p:sp>
+        <p:nvSpPr>
+          <p:cNvPr id="3" name="Content Placeholder 2"/>
+          <p:cNvSpPr>
+            <a:spLocks noGrp="1"/>
+          </p:cNvSpPr>
+          <p:nvPr>
+            <p:ph idx="1"/>
+          </p:nvPr>
+        </p:nvSpPr>
+        <p:spPr/>
+        <p:txBody>
+          <a:bodyPr/>
+          <a:lstStyle/>
+          <a:p>
+            <a:endParaRPr lang="da-DK" dirty="0"/>
+          </a:p>
+        </p:txBody>
+      </p:sp>
+    </p:spTree>
+  </p:cSld>
+  <p:clrMapOvr>
+    <a:masterClrMapping/>
+  </p:clrMapOvr>
+</p:sld>
+</file>
+
+<file path=ppt/slides/slide21.xml><?xml version="1.0" encoding="utf-8"?>
+<p:sld xmlns:a="http://schemas.openxmlformats.org/drawingml/2006/main" xmlns:r="http://schemas.openxmlformats.org/officeDocument/2006/relationships" xmlns:p="http://schemas.openxmlformats.org/presentationml/2006/main">
+  <p:cSld>
+    <p:spTree>
+      <p:nvGrpSpPr>
+        <p:cNvPr id="1" name=""/>
+        <p:cNvGrpSpPr/>
+        <p:nvPr/>
+      </p:nvGrpSpPr>
+      <p:grpSpPr>
+        <a:xfrm>
+          <a:off x="0" y="0"/>
+          <a:ext cx="0" cy="0"/>
+          <a:chOff x="0" y="0"/>
+          <a:chExt cx="0" cy="0"/>
+        </a:xfrm>
+      </p:grpSpPr>
+      <p:sp>
+        <p:nvSpPr>
+          <p:cNvPr id="2" name="Title 1"/>
+          <p:cNvSpPr>
+            <a:spLocks noGrp="1"/>
+          </p:cNvSpPr>
+          <p:nvPr>
+            <p:ph type="title"/>
+          </p:nvPr>
+        </p:nvSpPr>
+        <p:spPr/>
+        <p:txBody>
+          <a:bodyPr>
+            <a:normAutofit/>
+          </a:bodyPr>
+          <a:lstStyle/>
+          <a:p>
+            <a:r>
+              <a:rPr lang="da-DK" dirty="0" smtClean="0"/>
+              <a:t>Inspect This!</a:t>
+            </a:r>
+            <a:endParaRPr lang="da-DK" dirty="0"/>
+          </a:p>
+        </p:txBody>
+      </p:sp>
+      <p:sp>
+        <p:nvSpPr>
+          <p:cNvPr id="3" name="Content Placeholder 2"/>
+          <p:cNvSpPr>
+            <a:spLocks noGrp="1"/>
+          </p:cNvSpPr>
+          <p:nvPr>
+            <p:ph idx="1"/>
+          </p:nvPr>
+        </p:nvSpPr>
+        <p:spPr/>
+        <p:txBody>
+          <a:bodyPr/>
+          <a:lstStyle/>
+          <a:p>
+            <a:r>
+              <a:rPr lang="da-DK" dirty="0" smtClean="0"/>
+              <a:t>Powerful analysis</a:t>
+            </a:r>
+          </a:p>
+          <a:p>
+            <a:pPr lvl="1"/>
+            <a:r>
+              <a:rPr lang="da-DK" dirty="0" smtClean="0"/>
+              <a:t>Values</a:t>
+            </a:r>
+          </a:p>
+          <a:p>
+            <a:pPr lvl="1"/>
+            <a:r>
+              <a:rPr lang="da-DK" dirty="0" smtClean="0"/>
+              <a:t>Methods</a:t>
+            </a:r>
+          </a:p>
+          <a:p>
+            <a:endParaRPr lang="da-DK" dirty="0" smtClean="0"/>
+          </a:p>
+          <a:p>
+            <a:pPr lvl="1"/>
+            <a:endParaRPr lang="da-DK" dirty="0"/>
+          </a:p>
+        </p:txBody>
+      </p:sp>
+    </p:spTree>
+  </p:cSld>
+  <p:clrMapOvr>
+    <a:masterClrMapping/>
+  </p:clrMapOvr>
 </p:sld>
 </file>
 
@@ -4834,7 +5206,7 @@
     </p:spTree>
     <p:extLst>
       <p:ext uri="{BB962C8B-B14F-4D97-AF65-F5344CB8AC3E}">
-        <p14:creationId xmlns:p14="http://schemas.microsoft.com/office/powerpoint/2010/main" xmlns="" val="1712164881"/>
+        <p14:creationId xmlns="" xmlns:p14="http://schemas.microsoft.com/office/powerpoint/2010/main" val="1712164881"/>
       </p:ext>
     </p:extLst>
   </p:cSld>
@@ -5420,7 +5792,7 @@
                   <a:schemeClr val="bg1"/>
                 </a:solidFill>
               </a:rPr>
-              <a:t>Exercise</a:t>
+              <a:t>Exercise: Go to...</a:t>
             </a:r>
             <a:endParaRPr lang="da-DK" dirty="0">
               <a:solidFill>
@@ -5442,7 +5814,9 @@
         </p:nvSpPr>
         <p:spPr/>
         <p:txBody>
-          <a:bodyPr/>
+          <a:bodyPr>
+            <a:normAutofit fontScale="92500" lnSpcReduction="20000"/>
+          </a:bodyPr>
           <a:lstStyle/>
           <a:p>
             <a:r>
@@ -5451,7 +5825,7 @@
                   <a:schemeClr val="bg1"/>
                 </a:solidFill>
               </a:rPr>
-              <a:t>Go to </a:t>
+              <a:t>Find </a:t>
             </a:r>
             <a:r>
               <a:rPr lang="da-DK" dirty="0" smtClean="0">
@@ -5459,7 +5833,15 @@
                   <a:schemeClr val="bg1"/>
                 </a:solidFill>
               </a:rPr>
-              <a:t>...</a:t>
+              <a:t>shortest key </a:t>
+            </a:r>
+            <a:r>
+              <a:rPr lang="da-DK" dirty="0" smtClean="0">
+                <a:solidFill>
+                  <a:schemeClr val="bg1"/>
+                </a:solidFill>
+              </a:rPr>
+              <a:t>sequence</a:t>
             </a:r>
           </a:p>
           <a:p>
@@ -5476,11 +5858,95 @@
                   <a:schemeClr val="bg1"/>
                 </a:solidFill>
               </a:rPr>
-              <a:t>Find shortest key sequence</a:t>
-            </a:r>
-            <a:endParaRPr lang="da-DK" dirty="0">
+              <a:t>Go to type</a:t>
+            </a:r>
+          </a:p>
+          <a:p>
+            <a:pPr lvl="1"/>
+            <a:r>
+              <a:rPr lang="da-DK" b="1" dirty="0" smtClean="0">
+                <a:solidFill>
+                  <a:schemeClr val="accent6"/>
+                </a:solidFill>
+              </a:rPr>
+              <a:t>Ctrl + T</a:t>
+            </a:r>
+          </a:p>
+          <a:p>
+            <a:r>
+              <a:rPr lang="da-DK" dirty="0" smtClean="0">
+                <a:solidFill>
+                  <a:schemeClr val="bg1"/>
+                </a:solidFill>
+              </a:rPr>
+              <a:t>Go to file</a:t>
+            </a:r>
+          </a:p>
+          <a:p>
+            <a:pPr lvl="1"/>
+            <a:r>
+              <a:rPr lang="da-DK" b="1" dirty="0" smtClean="0">
+                <a:solidFill>
+                  <a:schemeClr val="accent6"/>
+                </a:solidFill>
+              </a:rPr>
+              <a:t>Ctrl + Shift + T</a:t>
+            </a:r>
+            <a:endParaRPr lang="da-DK" b="1" dirty="0" smtClean="0">
               <a:solidFill>
-                <a:schemeClr val="bg1"/>
+                <a:schemeClr val="accent6"/>
+              </a:solidFill>
+            </a:endParaRPr>
+          </a:p>
+          <a:p>
+            <a:r>
+              <a:rPr lang="da-DK" dirty="0" smtClean="0">
+                <a:solidFill>
+                  <a:schemeClr val="bg1"/>
+                </a:solidFill>
+              </a:rPr>
+              <a:t>Go to symbol</a:t>
+            </a:r>
+          </a:p>
+          <a:p>
+            <a:pPr lvl="1"/>
+            <a:r>
+              <a:rPr lang="da-DK" b="1" dirty="0" smtClean="0">
+                <a:solidFill>
+                  <a:schemeClr val="accent6"/>
+                </a:solidFill>
+              </a:rPr>
+              <a:t>Alt + Shift + T</a:t>
+            </a:r>
+            <a:endParaRPr lang="da-DK" dirty="0" smtClean="0">
+              <a:solidFill>
+                <a:schemeClr val="accent6"/>
+              </a:solidFill>
+            </a:endParaRPr>
+          </a:p>
+          <a:p>
+            <a:r>
+              <a:rPr lang="da-DK" dirty="0" smtClean="0">
+                <a:solidFill>
+                  <a:schemeClr val="bg1"/>
+                </a:solidFill>
+              </a:rPr>
+              <a:t>Go to member</a:t>
+            </a:r>
+          </a:p>
+          <a:p>
+            <a:pPr lvl="1"/>
+            <a:r>
+              <a:rPr lang="da-DK" b="1" dirty="0" smtClean="0">
+                <a:solidFill>
+                  <a:schemeClr val="accent6"/>
+                </a:solidFill>
+              </a:rPr>
+              <a:t>Alt + &lt;</a:t>
+            </a:r>
+            <a:endParaRPr lang="da-DK" b="1" dirty="0">
+              <a:solidFill>
+                <a:schemeClr val="accent6"/>
               </a:solidFill>
             </a:endParaRPr>
           </a:p>
@@ -5622,7 +6088,7 @@
     </p:spTree>
     <p:extLst>
       <p:ext uri="{BB962C8B-B14F-4D97-AF65-F5344CB8AC3E}">
-        <p14:creationId xmlns:p14="http://schemas.microsoft.com/office/powerpoint/2010/main" xmlns="" val="1649822022"/>
+        <p14:creationId xmlns="" xmlns:p14="http://schemas.microsoft.com/office/powerpoint/2010/main" val="1649822022"/>
       </p:ext>
     </p:extLst>
   </p:cSld>
@@ -5693,18 +6159,13 @@
           <a:p>
             <a:r>
               <a:rPr lang="da-DK" dirty="0" smtClean="0"/>
-              <a:t>Contextual </a:t>
-            </a:r>
-            <a:r>
-              <a:rPr lang="da-DK" dirty="0" smtClean="0"/>
-              <a:t>help</a:t>
-            </a:r>
+              <a:t>Contextual help</a:t>
+            </a:r>
+          </a:p>
+          <a:p>
             <a:endParaRPr lang="da-DK" dirty="0" smtClean="0"/>
           </a:p>
           <a:p>
-            <a:endParaRPr lang="da-DK" dirty="0" smtClean="0"/>
-          </a:p>
-          <a:p>
             <a:r>
               <a:rPr lang="da-DK" dirty="0" smtClean="0"/>
               <a:t>Hints</a:t>
@@ -5727,14 +6188,12 @@
               <a:rPr lang="da-DK" dirty="0" smtClean="0"/>
               <a:t>Warnings</a:t>
             </a:r>
-            <a:endParaRPr lang="da-DK" dirty="0" smtClean="0"/>
           </a:p>
           <a:p>
             <a:r>
               <a:rPr lang="da-DK" dirty="0" smtClean="0"/>
               <a:t>Errors</a:t>
             </a:r>
-            <a:endParaRPr lang="da-DK" dirty="0" smtClean="0"/>
           </a:p>
           <a:p>
             <a:endParaRPr lang="da-DK" dirty="0" smtClean="0"/>
@@ -6029,20 +6488,38 @@
           <a:prstGeom prst="rect">
             <a:avLst/>
           </a:prstGeom>
-          <a:noFill/>
-          <a:ln w="9525">
-            <a:noFill/>
-            <a:miter lim="800000"/>
+          <a:ln>
             <a:headEnd/>
             <a:tailEnd/>
           </a:ln>
         </p:spPr>
+        <p:style>
+          <a:lnRef idx="2">
+            <a:schemeClr val="accent1"/>
+          </a:lnRef>
+          <a:fillRef idx="1">
+            <a:schemeClr val="lt1"/>
+          </a:fillRef>
+          <a:effectRef idx="0">
+            <a:schemeClr val="accent1"/>
+          </a:effectRef>
+          <a:fontRef idx="minor">
+            <a:schemeClr val="dk1"/>
+          </a:fontRef>
+        </p:style>
       </p:pic>
     </p:spTree>
   </p:cSld>
   <p:clrMapOvr>
     <a:masterClrMapping/>
   </p:clrMapOvr>
+  <p:timing>
+    <p:tnLst>
+      <p:par>
+        <p:cTn id="1" dur="indefinite" restart="never" nodeType="tmRoot"/>
+      </p:par>
+    </p:tnLst>
+  </p:timing>
 </p:sld>
 </file>
 
@@ -6092,7 +6569,7 @@
                   <a:schemeClr val="bg1"/>
                 </a:solidFill>
               </a:rPr>
-              <a:t>Exercise</a:t>
+              <a:t>Exercise:  Code Inspections</a:t>
             </a:r>
             <a:endParaRPr lang="da-DK" dirty="0">
               <a:solidFill>
@@ -6114,16 +6591,25 @@
         </p:nvSpPr>
         <p:spPr/>
         <p:txBody>
-          <a:bodyPr/>
-          <a:lstStyle/>
-          <a:p>
-            <a:r>
-              <a:rPr lang="da-DK" dirty="0" smtClean="0">
+          <a:bodyPr>
+            <a:normAutofit fontScale="92500" lnSpcReduction="10000"/>
+          </a:bodyPr>
+          <a:lstStyle/>
+          <a:p>
+            <a:endParaRPr lang="da-DK" b="1" dirty="0" smtClean="0">
+              <a:solidFill>
+                <a:schemeClr val="bg1"/>
+              </a:solidFill>
+            </a:endParaRPr>
+          </a:p>
+          <a:p>
+            <a:r>
+              <a:rPr lang="da-DK" b="1" dirty="0" smtClean="0">
                 <a:solidFill>
                   <a:schemeClr val="bg1"/>
                 </a:solidFill>
               </a:rPr>
-              <a:t>Code Inspections</a:t>
+              <a:t>CodeInspections.sln</a:t>
             </a:r>
           </a:p>
           <a:p>
@@ -6140,21 +6626,90 @@
                   <a:schemeClr val="bg1"/>
                 </a:solidFill>
               </a:rPr>
-              <a:t>Note: </a:t>
-            </a:r>
+              <a:t>Quick fix</a:t>
+            </a:r>
+          </a:p>
+          <a:p>
+            <a:pPr lvl="1"/>
             <a:r>
               <a:rPr lang="da-DK" b="1" dirty="0" smtClean="0">
                 <a:solidFill>
-                  <a:schemeClr val="bg1"/>
+                  <a:schemeClr val="accent6"/>
                 </a:solidFill>
               </a:rPr>
-              <a:t>CodeInspections.sln</a:t>
-            </a:r>
-            <a:endParaRPr lang="da-DK" b="1" dirty="0" smtClean="0">
+              <a:t>Alt + Enter</a:t>
+            </a:r>
+            <a:endParaRPr lang="da-DK" dirty="0" smtClean="0">
               <a:solidFill>
                 <a:schemeClr val="bg1"/>
               </a:solidFill>
             </a:endParaRPr>
+          </a:p>
+          <a:p>
+            <a:r>
+              <a:rPr lang="da-DK" dirty="0" smtClean="0">
+                <a:solidFill>
+                  <a:schemeClr val="bg1"/>
+                </a:solidFill>
+              </a:rPr>
+              <a:t>Go </a:t>
+            </a:r>
+            <a:r>
+              <a:rPr lang="da-DK" dirty="0" smtClean="0">
+                <a:solidFill>
+                  <a:schemeClr val="bg1"/>
+                </a:solidFill>
+              </a:rPr>
+              <a:t>to </a:t>
+            </a:r>
+            <a:r>
+              <a:rPr lang="da-DK" dirty="0" smtClean="0">
+                <a:solidFill>
+                  <a:schemeClr val="bg1"/>
+                </a:solidFill>
+              </a:rPr>
+              <a:t>next / previous </a:t>
+            </a:r>
+            <a:r>
+              <a:rPr lang="da-DK" dirty="0" smtClean="0">
+                <a:solidFill>
+                  <a:schemeClr val="bg1"/>
+                </a:solidFill>
+              </a:rPr>
+              <a:t>error</a:t>
+            </a:r>
+          </a:p>
+          <a:p>
+            <a:pPr lvl="1"/>
+            <a:r>
+              <a:rPr lang="da-DK" b="1" dirty="0" smtClean="0">
+                <a:solidFill>
+                  <a:schemeClr val="accent6"/>
+                </a:solidFill>
+              </a:rPr>
+              <a:t>Alt + Shift + PageDown / PageUp</a:t>
+            </a:r>
+          </a:p>
+          <a:p>
+            <a:r>
+              <a:rPr lang="da-DK" dirty="0" smtClean="0">
+                <a:solidFill>
+                  <a:schemeClr val="bg1"/>
+                </a:solidFill>
+              </a:rPr>
+              <a:t>Go to next / previous suggestion</a:t>
+            </a:r>
+          </a:p>
+          <a:p>
+            <a:pPr lvl="1"/>
+            <a:r>
+              <a:rPr lang="da-DK" b="1" dirty="0" smtClean="0">
+                <a:solidFill>
+                  <a:schemeClr val="accent6"/>
+                </a:solidFill>
+              </a:rPr>
+              <a:t>Alt + PageDown / PageUp</a:t>
+            </a:r>
           </a:p>
         </p:txBody>
       </p:sp>
@@ -6163,6 +6718,13 @@
   <p:clrMapOvr>
     <a:masterClrMapping/>
   </p:clrMapOvr>
+  <p:timing>
+    <p:tnLst>
+      <p:par>
+        <p:cTn id="1" dur="indefinite" restart="never" nodeType="tmRoot"/>
+      </p:par>
+    </p:tnLst>
+  </p:timing>
 </p:sld>
 </file>
 

</xml_diff>

<commit_message>
Finished generate code and refactor rename.
</commit_message>
<xml_diff>
--- a/Presentations/2 - Exercises - ReSharper Course.pptx
+++ b/Presentations/2 - Exercises - ReSharper Course.pptx
@@ -5,7 +5,7 @@
     <p:sldMasterId id="2147483648" r:id="rId1"/>
   </p:sldMasterIdLst>
   <p:notesMasterIdLst>
-    <p:notesMasterId r:id="rId23"/>
+    <p:notesMasterId r:id="rId31"/>
   </p:notesMasterIdLst>
   <p:sldIdLst>
     <p:sldId id="272" r:id="rId2"/>
@@ -18,17 +18,25 @@
     <p:sldId id="276" r:id="rId9"/>
     <p:sldId id="295" r:id="rId10"/>
     <p:sldId id="284" r:id="rId11"/>
-    <p:sldId id="294" r:id="rId12"/>
-    <p:sldId id="297" r:id="rId13"/>
-    <p:sldId id="285" r:id="rId14"/>
-    <p:sldId id="298" r:id="rId15"/>
-    <p:sldId id="288" r:id="rId16"/>
-    <p:sldId id="286" r:id="rId17"/>
-    <p:sldId id="275" r:id="rId18"/>
-    <p:sldId id="278" r:id="rId19"/>
-    <p:sldId id="287" r:id="rId20"/>
-    <p:sldId id="289" r:id="rId21"/>
-    <p:sldId id="279" r:id="rId22"/>
+    <p:sldId id="297" r:id="rId12"/>
+    <p:sldId id="285" r:id="rId13"/>
+    <p:sldId id="298" r:id="rId14"/>
+    <p:sldId id="288" r:id="rId15"/>
+    <p:sldId id="306" r:id="rId16"/>
+    <p:sldId id="299" r:id="rId17"/>
+    <p:sldId id="294" r:id="rId18"/>
+    <p:sldId id="286" r:id="rId19"/>
+    <p:sldId id="300" r:id="rId20"/>
+    <p:sldId id="275" r:id="rId21"/>
+    <p:sldId id="301" r:id="rId22"/>
+    <p:sldId id="278" r:id="rId23"/>
+    <p:sldId id="302" r:id="rId24"/>
+    <p:sldId id="287" r:id="rId25"/>
+    <p:sldId id="303" r:id="rId26"/>
+    <p:sldId id="289" r:id="rId27"/>
+    <p:sldId id="304" r:id="rId28"/>
+    <p:sldId id="279" r:id="rId29"/>
+    <p:sldId id="305" r:id="rId30"/>
   </p:sldIdLst>
   <p:sldSz cx="9144000" cy="6858000" type="screen4x3"/>
   <p:notesSz cx="6858000" cy="9144000"/>
@@ -382,7 +390,7 @@
     </p:spTree>
     <p:extLst>
       <p:ext uri="{BB962C8B-B14F-4D97-AF65-F5344CB8AC3E}">
-        <p14:creationId xmlns="" xmlns:p14="http://schemas.microsoft.com/office/powerpoint/2010/main" val="1746408167"/>
+        <p14:creationId xmlns:p14="http://schemas.microsoft.com/office/powerpoint/2010/main" xmlns="" val="1746408167"/>
       </p:ext>
     </p:extLst>
   </p:cSld>
@@ -480,6 +488,88 @@
     </a:lvl9pPr>
   </p:notesStyle>
 </p:notesMaster>
+</file>
+
+<file path=ppt/notesSlides/notesSlide1.xml><?xml version="1.0" encoding="utf-8"?>
+<p:notes xmlns:a="http://schemas.openxmlformats.org/drawingml/2006/main" xmlns:r="http://schemas.openxmlformats.org/officeDocument/2006/relationships" xmlns:p="http://schemas.openxmlformats.org/presentationml/2006/main">
+  <p:cSld>
+    <p:spTree>
+      <p:nvGrpSpPr>
+        <p:cNvPr id="1" name=""/>
+        <p:cNvGrpSpPr/>
+        <p:nvPr/>
+      </p:nvGrpSpPr>
+      <p:grpSpPr>
+        <a:xfrm>
+          <a:off x="0" y="0"/>
+          <a:ext cx="0" cy="0"/>
+          <a:chOff x="0" y="0"/>
+          <a:chExt cx="0" cy="0"/>
+        </a:xfrm>
+      </p:grpSpPr>
+      <p:sp>
+        <p:nvSpPr>
+          <p:cNvPr id="2" name="Slide Image Placeholder 1"/>
+          <p:cNvSpPr>
+            <a:spLocks noGrp="1" noRot="1" noChangeAspect="1"/>
+          </p:cNvSpPr>
+          <p:nvPr>
+            <p:ph type="sldImg"/>
+          </p:nvPr>
+        </p:nvSpPr>
+        <p:spPr/>
+      </p:sp>
+      <p:sp>
+        <p:nvSpPr>
+          <p:cNvPr id="3" name="Notes Placeholder 2"/>
+          <p:cNvSpPr>
+            <a:spLocks noGrp="1"/>
+          </p:cNvSpPr>
+          <p:nvPr>
+            <p:ph type="body" idx="1"/>
+          </p:nvPr>
+        </p:nvSpPr>
+        <p:spPr/>
+        <p:txBody>
+          <a:bodyPr>
+            <a:normAutofit/>
+          </a:bodyPr>
+          <a:lstStyle/>
+          <a:p>
+            <a:endParaRPr lang="da-DK" dirty="0"/>
+          </a:p>
+        </p:txBody>
+      </p:sp>
+      <p:sp>
+        <p:nvSpPr>
+          <p:cNvPr id="4" name="Slide Number Placeholder 3"/>
+          <p:cNvSpPr>
+            <a:spLocks noGrp="1"/>
+          </p:cNvSpPr>
+          <p:nvPr>
+            <p:ph type="sldNum" sz="quarter" idx="10"/>
+          </p:nvPr>
+        </p:nvSpPr>
+        <p:spPr/>
+        <p:txBody>
+          <a:bodyPr/>
+          <a:lstStyle/>
+          <a:p>
+            <a:fld id="{2E43D8CB-A428-4652-9379-FEB5A48D221E}" type="slidenum">
+              <a:rPr lang="da-DK" smtClean="0"/>
+              <a:pPr/>
+              <a:t>12</a:t>
+            </a:fld>
+            <a:endParaRPr lang="da-DK"/>
+          </a:p>
+        </p:txBody>
+      </p:sp>
+    </p:spTree>
+  </p:cSld>
+  <p:clrMapOvr>
+    <a:masterClrMapping/>
+  </p:clrMapOvr>
+</p:notes>
 </file>
 
 <file path=ppt/slideLayouts/slideLayout1.xml><?xml version="1.0" encoding="utf-8"?>
@@ -3516,7 +3606,7 @@
     </p:spTree>
     <p:extLst>
       <p:ext uri="{BB962C8B-B14F-4D97-AF65-F5344CB8AC3E}">
-        <p14:creationId xmlns="" xmlns:p14="http://schemas.microsoft.com/office/powerpoint/2010/main" val="1917661024"/>
+        <p14:creationId xmlns:p14="http://schemas.microsoft.com/office/powerpoint/2010/main" xmlns="" val="1917661024"/>
       </p:ext>
     </p:extLst>
   </p:cSld>
@@ -3678,7 +3768,6 @@
               <a:rPr lang="da-DK" b="1" dirty="0" smtClean="0"/>
               <a:t>Assign constructor parameter to field</a:t>
             </a:r>
-            <a:endParaRPr lang="da-DK" b="1" dirty="0" smtClean="0"/>
           </a:p>
         </p:txBody>
       </p:sp>
@@ -3691,6 +3780,1053 @@
 </file>
 
 <file path=ppt/slides/slide11.xml><?xml version="1.0" encoding="utf-8"?>
+<p:sld xmlns:a="http://schemas.openxmlformats.org/drawingml/2006/main" xmlns:r="http://schemas.openxmlformats.org/officeDocument/2006/relationships" xmlns:p="http://schemas.openxmlformats.org/presentationml/2006/main">
+  <p:cSld>
+    <p:spTree>
+      <p:nvGrpSpPr>
+        <p:cNvPr id="1" name=""/>
+        <p:cNvGrpSpPr/>
+        <p:nvPr/>
+      </p:nvGrpSpPr>
+      <p:grpSpPr>
+        <a:xfrm>
+          <a:off x="0" y="0"/>
+          <a:ext cx="0" cy="0"/>
+          <a:chOff x="0" y="0"/>
+          <a:chExt cx="0" cy="0"/>
+        </a:xfrm>
+      </p:grpSpPr>
+      <p:sp>
+        <p:nvSpPr>
+          <p:cNvPr id="2" name="Title 1"/>
+          <p:cNvSpPr>
+            <a:spLocks noGrp="1"/>
+          </p:cNvSpPr>
+          <p:nvPr>
+            <p:ph type="title"/>
+          </p:nvPr>
+        </p:nvSpPr>
+        <p:spPr/>
+        <p:txBody>
+          <a:bodyPr/>
+          <a:lstStyle/>
+          <a:p>
+            <a:r>
+              <a:rPr lang="da-DK" dirty="0" smtClean="0"/>
+              <a:t>Generate Code</a:t>
+            </a:r>
+            <a:endParaRPr lang="da-DK" dirty="0"/>
+          </a:p>
+        </p:txBody>
+      </p:sp>
+      <p:sp>
+        <p:nvSpPr>
+          <p:cNvPr id="3" name="Content Placeholder 2"/>
+          <p:cNvSpPr>
+            <a:spLocks noGrp="1"/>
+          </p:cNvSpPr>
+          <p:nvPr>
+            <p:ph idx="1"/>
+          </p:nvPr>
+        </p:nvSpPr>
+        <p:spPr/>
+        <p:txBody>
+          <a:bodyPr/>
+          <a:lstStyle/>
+          <a:p>
+            <a:r>
+              <a:rPr lang="da-DK" dirty="0" smtClean="0"/>
+              <a:t>Quick Fix</a:t>
+            </a:r>
+          </a:p>
+          <a:p>
+            <a:endParaRPr lang="da-DK" dirty="0" smtClean="0"/>
+          </a:p>
+          <a:p>
+            <a:r>
+              <a:rPr lang="da-DK" dirty="0" smtClean="0"/>
+              <a:t>Scaffolding new code</a:t>
+            </a:r>
+          </a:p>
+          <a:p>
+            <a:pPr lvl="1"/>
+            <a:r>
+              <a:rPr lang="da-DK" dirty="0" smtClean="0"/>
+              <a:t>Methods</a:t>
+            </a:r>
+          </a:p>
+          <a:p>
+            <a:pPr lvl="1"/>
+            <a:r>
+              <a:rPr lang="da-DK" dirty="0" smtClean="0"/>
+              <a:t>Variables</a:t>
+            </a:r>
+          </a:p>
+          <a:p>
+            <a:pPr lvl="1"/>
+            <a:r>
+              <a:rPr lang="da-DK" dirty="0" smtClean="0"/>
+              <a:t>Classes</a:t>
+            </a:r>
+            <a:endParaRPr lang="da-DK" dirty="0" smtClean="0"/>
+          </a:p>
+          <a:p>
+            <a:endParaRPr lang="da-DK" dirty="0" smtClean="0"/>
+          </a:p>
+          <a:p>
+            <a:endParaRPr lang="da-DK" dirty="0"/>
+          </a:p>
+        </p:txBody>
+      </p:sp>
+      <p:pic>
+        <p:nvPicPr>
+          <p:cNvPr id="1026" name="Picture 2"/>
+          <p:cNvPicPr>
+            <a:picLocks noChangeAspect="1" noChangeArrowheads="1"/>
+          </p:cNvPicPr>
+          <p:nvPr/>
+        </p:nvPicPr>
+        <p:blipFill>
+          <a:blip r:embed="rId2" cstate="print"/>
+          <a:srcRect/>
+          <a:stretch>
+            <a:fillRect/>
+          </a:stretch>
+        </p:blipFill>
+        <p:spPr bwMode="auto">
+          <a:xfrm>
+            <a:off x="3200400" y="4191000"/>
+            <a:ext cx="5428402" cy="2159528"/>
+          </a:xfrm>
+          <a:prstGeom prst="rect">
+            <a:avLst/>
+          </a:prstGeom>
+          <a:ln>
+            <a:headEnd/>
+            <a:tailEnd/>
+          </a:ln>
+        </p:spPr>
+        <p:style>
+          <a:lnRef idx="2">
+            <a:schemeClr val="accent1"/>
+          </a:lnRef>
+          <a:fillRef idx="1">
+            <a:schemeClr val="lt1"/>
+          </a:fillRef>
+          <a:effectRef idx="0">
+            <a:schemeClr val="accent1"/>
+          </a:effectRef>
+          <a:fontRef idx="minor">
+            <a:schemeClr val="dk1"/>
+          </a:fontRef>
+        </p:style>
+      </p:pic>
+    </p:spTree>
+  </p:cSld>
+  <p:clrMapOvr>
+    <a:masterClrMapping/>
+  </p:clrMapOvr>
+</p:sld>
+</file>
+
+<file path=ppt/slides/slide12.xml><?xml version="1.0" encoding="utf-8"?>
+<p:sld xmlns:a="http://schemas.openxmlformats.org/drawingml/2006/main" xmlns:r="http://schemas.openxmlformats.org/officeDocument/2006/relationships" xmlns:p="http://schemas.openxmlformats.org/presentationml/2006/main">
+  <p:cSld>
+    <p:spTree>
+      <p:nvGrpSpPr>
+        <p:cNvPr id="1" name=""/>
+        <p:cNvGrpSpPr/>
+        <p:nvPr/>
+      </p:nvGrpSpPr>
+      <p:grpSpPr>
+        <a:xfrm>
+          <a:off x="0" y="0"/>
+          <a:ext cx="0" cy="0"/>
+          <a:chOff x="0" y="0"/>
+          <a:chExt cx="0" cy="0"/>
+        </a:xfrm>
+      </p:grpSpPr>
+      <p:sp>
+        <p:nvSpPr>
+          <p:cNvPr id="2" name="Title 1"/>
+          <p:cNvSpPr>
+            <a:spLocks noGrp="1"/>
+          </p:cNvSpPr>
+          <p:nvPr>
+            <p:ph type="title"/>
+          </p:nvPr>
+        </p:nvSpPr>
+        <p:spPr/>
+        <p:txBody>
+          <a:bodyPr/>
+          <a:lstStyle/>
+          <a:p>
+            <a:r>
+              <a:rPr lang="da-DK" dirty="0" smtClean="0"/>
+              <a:t>Generate Code</a:t>
+            </a:r>
+            <a:endParaRPr lang="da-DK" dirty="0"/>
+          </a:p>
+        </p:txBody>
+      </p:sp>
+      <p:sp>
+        <p:nvSpPr>
+          <p:cNvPr id="3" name="Content Placeholder 2"/>
+          <p:cNvSpPr>
+            <a:spLocks noGrp="1"/>
+          </p:cNvSpPr>
+          <p:nvPr>
+            <p:ph idx="1"/>
+          </p:nvPr>
+        </p:nvSpPr>
+        <p:spPr/>
+        <p:txBody>
+          <a:bodyPr>
+            <a:normAutofit/>
+          </a:bodyPr>
+          <a:lstStyle/>
+          <a:p>
+            <a:r>
+              <a:rPr lang="da-DK" dirty="0" smtClean="0"/>
+              <a:t>Generate </a:t>
+            </a:r>
+            <a:r>
+              <a:rPr lang="da-DK" dirty="0" smtClean="0"/>
+              <a:t>code</a:t>
+            </a:r>
+          </a:p>
+          <a:p>
+            <a:pPr lvl="1"/>
+            <a:r>
+              <a:rPr lang="da-DK" dirty="0" smtClean="0"/>
+              <a:t>Interacts with fields</a:t>
+            </a:r>
+            <a:endParaRPr lang="da-DK" dirty="0" smtClean="0"/>
+          </a:p>
+          <a:p>
+            <a:endParaRPr lang="da-DK" dirty="0" smtClean="0"/>
+          </a:p>
+          <a:p>
+            <a:endParaRPr lang="da-DK" dirty="0" smtClean="0"/>
+          </a:p>
+          <a:p>
+            <a:r>
+              <a:rPr lang="da-DK" dirty="0" smtClean="0"/>
+              <a:t>Generate code</a:t>
+            </a:r>
+          </a:p>
+          <a:p>
+            <a:pPr lvl="1"/>
+            <a:r>
+              <a:rPr lang="da-DK" dirty="0" smtClean="0"/>
+              <a:t>Solution Explorer</a:t>
+            </a:r>
+            <a:endParaRPr lang="da-DK" dirty="0" smtClean="0"/>
+          </a:p>
+        </p:txBody>
+      </p:sp>
+      <p:pic>
+        <p:nvPicPr>
+          <p:cNvPr id="2050" name="Picture 2"/>
+          <p:cNvPicPr>
+            <a:picLocks noChangeAspect="1" noChangeArrowheads="1"/>
+          </p:cNvPicPr>
+          <p:nvPr/>
+        </p:nvPicPr>
+        <p:blipFill>
+          <a:blip r:embed="rId3" cstate="print"/>
+          <a:srcRect/>
+          <a:stretch>
+            <a:fillRect/>
+          </a:stretch>
+        </p:blipFill>
+        <p:spPr bwMode="auto">
+          <a:xfrm>
+            <a:off x="4267200" y="4267200"/>
+            <a:ext cx="2164251" cy="2265928"/>
+          </a:xfrm>
+          <a:prstGeom prst="rect">
+            <a:avLst/>
+          </a:prstGeom>
+          <a:ln>
+            <a:headEnd/>
+            <a:tailEnd/>
+          </a:ln>
+        </p:spPr>
+        <p:style>
+          <a:lnRef idx="2">
+            <a:schemeClr val="accent1"/>
+          </a:lnRef>
+          <a:fillRef idx="1">
+            <a:schemeClr val="lt1"/>
+          </a:fillRef>
+          <a:effectRef idx="0">
+            <a:schemeClr val="accent1"/>
+          </a:effectRef>
+          <a:fontRef idx="minor">
+            <a:schemeClr val="dk1"/>
+          </a:fontRef>
+        </p:style>
+      </p:pic>
+      <p:pic>
+        <p:nvPicPr>
+          <p:cNvPr id="2052" name="Picture 4"/>
+          <p:cNvPicPr>
+            <a:picLocks noChangeAspect="1" noChangeArrowheads="1"/>
+          </p:cNvPicPr>
+          <p:nvPr/>
+        </p:nvPicPr>
+        <p:blipFill>
+          <a:blip r:embed="rId4" cstate="print"/>
+          <a:srcRect/>
+          <a:stretch>
+            <a:fillRect/>
+          </a:stretch>
+        </p:blipFill>
+        <p:spPr bwMode="auto">
+          <a:xfrm>
+            <a:off x="6172200" y="1371600"/>
+            <a:ext cx="2505075" cy="3151120"/>
+          </a:xfrm>
+          <a:prstGeom prst="rect">
+            <a:avLst/>
+          </a:prstGeom>
+          <a:ln>
+            <a:headEnd/>
+            <a:tailEnd/>
+          </a:ln>
+        </p:spPr>
+        <p:style>
+          <a:lnRef idx="2">
+            <a:schemeClr val="accent1"/>
+          </a:lnRef>
+          <a:fillRef idx="1">
+            <a:schemeClr val="lt1"/>
+          </a:fillRef>
+          <a:effectRef idx="0">
+            <a:schemeClr val="accent1"/>
+          </a:effectRef>
+          <a:fontRef idx="minor">
+            <a:schemeClr val="dk1"/>
+          </a:fontRef>
+        </p:style>
+      </p:pic>
+    </p:spTree>
+  </p:cSld>
+  <p:clrMapOvr>
+    <a:masterClrMapping/>
+  </p:clrMapOvr>
+</p:sld>
+</file>
+
+<file path=ppt/slides/slide13.xml><?xml version="1.0" encoding="utf-8"?>
+<p:sld xmlns:a="http://schemas.openxmlformats.org/drawingml/2006/main" xmlns:r="http://schemas.openxmlformats.org/officeDocument/2006/relationships" xmlns:p="http://schemas.openxmlformats.org/presentationml/2006/main">
+  <p:cSld>
+    <p:bg>
+      <p:bgPr>
+        <a:solidFill>
+          <a:schemeClr val="tx1"/>
+        </a:solidFill>
+        <a:effectLst/>
+      </p:bgPr>
+    </p:bg>
+    <p:spTree>
+      <p:nvGrpSpPr>
+        <p:cNvPr id="1" name=""/>
+        <p:cNvGrpSpPr/>
+        <p:nvPr/>
+      </p:nvGrpSpPr>
+      <p:grpSpPr>
+        <a:xfrm>
+          <a:off x="0" y="0"/>
+          <a:ext cx="0" cy="0"/>
+          <a:chOff x="0" y="0"/>
+          <a:chExt cx="0" cy="0"/>
+        </a:xfrm>
+      </p:grpSpPr>
+      <p:sp>
+        <p:nvSpPr>
+          <p:cNvPr id="2" name="Title 1"/>
+          <p:cNvSpPr>
+            <a:spLocks noGrp="1"/>
+          </p:cNvSpPr>
+          <p:nvPr>
+            <p:ph type="title"/>
+          </p:nvPr>
+        </p:nvSpPr>
+        <p:spPr/>
+        <p:txBody>
+          <a:bodyPr/>
+          <a:lstStyle/>
+          <a:p>
+            <a:r>
+              <a:rPr lang="da-DK" dirty="0" smtClean="0">
+                <a:solidFill>
+                  <a:schemeClr val="bg1"/>
+                </a:solidFill>
+              </a:rPr>
+              <a:t>Exercise:  Generate Code</a:t>
+            </a:r>
+            <a:endParaRPr lang="da-DK" dirty="0">
+              <a:solidFill>
+                <a:schemeClr val="bg1"/>
+              </a:solidFill>
+            </a:endParaRPr>
+          </a:p>
+        </p:txBody>
+      </p:sp>
+      <p:sp>
+        <p:nvSpPr>
+          <p:cNvPr id="3" name="Content Placeholder 2"/>
+          <p:cNvSpPr>
+            <a:spLocks noGrp="1"/>
+          </p:cNvSpPr>
+          <p:nvPr>
+            <p:ph idx="1"/>
+          </p:nvPr>
+        </p:nvSpPr>
+        <p:spPr/>
+        <p:txBody>
+          <a:bodyPr>
+            <a:normAutofit/>
+          </a:bodyPr>
+          <a:lstStyle/>
+          <a:p>
+            <a:endParaRPr lang="da-DK" dirty="0" smtClean="0">
+              <a:solidFill>
+                <a:schemeClr val="bg1"/>
+              </a:solidFill>
+            </a:endParaRPr>
+          </a:p>
+          <a:p>
+            <a:r>
+              <a:rPr lang="da-DK" dirty="0" smtClean="0">
+                <a:solidFill>
+                  <a:schemeClr val="bg1"/>
+                </a:solidFill>
+              </a:rPr>
+              <a:t>Quick fix</a:t>
+            </a:r>
+          </a:p>
+          <a:p>
+            <a:pPr lvl="1"/>
+            <a:r>
+              <a:rPr lang="da-DK" b="1" dirty="0" smtClean="0">
+                <a:solidFill>
+                  <a:schemeClr val="accent6"/>
+                </a:solidFill>
+              </a:rPr>
+              <a:t>Alt + Enter</a:t>
+            </a:r>
+            <a:endParaRPr lang="da-DK" dirty="0" smtClean="0">
+              <a:solidFill>
+                <a:schemeClr val="bg1"/>
+              </a:solidFill>
+            </a:endParaRPr>
+          </a:p>
+          <a:p>
+            <a:endParaRPr lang="da-DK" dirty="0" smtClean="0">
+              <a:solidFill>
+                <a:schemeClr val="bg1"/>
+              </a:solidFill>
+            </a:endParaRPr>
+          </a:p>
+          <a:p>
+            <a:r>
+              <a:rPr lang="da-DK" dirty="0" smtClean="0">
+                <a:solidFill>
+                  <a:schemeClr val="bg1"/>
+                </a:solidFill>
+              </a:rPr>
+              <a:t>Generate </a:t>
+            </a:r>
+            <a:r>
+              <a:rPr lang="da-DK" dirty="0" smtClean="0">
+                <a:solidFill>
+                  <a:schemeClr val="bg1"/>
+                </a:solidFill>
+              </a:rPr>
+              <a:t>code</a:t>
+            </a:r>
+          </a:p>
+          <a:p>
+            <a:pPr lvl="1"/>
+            <a:r>
+              <a:rPr lang="da-DK" b="1" dirty="0" smtClean="0">
+                <a:solidFill>
+                  <a:schemeClr val="accent6"/>
+                </a:solidFill>
+              </a:rPr>
+              <a:t>Alt + </a:t>
+            </a:r>
+            <a:r>
+              <a:rPr lang="da-DK" b="1" dirty="0" smtClean="0">
+                <a:solidFill>
+                  <a:schemeClr val="accent6"/>
+                </a:solidFill>
+              </a:rPr>
+              <a:t>Insert</a:t>
+            </a:r>
+            <a:endParaRPr lang="da-DK" b="1" dirty="0" smtClean="0">
+              <a:solidFill>
+                <a:schemeClr val="accent6"/>
+              </a:solidFill>
+            </a:endParaRPr>
+          </a:p>
+        </p:txBody>
+      </p:sp>
+    </p:spTree>
+  </p:cSld>
+  <p:clrMapOvr>
+    <a:masterClrMapping/>
+  </p:clrMapOvr>
+  <p:timing>
+    <p:tnLst>
+      <p:par>
+        <p:cTn id="1" dur="indefinite" restart="never" nodeType="tmRoot"/>
+      </p:par>
+    </p:tnLst>
+  </p:timing>
+</p:sld>
+</file>
+
+<file path=ppt/slides/slide14.xml><?xml version="1.0" encoding="utf-8"?>
+<p:sld xmlns:a="http://schemas.openxmlformats.org/drawingml/2006/main" xmlns:r="http://schemas.openxmlformats.org/officeDocument/2006/relationships" xmlns:p="http://schemas.openxmlformats.org/presentationml/2006/main">
+  <p:cSld>
+    <p:spTree>
+      <p:nvGrpSpPr>
+        <p:cNvPr id="1" name=""/>
+        <p:cNvGrpSpPr/>
+        <p:nvPr/>
+      </p:nvGrpSpPr>
+      <p:grpSpPr>
+        <a:xfrm>
+          <a:off x="0" y="0"/>
+          <a:ext cx="0" cy="0"/>
+          <a:chOff x="0" y="0"/>
+          <a:chExt cx="0" cy="0"/>
+        </a:xfrm>
+      </p:grpSpPr>
+      <p:sp>
+        <p:nvSpPr>
+          <p:cNvPr id="2" name="Title 1"/>
+          <p:cNvSpPr>
+            <a:spLocks noGrp="1"/>
+          </p:cNvSpPr>
+          <p:nvPr>
+            <p:ph type="title"/>
+          </p:nvPr>
+        </p:nvSpPr>
+        <p:spPr/>
+        <p:txBody>
+          <a:bodyPr/>
+          <a:lstStyle/>
+          <a:p>
+            <a:r>
+              <a:rPr lang="da-DK" dirty="0" smtClean="0"/>
+              <a:t>Code Refactoring</a:t>
+            </a:r>
+            <a:endParaRPr lang="da-DK" dirty="0"/>
+          </a:p>
+        </p:txBody>
+      </p:sp>
+      <p:sp>
+        <p:nvSpPr>
+          <p:cNvPr id="3" name="Content Placeholder 2"/>
+          <p:cNvSpPr>
+            <a:spLocks noGrp="1"/>
+          </p:cNvSpPr>
+          <p:nvPr>
+            <p:ph idx="1"/>
+          </p:nvPr>
+        </p:nvSpPr>
+        <p:spPr/>
+        <p:txBody>
+          <a:bodyPr/>
+          <a:lstStyle/>
+          <a:p>
+            <a:r>
+              <a:rPr lang="da-DK" dirty="0" smtClean="0"/>
+              <a:t>Contextual refactoring</a:t>
+            </a:r>
+          </a:p>
+          <a:p>
+            <a:pPr lvl="1"/>
+            <a:r>
+              <a:rPr lang="da-DK" dirty="0" smtClean="0"/>
+              <a:t>Refactor this</a:t>
+            </a:r>
+            <a:endParaRPr lang="da-DK" dirty="0" smtClean="0"/>
+          </a:p>
+          <a:p>
+            <a:r>
+              <a:rPr lang="da-DK" dirty="0" smtClean="0"/>
+              <a:t>Based on selection or caret</a:t>
+            </a:r>
+            <a:endParaRPr lang="da-DK" dirty="0"/>
+          </a:p>
+        </p:txBody>
+      </p:sp>
+      <p:pic>
+        <p:nvPicPr>
+          <p:cNvPr id="4098" name="Picture 2"/>
+          <p:cNvPicPr>
+            <a:picLocks noChangeAspect="1" noChangeArrowheads="1"/>
+          </p:cNvPicPr>
+          <p:nvPr/>
+        </p:nvPicPr>
+        <p:blipFill>
+          <a:blip r:embed="rId2" cstate="print"/>
+          <a:srcRect/>
+          <a:stretch>
+            <a:fillRect/>
+          </a:stretch>
+        </p:blipFill>
+        <p:spPr bwMode="auto">
+          <a:xfrm>
+            <a:off x="5674518" y="2523743"/>
+            <a:ext cx="3088482" cy="3953257"/>
+          </a:xfrm>
+          <a:prstGeom prst="rect">
+            <a:avLst/>
+          </a:prstGeom>
+          <a:ln>
+            <a:headEnd/>
+            <a:tailEnd/>
+          </a:ln>
+        </p:spPr>
+        <p:style>
+          <a:lnRef idx="2">
+            <a:schemeClr val="accent1"/>
+          </a:lnRef>
+          <a:fillRef idx="1">
+            <a:schemeClr val="lt1"/>
+          </a:fillRef>
+          <a:effectRef idx="0">
+            <a:schemeClr val="accent1"/>
+          </a:effectRef>
+          <a:fontRef idx="minor">
+            <a:schemeClr val="dk1"/>
+          </a:fontRef>
+        </p:style>
+      </p:pic>
+      <p:pic>
+        <p:nvPicPr>
+          <p:cNvPr id="4099" name="Picture 3"/>
+          <p:cNvPicPr>
+            <a:picLocks noChangeAspect="1" noChangeArrowheads="1"/>
+          </p:cNvPicPr>
+          <p:nvPr/>
+        </p:nvPicPr>
+        <p:blipFill>
+          <a:blip r:embed="rId3" cstate="print"/>
+          <a:srcRect/>
+          <a:stretch>
+            <a:fillRect/>
+          </a:stretch>
+        </p:blipFill>
+        <p:spPr bwMode="auto">
+          <a:xfrm>
+            <a:off x="2286000" y="3657600"/>
+            <a:ext cx="2933272" cy="2878699"/>
+          </a:xfrm>
+          <a:prstGeom prst="rect">
+            <a:avLst/>
+          </a:prstGeom>
+          <a:ln>
+            <a:headEnd/>
+            <a:tailEnd/>
+          </a:ln>
+        </p:spPr>
+        <p:style>
+          <a:lnRef idx="2">
+            <a:schemeClr val="accent1"/>
+          </a:lnRef>
+          <a:fillRef idx="1">
+            <a:schemeClr val="lt1"/>
+          </a:fillRef>
+          <a:effectRef idx="0">
+            <a:schemeClr val="accent1"/>
+          </a:effectRef>
+          <a:fontRef idx="minor">
+            <a:schemeClr val="dk1"/>
+          </a:fontRef>
+        </p:style>
+      </p:pic>
+    </p:spTree>
+  </p:cSld>
+  <p:clrMapOvr>
+    <a:masterClrMapping/>
+  </p:clrMapOvr>
+</p:sld>
+</file>
+
+<file path=ppt/slides/slide15.xml><?xml version="1.0" encoding="utf-8"?>
+<p:sld xmlns:a="http://schemas.openxmlformats.org/drawingml/2006/main" xmlns:r="http://schemas.openxmlformats.org/officeDocument/2006/relationships" xmlns:p="http://schemas.openxmlformats.org/presentationml/2006/main">
+  <p:cSld>
+    <p:spTree>
+      <p:nvGrpSpPr>
+        <p:cNvPr id="1" name=""/>
+        <p:cNvGrpSpPr/>
+        <p:nvPr/>
+      </p:nvGrpSpPr>
+      <p:grpSpPr>
+        <a:xfrm>
+          <a:off x="0" y="0"/>
+          <a:ext cx="0" cy="0"/>
+          <a:chOff x="0" y="0"/>
+          <a:chExt cx="0" cy="0"/>
+        </a:xfrm>
+      </p:grpSpPr>
+      <p:sp>
+        <p:nvSpPr>
+          <p:cNvPr id="2" name="Title 1"/>
+          <p:cNvSpPr>
+            <a:spLocks noGrp="1"/>
+          </p:cNvSpPr>
+          <p:nvPr>
+            <p:ph type="title"/>
+          </p:nvPr>
+        </p:nvSpPr>
+        <p:spPr/>
+        <p:txBody>
+          <a:bodyPr/>
+          <a:lstStyle/>
+          <a:p>
+            <a:r>
+              <a:rPr lang="da-DK" dirty="0" smtClean="0"/>
+              <a:t>Refactor: Rename</a:t>
+            </a:r>
+            <a:endParaRPr lang="da-DK" dirty="0"/>
+          </a:p>
+        </p:txBody>
+      </p:sp>
+      <p:sp>
+        <p:nvSpPr>
+          <p:cNvPr id="3" name="Content Placeholder 2"/>
+          <p:cNvSpPr>
+            <a:spLocks noGrp="1"/>
+          </p:cNvSpPr>
+          <p:nvPr>
+            <p:ph idx="1"/>
+          </p:nvPr>
+        </p:nvSpPr>
+        <p:spPr/>
+        <p:txBody>
+          <a:bodyPr/>
+          <a:lstStyle/>
+          <a:p>
+            <a:r>
+              <a:rPr lang="da-DK" dirty="0" smtClean="0"/>
+              <a:t>Most basic refactoring</a:t>
+            </a:r>
+          </a:p>
+          <a:p>
+            <a:endParaRPr lang="da-DK" dirty="0" smtClean="0"/>
+          </a:p>
+          <a:p>
+            <a:r>
+              <a:rPr lang="da-DK" dirty="0" smtClean="0"/>
+              <a:t>Renames almost anything</a:t>
+            </a:r>
+          </a:p>
+          <a:p>
+            <a:endParaRPr lang="da-DK" dirty="0" smtClean="0"/>
+          </a:p>
+          <a:p>
+            <a:endParaRPr lang="da-DK" dirty="0" smtClean="0"/>
+          </a:p>
+          <a:p>
+            <a:endParaRPr lang="da-DK" dirty="0" smtClean="0"/>
+          </a:p>
+          <a:p>
+            <a:endParaRPr lang="da-DK" dirty="0" smtClean="0"/>
+          </a:p>
+        </p:txBody>
+      </p:sp>
+      <p:pic>
+        <p:nvPicPr>
+          <p:cNvPr id="5123" name="Picture 3"/>
+          <p:cNvPicPr>
+            <a:picLocks noChangeAspect="1" noChangeArrowheads="1"/>
+          </p:cNvPicPr>
+          <p:nvPr/>
+        </p:nvPicPr>
+        <p:blipFill>
+          <a:blip r:embed="rId2" cstate="print"/>
+          <a:srcRect/>
+          <a:stretch>
+            <a:fillRect/>
+          </a:stretch>
+        </p:blipFill>
+        <p:spPr bwMode="auto">
+          <a:xfrm>
+            <a:off x="4315692" y="4572000"/>
+            <a:ext cx="4485120" cy="1171575"/>
+          </a:xfrm>
+          <a:prstGeom prst="rect">
+            <a:avLst/>
+          </a:prstGeom>
+          <a:ln>
+            <a:headEnd/>
+            <a:tailEnd/>
+          </a:ln>
+        </p:spPr>
+        <p:style>
+          <a:lnRef idx="2">
+            <a:schemeClr val="accent1"/>
+          </a:lnRef>
+          <a:fillRef idx="1">
+            <a:schemeClr val="lt1"/>
+          </a:fillRef>
+          <a:effectRef idx="0">
+            <a:schemeClr val="accent1"/>
+          </a:effectRef>
+          <a:fontRef idx="minor">
+            <a:schemeClr val="dk1"/>
+          </a:fontRef>
+        </p:style>
+      </p:pic>
+      <p:pic>
+        <p:nvPicPr>
+          <p:cNvPr id="5124" name="Picture 4"/>
+          <p:cNvPicPr>
+            <a:picLocks noChangeAspect="1" noChangeArrowheads="1"/>
+          </p:cNvPicPr>
+          <p:nvPr/>
+        </p:nvPicPr>
+        <p:blipFill>
+          <a:blip r:embed="rId3" cstate="print"/>
+          <a:srcRect/>
+          <a:stretch>
+            <a:fillRect/>
+          </a:stretch>
+        </p:blipFill>
+        <p:spPr bwMode="auto">
+          <a:xfrm>
+            <a:off x="304800" y="4572000"/>
+            <a:ext cx="3562061" cy="1171575"/>
+          </a:xfrm>
+          <a:prstGeom prst="rect">
+            <a:avLst/>
+          </a:prstGeom>
+          <a:ln>
+            <a:headEnd/>
+            <a:tailEnd/>
+          </a:ln>
+        </p:spPr>
+        <p:style>
+          <a:lnRef idx="2">
+            <a:schemeClr val="accent1"/>
+          </a:lnRef>
+          <a:fillRef idx="1">
+            <a:schemeClr val="lt1"/>
+          </a:fillRef>
+          <a:effectRef idx="0">
+            <a:schemeClr val="accent1"/>
+          </a:effectRef>
+          <a:fontRef idx="minor">
+            <a:schemeClr val="dk1"/>
+          </a:fontRef>
+        </p:style>
+      </p:pic>
+    </p:spTree>
+  </p:cSld>
+  <p:clrMapOvr>
+    <a:masterClrMapping/>
+  </p:clrMapOvr>
+</p:sld>
+</file>
+
+<file path=ppt/slides/slide16.xml><?xml version="1.0" encoding="utf-8"?>
+<p:sld xmlns:a="http://schemas.openxmlformats.org/drawingml/2006/main" xmlns:r="http://schemas.openxmlformats.org/officeDocument/2006/relationships" xmlns:p="http://schemas.openxmlformats.org/presentationml/2006/main">
+  <p:cSld>
+    <p:bg>
+      <p:bgPr>
+        <a:solidFill>
+          <a:schemeClr val="tx1"/>
+        </a:solidFill>
+        <a:effectLst/>
+      </p:bgPr>
+    </p:bg>
+    <p:spTree>
+      <p:nvGrpSpPr>
+        <p:cNvPr id="1" name=""/>
+        <p:cNvGrpSpPr/>
+        <p:nvPr/>
+      </p:nvGrpSpPr>
+      <p:grpSpPr>
+        <a:xfrm>
+          <a:off x="0" y="0"/>
+          <a:ext cx="0" cy="0"/>
+          <a:chOff x="0" y="0"/>
+          <a:chExt cx="0" cy="0"/>
+        </a:xfrm>
+      </p:grpSpPr>
+      <p:sp>
+        <p:nvSpPr>
+          <p:cNvPr id="2" name="Title 1"/>
+          <p:cNvSpPr>
+            <a:spLocks noGrp="1"/>
+          </p:cNvSpPr>
+          <p:nvPr>
+            <p:ph type="title"/>
+          </p:nvPr>
+        </p:nvSpPr>
+        <p:spPr/>
+        <p:txBody>
+          <a:bodyPr/>
+          <a:lstStyle/>
+          <a:p>
+            <a:r>
+              <a:rPr lang="da-DK" dirty="0" smtClean="0">
+                <a:solidFill>
+                  <a:schemeClr val="bg1"/>
+                </a:solidFill>
+              </a:rPr>
+              <a:t>Exercise:  </a:t>
+            </a:r>
+            <a:r>
+              <a:rPr lang="da-DK" dirty="0" smtClean="0">
+                <a:solidFill>
+                  <a:schemeClr val="bg1"/>
+                </a:solidFill>
+              </a:rPr>
+              <a:t>Refactor - Rename</a:t>
+            </a:r>
+            <a:endParaRPr lang="da-DK" dirty="0">
+              <a:solidFill>
+                <a:schemeClr val="bg1"/>
+              </a:solidFill>
+            </a:endParaRPr>
+          </a:p>
+        </p:txBody>
+      </p:sp>
+      <p:sp>
+        <p:nvSpPr>
+          <p:cNvPr id="3" name="Content Placeholder 2"/>
+          <p:cNvSpPr>
+            <a:spLocks noGrp="1"/>
+          </p:cNvSpPr>
+          <p:nvPr>
+            <p:ph idx="1"/>
+          </p:nvPr>
+        </p:nvSpPr>
+        <p:spPr/>
+        <p:txBody>
+          <a:bodyPr>
+            <a:normAutofit/>
+          </a:bodyPr>
+          <a:lstStyle/>
+          <a:p>
+            <a:r>
+              <a:rPr lang="da-DK" dirty="0" smtClean="0">
+                <a:solidFill>
+                  <a:schemeClr val="bg1"/>
+                </a:solidFill>
+              </a:rPr>
+              <a:t>Cleaning up very bad variable names</a:t>
+            </a:r>
+            <a:endParaRPr lang="da-DK" dirty="0" smtClean="0">
+              <a:solidFill>
+                <a:schemeClr val="bg1"/>
+              </a:solidFill>
+            </a:endParaRPr>
+          </a:p>
+          <a:p>
+            <a:endParaRPr lang="da-DK" dirty="0" smtClean="0">
+              <a:solidFill>
+                <a:schemeClr val="bg1"/>
+              </a:solidFill>
+            </a:endParaRPr>
+          </a:p>
+          <a:p>
+            <a:r>
+              <a:rPr lang="da-DK" dirty="0" smtClean="0">
+                <a:solidFill>
+                  <a:schemeClr val="bg1"/>
+                </a:solidFill>
+              </a:rPr>
+              <a:t>Refactor this</a:t>
+            </a:r>
+            <a:endParaRPr lang="da-DK" dirty="0" smtClean="0">
+              <a:solidFill>
+                <a:schemeClr val="bg1"/>
+              </a:solidFill>
+            </a:endParaRPr>
+          </a:p>
+          <a:p>
+            <a:pPr lvl="1"/>
+            <a:r>
+              <a:rPr lang="da-DK" b="1" dirty="0" smtClean="0">
+                <a:solidFill>
+                  <a:schemeClr val="accent6"/>
+                </a:solidFill>
+              </a:rPr>
+              <a:t>Ctrl + Shift + R</a:t>
+            </a:r>
+            <a:endParaRPr lang="da-DK" dirty="0" smtClean="0">
+              <a:solidFill>
+                <a:schemeClr val="bg1"/>
+              </a:solidFill>
+            </a:endParaRPr>
+          </a:p>
+          <a:p>
+            <a:endParaRPr lang="da-DK" dirty="0" smtClean="0">
+              <a:solidFill>
+                <a:schemeClr val="bg1"/>
+              </a:solidFill>
+            </a:endParaRPr>
+          </a:p>
+          <a:p>
+            <a:r>
+              <a:rPr lang="da-DK" dirty="0" smtClean="0">
+                <a:solidFill>
+                  <a:schemeClr val="bg1"/>
+                </a:solidFill>
+              </a:rPr>
+              <a:t>Refactor: Rename</a:t>
+            </a:r>
+            <a:endParaRPr lang="da-DK" dirty="0" smtClean="0">
+              <a:solidFill>
+                <a:schemeClr val="bg1"/>
+              </a:solidFill>
+            </a:endParaRPr>
+          </a:p>
+          <a:p>
+            <a:pPr lvl="1"/>
+            <a:r>
+              <a:rPr lang="da-DK" b="1" dirty="0" smtClean="0">
+                <a:solidFill>
+                  <a:schemeClr val="accent6"/>
+                </a:solidFill>
+              </a:rPr>
+              <a:t>Ctrl + R, Ctrl + R</a:t>
+            </a:r>
+            <a:endParaRPr lang="da-DK" b="1" dirty="0" smtClean="0">
+              <a:solidFill>
+                <a:schemeClr val="accent6"/>
+              </a:solidFill>
+            </a:endParaRPr>
+          </a:p>
+        </p:txBody>
+      </p:sp>
+    </p:spTree>
+  </p:cSld>
+  <p:clrMapOvr>
+    <a:masterClrMapping/>
+  </p:clrMapOvr>
+  <p:timing>
+    <p:tnLst>
+      <p:par>
+        <p:cTn id="1" dur="indefinite" restart="never" nodeType="tmRoot"/>
+      </p:par>
+    </p:tnLst>
+  </p:timing>
+</p:sld>
+</file>
+
+<file path=ppt/slides/slide17.xml><?xml version="1.0" encoding="utf-8"?>
 <p:sld xmlns:a="http://schemas.openxmlformats.org/drawingml/2006/main" xmlns:r="http://schemas.openxmlformats.org/officeDocument/2006/relationships" xmlns:p="http://schemas.openxmlformats.org/presentationml/2006/main">
   <p:cSld>
     <p:bg>
@@ -3730,7 +4866,7 @@
 </p:sld>
 </file>
 
-<file path=ppt/slides/slide12.xml><?xml version="1.0" encoding="utf-8"?>
+<file path=ppt/slides/slide18.xml><?xml version="1.0" encoding="utf-8"?>
 <p:sld xmlns:a="http://schemas.openxmlformats.org/drawingml/2006/main" xmlns:r="http://schemas.openxmlformats.org/officeDocument/2006/relationships" xmlns:p="http://schemas.openxmlformats.org/presentationml/2006/main">
   <p:cSld>
     <p:spTree>
@@ -3764,7 +4900,7 @@
           <a:p>
             <a:r>
               <a:rPr lang="da-DK" dirty="0" smtClean="0"/>
-              <a:t>Generate Code</a:t>
+              <a:t>Completion Modes</a:t>
             </a:r>
             <a:endParaRPr lang="da-DK" dirty="0"/>
           </a:p>
@@ -3787,7 +4923,7 @@
           <a:p>
             <a:r>
               <a:rPr lang="da-DK" dirty="0" smtClean="0"/>
-              <a:t>Quick Fix</a:t>
+              <a:t>IntelliSense</a:t>
             </a:r>
           </a:p>
           <a:p>
@@ -3796,13 +4932,26 @@
           <a:p>
             <a:r>
               <a:rPr lang="da-DK" dirty="0" smtClean="0"/>
-              <a:t>Create scaffolding for new code</a:t>
+              <a:t>Import Completion</a:t>
             </a:r>
           </a:p>
           <a:p>
             <a:endParaRPr lang="da-DK" dirty="0" smtClean="0"/>
           </a:p>
           <a:p>
+            <a:r>
+              <a:rPr lang="da-DK" dirty="0" smtClean="0"/>
+              <a:t>Smart Completion</a:t>
+            </a:r>
+          </a:p>
+          <a:p>
+            <a:pPr>
+              <a:buNone/>
+            </a:pPr>
+            <a:r>
+              <a:rPr lang="da-DK" dirty="0" smtClean="0"/>
+              <a:t>	</a:t>
+            </a:r>
             <a:endParaRPr lang="da-DK" dirty="0"/>
           </a:p>
         </p:txBody>
@@ -3815,97 +4964,7 @@
 </p:sld>
 </file>
 
-<file path=ppt/slides/slide13.xml><?xml version="1.0" encoding="utf-8"?>
-<p:sld xmlns:a="http://schemas.openxmlformats.org/drawingml/2006/main" xmlns:r="http://schemas.openxmlformats.org/officeDocument/2006/relationships" xmlns:p="http://schemas.openxmlformats.org/presentationml/2006/main">
-  <p:cSld>
-    <p:spTree>
-      <p:nvGrpSpPr>
-        <p:cNvPr id="1" name=""/>
-        <p:cNvGrpSpPr/>
-        <p:nvPr/>
-      </p:nvGrpSpPr>
-      <p:grpSpPr>
-        <a:xfrm>
-          <a:off x="0" y="0"/>
-          <a:ext cx="0" cy="0"/>
-          <a:chOff x="0" y="0"/>
-          <a:chExt cx="0" cy="0"/>
-        </a:xfrm>
-      </p:grpSpPr>
-      <p:sp>
-        <p:nvSpPr>
-          <p:cNvPr id="2" name="Title 1"/>
-          <p:cNvSpPr>
-            <a:spLocks noGrp="1"/>
-          </p:cNvSpPr>
-          <p:nvPr>
-            <p:ph type="title"/>
-          </p:nvPr>
-        </p:nvSpPr>
-        <p:spPr/>
-        <p:txBody>
-          <a:bodyPr/>
-          <a:lstStyle/>
-          <a:p>
-            <a:r>
-              <a:rPr lang="da-DK" dirty="0" smtClean="0"/>
-              <a:t>Generate Code</a:t>
-            </a:r>
-            <a:endParaRPr lang="da-DK" dirty="0"/>
-          </a:p>
-        </p:txBody>
-      </p:sp>
-      <p:sp>
-        <p:nvSpPr>
-          <p:cNvPr id="3" name="Content Placeholder 2"/>
-          <p:cNvSpPr>
-            <a:spLocks noGrp="1"/>
-          </p:cNvSpPr>
-          <p:nvPr>
-            <p:ph idx="1"/>
-          </p:nvPr>
-        </p:nvSpPr>
-        <p:spPr/>
-        <p:txBody>
-          <a:bodyPr/>
-          <a:lstStyle/>
-          <a:p>
-            <a:r>
-              <a:rPr lang="da-DK" dirty="0" smtClean="0"/>
-              <a:t>Generate </a:t>
-            </a:r>
-            <a:r>
-              <a:rPr lang="da-DK" dirty="0" smtClean="0"/>
-              <a:t>code</a:t>
-            </a:r>
-          </a:p>
-          <a:p>
-            <a:endParaRPr lang="da-DK" dirty="0" smtClean="0"/>
-          </a:p>
-          <a:p>
-            <a:endParaRPr lang="da-DK" dirty="0" smtClean="0"/>
-          </a:p>
-          <a:p>
-            <a:endParaRPr lang="da-DK" dirty="0" smtClean="0"/>
-          </a:p>
-          <a:p>
-            <a:r>
-              <a:rPr lang="da-DK" dirty="0" smtClean="0"/>
-              <a:t>Generate file (Solution Explorer)</a:t>
-            </a:r>
-            <a:endParaRPr lang="da-DK" dirty="0" smtClean="0"/>
-          </a:p>
-        </p:txBody>
-      </p:sp>
-    </p:spTree>
-  </p:cSld>
-  <p:clrMapOvr>
-    <a:masterClrMapping/>
-  </p:clrMapOvr>
-</p:sld>
-</file>
-
-<file path=ppt/slides/slide14.xml><?xml version="1.0" encoding="utf-8"?>
+<file path=ppt/slides/slide19.xml><?xml version="1.0" encoding="utf-8"?>
 <p:sld xmlns:a="http://schemas.openxmlformats.org/drawingml/2006/main" xmlns:r="http://schemas.openxmlformats.org/officeDocument/2006/relationships" xmlns:p="http://schemas.openxmlformats.org/presentationml/2006/main">
   <p:cSld>
     <p:bg>
@@ -3942,7 +5001,9 @@
         </p:nvSpPr>
         <p:spPr/>
         <p:txBody>
-          <a:bodyPr/>
+          <a:bodyPr>
+            <a:normAutofit fontScale="90000"/>
+          </a:bodyPr>
           <a:lstStyle/>
           <a:p>
             <a:r>
@@ -3951,7 +5012,30 @@
                   <a:schemeClr val="bg1"/>
                 </a:solidFill>
               </a:rPr>
-              <a:t>Exercise:  Generate Code</a:t>
+              <a:t>Exercise:  </a:t>
+            </a:r>
+            <a:r>
+              <a:rPr lang="da-DK" dirty="0" smtClean="0">
+                <a:solidFill>
+                  <a:schemeClr val="bg1"/>
+                </a:solidFill>
+              </a:rPr>
+              <a:t>Variables </a:t>
+            </a:r>
+            <a:br>
+              <a:rPr lang="da-DK" dirty="0" smtClean="0">
+                <a:solidFill>
+                  <a:schemeClr val="bg1"/>
+                </a:solidFill>
+              </a:rPr>
+            </a:br>
+            <a:r>
+              <a:rPr lang="da-DK" dirty="0" smtClean="0">
+                <a:solidFill>
+                  <a:schemeClr val="bg1"/>
+                </a:solidFill>
+              </a:rPr>
+              <a:t>and Code Completion</a:t>
             </a:r>
             <a:endParaRPr lang="da-DK" dirty="0">
               <a:solidFill>
@@ -4011,14 +5095,6 @@
             </a:endParaRPr>
           </a:p>
           <a:p>
-            <a:r>
-              <a:rPr lang="da-DK" dirty="0" smtClean="0">
-                <a:solidFill>
-                  <a:schemeClr val="bg1"/>
-                </a:solidFill>
-              </a:rPr>
-              <a:t>Generate code</a:t>
-            </a:r>
             <a:endParaRPr lang="da-DK" dirty="0" smtClean="0">
               <a:solidFill>
                 <a:schemeClr val="bg1"/>
@@ -4026,6 +5102,24 @@
             </a:endParaRPr>
           </a:p>
           <a:p>
+            <a:r>
+              <a:rPr lang="da-DK" dirty="0" smtClean="0">
+                <a:solidFill>
+                  <a:schemeClr val="bg1"/>
+                </a:solidFill>
+              </a:rPr>
+              <a:t>Generate </a:t>
+            </a:r>
+            <a:r>
+              <a:rPr lang="da-DK" dirty="0" smtClean="0">
+                <a:solidFill>
+                  <a:schemeClr val="bg1"/>
+                </a:solidFill>
+              </a:rPr>
+              <a:t>code</a:t>
+            </a:r>
+          </a:p>
+          <a:p>
             <a:pPr lvl="1"/>
             <a:r>
               <a:rPr lang="da-DK" b="1" dirty="0" smtClean="0">
@@ -4033,34 +5127,21 @@
                   <a:schemeClr val="accent6"/>
                 </a:solidFill>
               </a:rPr>
-              <a:t>Alt + Insert</a:t>
+              <a:t>Alt + </a:t>
+            </a:r>
+            <a:r>
+              <a:rPr lang="da-DK" b="1" dirty="0" smtClean="0">
+                <a:solidFill>
+                  <a:schemeClr val="accent6"/>
+                </a:solidFill>
+              </a:rPr>
+              <a:t>Insert</a:t>
             </a:r>
             <a:endParaRPr lang="da-DK" b="1" dirty="0" smtClean="0">
               <a:solidFill>
                 <a:schemeClr val="accent6"/>
               </a:solidFill>
             </a:endParaRPr>
-          </a:p>
-          <a:p>
-            <a:r>
-              <a:rPr lang="da-DK" dirty="0" smtClean="0">
-                <a:solidFill>
-                  <a:schemeClr val="bg1"/>
-                </a:solidFill>
-              </a:rPr>
-              <a:t>Generate file (Solution Explorer)</a:t>
-            </a:r>
-          </a:p>
-          <a:p>
-            <a:pPr lvl="1"/>
-            <a:r>
-              <a:rPr lang="da-DK" b="1" dirty="0" smtClean="0">
-                <a:solidFill>
-                  <a:schemeClr val="accent6"/>
-                </a:solidFill>
-              </a:rPr>
-              <a:t>Alt + Insert</a:t>
-            </a:r>
           </a:p>
         </p:txBody>
       </p:sp>
@@ -4076,479 +5157,6 @@
       </p:par>
     </p:tnLst>
   </p:timing>
-</p:sld>
-</file>
-
-<file path=ppt/slides/slide15.xml><?xml version="1.0" encoding="utf-8"?>
-<p:sld xmlns:a="http://schemas.openxmlformats.org/drawingml/2006/main" xmlns:r="http://schemas.openxmlformats.org/officeDocument/2006/relationships" xmlns:p="http://schemas.openxmlformats.org/presentationml/2006/main">
-  <p:cSld>
-    <p:spTree>
-      <p:nvGrpSpPr>
-        <p:cNvPr id="1" name=""/>
-        <p:cNvGrpSpPr/>
-        <p:nvPr/>
-      </p:nvGrpSpPr>
-      <p:grpSpPr>
-        <a:xfrm>
-          <a:off x="0" y="0"/>
-          <a:ext cx="0" cy="0"/>
-          <a:chOff x="0" y="0"/>
-          <a:chExt cx="0" cy="0"/>
-        </a:xfrm>
-      </p:grpSpPr>
-      <p:sp>
-        <p:nvSpPr>
-          <p:cNvPr id="2" name="Title 1"/>
-          <p:cNvSpPr>
-            <a:spLocks noGrp="1"/>
-          </p:cNvSpPr>
-          <p:nvPr>
-            <p:ph type="title"/>
-          </p:nvPr>
-        </p:nvSpPr>
-        <p:spPr/>
-        <p:txBody>
-          <a:bodyPr/>
-          <a:lstStyle/>
-          <a:p>
-            <a:r>
-              <a:rPr lang="da-DK" dirty="0" smtClean="0"/>
-              <a:t>Refactor This!</a:t>
-            </a:r>
-            <a:endParaRPr lang="da-DK" dirty="0"/>
-          </a:p>
-        </p:txBody>
-      </p:sp>
-      <p:sp>
-        <p:nvSpPr>
-          <p:cNvPr id="3" name="Content Placeholder 2"/>
-          <p:cNvSpPr>
-            <a:spLocks noGrp="1"/>
-          </p:cNvSpPr>
-          <p:nvPr>
-            <p:ph idx="1"/>
-          </p:nvPr>
-        </p:nvSpPr>
-        <p:spPr/>
-        <p:txBody>
-          <a:bodyPr/>
-          <a:lstStyle/>
-          <a:p>
-            <a:endParaRPr lang="da-DK"/>
-          </a:p>
-        </p:txBody>
-      </p:sp>
-    </p:spTree>
-  </p:cSld>
-  <p:clrMapOvr>
-    <a:masterClrMapping/>
-  </p:clrMapOvr>
-</p:sld>
-</file>
-
-<file path=ppt/slides/slide16.xml><?xml version="1.0" encoding="utf-8"?>
-<p:sld xmlns:a="http://schemas.openxmlformats.org/drawingml/2006/main" xmlns:r="http://schemas.openxmlformats.org/officeDocument/2006/relationships" xmlns:p="http://schemas.openxmlformats.org/presentationml/2006/main">
-  <p:cSld>
-    <p:spTree>
-      <p:nvGrpSpPr>
-        <p:cNvPr id="1" name=""/>
-        <p:cNvGrpSpPr/>
-        <p:nvPr/>
-      </p:nvGrpSpPr>
-      <p:grpSpPr>
-        <a:xfrm>
-          <a:off x="0" y="0"/>
-          <a:ext cx="0" cy="0"/>
-          <a:chOff x="0" y="0"/>
-          <a:chExt cx="0" cy="0"/>
-        </a:xfrm>
-      </p:grpSpPr>
-      <p:sp>
-        <p:nvSpPr>
-          <p:cNvPr id="2" name="Title 1"/>
-          <p:cNvSpPr>
-            <a:spLocks noGrp="1"/>
-          </p:cNvSpPr>
-          <p:nvPr>
-            <p:ph type="title"/>
-          </p:nvPr>
-        </p:nvSpPr>
-        <p:spPr/>
-        <p:txBody>
-          <a:bodyPr/>
-          <a:lstStyle/>
-          <a:p>
-            <a:r>
-              <a:rPr lang="da-DK" dirty="0" smtClean="0"/>
-              <a:t>Completion Modes</a:t>
-            </a:r>
-            <a:endParaRPr lang="da-DK" dirty="0"/>
-          </a:p>
-        </p:txBody>
-      </p:sp>
-      <p:sp>
-        <p:nvSpPr>
-          <p:cNvPr id="3" name="Content Placeholder 2"/>
-          <p:cNvSpPr>
-            <a:spLocks noGrp="1"/>
-          </p:cNvSpPr>
-          <p:nvPr>
-            <p:ph idx="1"/>
-          </p:nvPr>
-        </p:nvSpPr>
-        <p:spPr/>
-        <p:txBody>
-          <a:bodyPr/>
-          <a:lstStyle/>
-          <a:p>
-            <a:r>
-              <a:rPr lang="da-DK" dirty="0" smtClean="0"/>
-              <a:t>IntelliSense</a:t>
-            </a:r>
-          </a:p>
-          <a:p>
-            <a:endParaRPr lang="da-DK" dirty="0" smtClean="0"/>
-          </a:p>
-          <a:p>
-            <a:r>
-              <a:rPr lang="da-DK" dirty="0" smtClean="0"/>
-              <a:t>Import Completion</a:t>
-            </a:r>
-          </a:p>
-          <a:p>
-            <a:endParaRPr lang="da-DK" dirty="0" smtClean="0"/>
-          </a:p>
-          <a:p>
-            <a:r>
-              <a:rPr lang="da-DK" dirty="0" smtClean="0"/>
-              <a:t>Smart Completion</a:t>
-            </a:r>
-          </a:p>
-          <a:p>
-            <a:pPr>
-              <a:buNone/>
-            </a:pPr>
-            <a:r>
-              <a:rPr lang="da-DK" dirty="0" smtClean="0"/>
-              <a:t>	</a:t>
-            </a:r>
-            <a:endParaRPr lang="da-DK" dirty="0"/>
-          </a:p>
-        </p:txBody>
-      </p:sp>
-    </p:spTree>
-  </p:cSld>
-  <p:clrMapOvr>
-    <a:masterClrMapping/>
-  </p:clrMapOvr>
-</p:sld>
-</file>
-
-<file path=ppt/slides/slide17.xml><?xml version="1.0" encoding="utf-8"?>
-<p:sld xmlns:a="http://schemas.openxmlformats.org/drawingml/2006/main" xmlns:r="http://schemas.openxmlformats.org/officeDocument/2006/relationships" xmlns:p="http://schemas.openxmlformats.org/presentationml/2006/main">
-  <p:cSld>
-    <p:spTree>
-      <p:nvGrpSpPr>
-        <p:cNvPr id="1" name=""/>
-        <p:cNvGrpSpPr/>
-        <p:nvPr/>
-      </p:nvGrpSpPr>
-      <p:grpSpPr>
-        <a:xfrm>
-          <a:off x="0" y="0"/>
-          <a:ext cx="0" cy="0"/>
-          <a:chOff x="0" y="0"/>
-          <a:chExt cx="0" cy="0"/>
-        </a:xfrm>
-      </p:grpSpPr>
-      <p:sp>
-        <p:nvSpPr>
-          <p:cNvPr id="2" name="Title 1"/>
-          <p:cNvSpPr>
-            <a:spLocks noGrp="1"/>
-          </p:cNvSpPr>
-          <p:nvPr>
-            <p:ph type="title"/>
-          </p:nvPr>
-        </p:nvSpPr>
-        <p:spPr/>
-        <p:txBody>
-          <a:bodyPr>
-            <a:normAutofit/>
-          </a:bodyPr>
-          <a:lstStyle/>
-          <a:p>
-            <a:r>
-              <a:rPr lang="da-DK" dirty="0" smtClean="0"/>
-              <a:t>Usage Inspection</a:t>
-            </a:r>
-            <a:endParaRPr lang="da-DK" dirty="0"/>
-          </a:p>
-        </p:txBody>
-      </p:sp>
-      <p:sp>
-        <p:nvSpPr>
-          <p:cNvPr id="3" name="Content Placeholder 2"/>
-          <p:cNvSpPr>
-            <a:spLocks noGrp="1"/>
-          </p:cNvSpPr>
-          <p:nvPr>
-            <p:ph idx="1"/>
-          </p:nvPr>
-        </p:nvSpPr>
-        <p:spPr/>
-        <p:txBody>
-          <a:bodyPr/>
-          <a:lstStyle/>
-          <a:p>
-            <a:r>
-              <a:rPr lang="da-DK" dirty="0" smtClean="0"/>
-              <a:t>Highlight symbols</a:t>
-            </a:r>
-          </a:p>
-          <a:p>
-            <a:pPr lvl="1"/>
-            <a:r>
-              <a:rPr lang="da-DK" dirty="0" smtClean="0"/>
-              <a:t>Single method or small class</a:t>
-            </a:r>
-          </a:p>
-          <a:p>
-            <a:pPr lvl="1"/>
-            <a:endParaRPr lang="da-DK" dirty="0" smtClean="0"/>
-          </a:p>
-          <a:p>
-            <a:r>
-              <a:rPr lang="da-DK" dirty="0" smtClean="0"/>
-              <a:t>Find usages</a:t>
-            </a:r>
-          </a:p>
-          <a:p>
-            <a:pPr lvl="1"/>
-            <a:r>
-              <a:rPr lang="da-DK" dirty="0" smtClean="0"/>
-              <a:t>Single public method or property</a:t>
-            </a:r>
-          </a:p>
-          <a:p>
-            <a:pPr lvl="1"/>
-            <a:endParaRPr lang="da-DK" dirty="0" smtClean="0"/>
-          </a:p>
-          <a:p>
-            <a:r>
-              <a:rPr lang="da-DK" dirty="0" smtClean="0"/>
-              <a:t>Method tracking</a:t>
-            </a:r>
-          </a:p>
-          <a:p>
-            <a:pPr lvl="1"/>
-            <a:r>
-              <a:rPr lang="da-DK" dirty="0" smtClean="0"/>
-              <a:t>Entire flows</a:t>
-            </a:r>
-          </a:p>
-          <a:p>
-            <a:endParaRPr lang="da-DK" dirty="0"/>
-          </a:p>
-        </p:txBody>
-      </p:sp>
-    </p:spTree>
-  </p:cSld>
-  <p:clrMapOvr>
-    <a:masterClrMapping/>
-  </p:clrMapOvr>
-</p:sld>
-</file>
-
-<file path=ppt/slides/slide18.xml><?xml version="1.0" encoding="utf-8"?>
-<p:sld xmlns:a="http://schemas.openxmlformats.org/drawingml/2006/main" xmlns:r="http://schemas.openxmlformats.org/officeDocument/2006/relationships" xmlns:p="http://schemas.openxmlformats.org/presentationml/2006/main">
-  <p:cSld>
-    <p:spTree>
-      <p:nvGrpSpPr>
-        <p:cNvPr id="1" name=""/>
-        <p:cNvGrpSpPr/>
-        <p:nvPr/>
-      </p:nvGrpSpPr>
-      <p:grpSpPr>
-        <a:xfrm>
-          <a:off x="0" y="0"/>
-          <a:ext cx="0" cy="0"/>
-          <a:chOff x="0" y="0"/>
-          <a:chExt cx="0" cy="0"/>
-        </a:xfrm>
-      </p:grpSpPr>
-      <p:sp>
-        <p:nvSpPr>
-          <p:cNvPr id="2" name="Title 1"/>
-          <p:cNvSpPr>
-            <a:spLocks noGrp="1"/>
-          </p:cNvSpPr>
-          <p:nvPr>
-            <p:ph type="title"/>
-          </p:nvPr>
-        </p:nvSpPr>
-        <p:spPr/>
-        <p:txBody>
-          <a:bodyPr/>
-          <a:lstStyle/>
-          <a:p>
-            <a:r>
-              <a:rPr lang="da-DK" dirty="0" smtClean="0"/>
-              <a:t>Navigating Hierarchies</a:t>
-            </a:r>
-            <a:endParaRPr lang="da-DK" dirty="0"/>
-          </a:p>
-        </p:txBody>
-      </p:sp>
-      <p:sp>
-        <p:nvSpPr>
-          <p:cNvPr id="3" name="Content Placeholder 2"/>
-          <p:cNvSpPr>
-            <a:spLocks noGrp="1"/>
-          </p:cNvSpPr>
-          <p:nvPr>
-            <p:ph idx="1"/>
-          </p:nvPr>
-        </p:nvSpPr>
-        <p:spPr/>
-        <p:txBody>
-          <a:bodyPr/>
-          <a:lstStyle/>
-          <a:p>
-            <a:r>
-              <a:rPr lang="da-DK" dirty="0" smtClean="0"/>
-              <a:t>Type Hierarchy</a:t>
-            </a:r>
-          </a:p>
-          <a:p>
-            <a:endParaRPr lang="da-DK" dirty="0" smtClean="0"/>
-          </a:p>
-          <a:p>
-            <a:endParaRPr lang="da-DK" dirty="0" smtClean="0"/>
-          </a:p>
-          <a:p>
-            <a:r>
-              <a:rPr lang="da-DK" dirty="0" smtClean="0"/>
-              <a:t>Go to</a:t>
-            </a:r>
-          </a:p>
-          <a:p>
-            <a:pPr lvl="1"/>
-            <a:r>
-              <a:rPr lang="da-DK" dirty="0" smtClean="0"/>
-              <a:t>Declaration</a:t>
-            </a:r>
-          </a:p>
-          <a:p>
-            <a:pPr lvl="1"/>
-            <a:r>
-              <a:rPr lang="da-DK" dirty="0" smtClean="0"/>
-              <a:t>Base</a:t>
-            </a:r>
-          </a:p>
-          <a:p>
-            <a:pPr lvl="1"/>
-            <a:r>
-              <a:rPr lang="da-DK" dirty="0" smtClean="0"/>
-              <a:t>Derived</a:t>
-            </a:r>
-          </a:p>
-        </p:txBody>
-      </p:sp>
-    </p:spTree>
-  </p:cSld>
-  <p:clrMapOvr>
-    <a:masterClrMapping/>
-  </p:clrMapOvr>
-</p:sld>
-</file>
-
-<file path=ppt/slides/slide19.xml><?xml version="1.0" encoding="utf-8"?>
-<p:sld xmlns:a="http://schemas.openxmlformats.org/drawingml/2006/main" xmlns:r="http://schemas.openxmlformats.org/officeDocument/2006/relationships" xmlns:p="http://schemas.openxmlformats.org/presentationml/2006/main">
-  <p:cSld>
-    <p:spTree>
-      <p:nvGrpSpPr>
-        <p:cNvPr id="1" name=""/>
-        <p:cNvGrpSpPr/>
-        <p:nvPr/>
-      </p:nvGrpSpPr>
-      <p:grpSpPr>
-        <a:xfrm>
-          <a:off x="0" y="0"/>
-          <a:ext cx="0" cy="0"/>
-          <a:chOff x="0" y="0"/>
-          <a:chExt cx="0" cy="0"/>
-        </a:xfrm>
-      </p:grpSpPr>
-      <p:sp>
-        <p:nvSpPr>
-          <p:cNvPr id="2" name="Title 1"/>
-          <p:cNvSpPr>
-            <a:spLocks noGrp="1"/>
-          </p:cNvSpPr>
-          <p:nvPr>
-            <p:ph type="title"/>
-          </p:nvPr>
-        </p:nvSpPr>
-        <p:spPr/>
-        <p:txBody>
-          <a:bodyPr/>
-          <a:lstStyle/>
-          <a:p>
-            <a:r>
-              <a:rPr lang="da-DK" dirty="0" smtClean="0"/>
-              <a:t>Solution Explorer Refactorings</a:t>
-            </a:r>
-            <a:endParaRPr lang="da-DK" dirty="0"/>
-          </a:p>
-        </p:txBody>
-      </p:sp>
-      <p:sp>
-        <p:nvSpPr>
-          <p:cNvPr id="3" name="Content Placeholder 2"/>
-          <p:cNvSpPr>
-            <a:spLocks noGrp="1"/>
-          </p:cNvSpPr>
-          <p:nvPr>
-            <p:ph idx="1"/>
-          </p:nvPr>
-        </p:nvSpPr>
-        <p:spPr/>
-        <p:txBody>
-          <a:bodyPr/>
-          <a:lstStyle/>
-          <a:p>
-            <a:r>
-              <a:rPr lang="da-DK" dirty="0" smtClean="0"/>
-              <a:t>Move types into matching files</a:t>
-            </a:r>
-          </a:p>
-          <a:p>
-            <a:endParaRPr lang="da-DK" dirty="0" smtClean="0"/>
-          </a:p>
-          <a:p>
-            <a:r>
-              <a:rPr lang="da-DK" dirty="0" smtClean="0"/>
-              <a:t>Adjust namespaces</a:t>
-            </a:r>
-          </a:p>
-          <a:p>
-            <a:endParaRPr lang="da-DK" dirty="0" smtClean="0"/>
-          </a:p>
-          <a:p>
-            <a:r>
-              <a:rPr lang="da-DK" dirty="0" smtClean="0"/>
-              <a:t>Move files into folder</a:t>
-            </a:r>
-            <a:endParaRPr lang="da-DK" dirty="0"/>
-          </a:p>
-        </p:txBody>
-      </p:sp>
-    </p:spTree>
-  </p:cSld>
-  <p:clrMapOvr>
-    <a:masterClrMapping/>
-  </p:clrMapOvr>
 </p:sld>
 </file>
 
@@ -4646,6 +5254,49 @@
           </a:p>
         </p:txBody>
       </p:sp>
+      <p:pic>
+        <p:nvPicPr>
+          <p:cNvPr id="3074" name="Picture 2"/>
+          <p:cNvPicPr>
+            <a:picLocks noChangeAspect="1" noChangeArrowheads="1"/>
+          </p:cNvPicPr>
+          <p:nvPr/>
+        </p:nvPicPr>
+        <p:blipFill>
+          <a:blip r:embed="rId2" cstate="print"/>
+          <a:srcRect/>
+          <a:stretch>
+            <a:fillRect/>
+          </a:stretch>
+        </p:blipFill>
+        <p:spPr bwMode="auto">
+          <a:xfrm>
+            <a:off x="3200400" y="2209800"/>
+            <a:ext cx="5454794" cy="2774693"/>
+          </a:xfrm>
+          <a:prstGeom prst="rect">
+            <a:avLst/>
+          </a:prstGeom>
+          <a:ln>
+            <a:headEnd/>
+            <a:tailEnd/>
+          </a:ln>
+        </p:spPr>
+        <p:style>
+          <a:lnRef idx="2">
+            <a:schemeClr val="accent1"/>
+          </a:lnRef>
+          <a:fillRef idx="1">
+            <a:schemeClr val="lt1"/>
+          </a:fillRef>
+          <a:effectRef idx="0">
+            <a:schemeClr val="accent1"/>
+          </a:effectRef>
+          <a:fontRef idx="minor">
+            <a:schemeClr val="dk1"/>
+          </a:fontRef>
+        </p:style>
+      </p:pic>
     </p:spTree>
   </p:cSld>
   <p:clrMapOvr>
@@ -4690,31 +5341,80 @@
         </p:nvSpPr>
         <p:spPr/>
         <p:txBody>
+          <a:bodyPr>
+            <a:normAutofit/>
+          </a:bodyPr>
+          <a:lstStyle/>
+          <a:p>
+            <a:r>
+              <a:rPr lang="da-DK" dirty="0" smtClean="0"/>
+              <a:t>Usage Inspection</a:t>
+            </a:r>
+            <a:endParaRPr lang="da-DK" dirty="0"/>
+          </a:p>
+        </p:txBody>
+      </p:sp>
+      <p:sp>
+        <p:nvSpPr>
+          <p:cNvPr id="3" name="Content Placeholder 2"/>
+          <p:cNvSpPr>
+            <a:spLocks noGrp="1"/>
+          </p:cNvSpPr>
+          <p:nvPr>
+            <p:ph idx="1"/>
+          </p:nvPr>
+        </p:nvSpPr>
+        <p:spPr/>
+        <p:txBody>
           <a:bodyPr/>
           <a:lstStyle/>
           <a:p>
             <a:r>
               <a:rPr lang="da-DK" dirty="0" smtClean="0"/>
-              <a:t>Move Code</a:t>
-            </a:r>
-            <a:endParaRPr lang="da-DK" dirty="0"/>
-          </a:p>
-        </p:txBody>
-      </p:sp>
-      <p:sp>
-        <p:nvSpPr>
-          <p:cNvPr id="3" name="Content Placeholder 2"/>
-          <p:cNvSpPr>
-            <a:spLocks noGrp="1"/>
-          </p:cNvSpPr>
-          <p:nvPr>
-            <p:ph idx="1"/>
-          </p:nvPr>
-        </p:nvSpPr>
-        <p:spPr/>
-        <p:txBody>
-          <a:bodyPr/>
-          <a:lstStyle/>
+              <a:t>Highlight symbols</a:t>
+            </a:r>
+          </a:p>
+          <a:p>
+            <a:pPr lvl="1"/>
+            <a:r>
+              <a:rPr lang="da-DK" dirty="0" smtClean="0"/>
+              <a:t>Single method or small class</a:t>
+            </a:r>
+          </a:p>
+          <a:p>
+            <a:pPr lvl="1"/>
+            <a:endParaRPr lang="da-DK" dirty="0" smtClean="0"/>
+          </a:p>
+          <a:p>
+            <a:r>
+              <a:rPr lang="da-DK" dirty="0" smtClean="0"/>
+              <a:t>Find usages</a:t>
+            </a:r>
+          </a:p>
+          <a:p>
+            <a:pPr lvl="1"/>
+            <a:r>
+              <a:rPr lang="da-DK" dirty="0" smtClean="0"/>
+              <a:t>Single public method or property</a:t>
+            </a:r>
+          </a:p>
+          <a:p>
+            <a:pPr lvl="1"/>
+            <a:endParaRPr lang="da-DK" dirty="0" smtClean="0"/>
+          </a:p>
+          <a:p>
+            <a:r>
+              <a:rPr lang="da-DK" dirty="0" smtClean="0"/>
+              <a:t>Method tracking</a:t>
+            </a:r>
+          </a:p>
+          <a:p>
+            <a:pPr lvl="1"/>
+            <a:r>
+              <a:rPr lang="da-DK" dirty="0" smtClean="0"/>
+              <a:t>Entire flows</a:t>
+            </a:r>
+          </a:p>
           <a:p>
             <a:endParaRPr lang="da-DK" dirty="0"/>
           </a:p>
@@ -4729,6 +5429,185 @@
 </file>
 
 <file path=ppt/slides/slide21.xml><?xml version="1.0" encoding="utf-8"?>
+<p:sld xmlns:a="http://schemas.openxmlformats.org/drawingml/2006/main" xmlns:r="http://schemas.openxmlformats.org/officeDocument/2006/relationships" xmlns:p="http://schemas.openxmlformats.org/presentationml/2006/main">
+  <p:cSld>
+    <p:bg>
+      <p:bgPr>
+        <a:solidFill>
+          <a:schemeClr val="tx1"/>
+        </a:solidFill>
+        <a:effectLst/>
+      </p:bgPr>
+    </p:bg>
+    <p:spTree>
+      <p:nvGrpSpPr>
+        <p:cNvPr id="1" name=""/>
+        <p:cNvGrpSpPr/>
+        <p:nvPr/>
+      </p:nvGrpSpPr>
+      <p:grpSpPr>
+        <a:xfrm>
+          <a:off x="0" y="0"/>
+          <a:ext cx="0" cy="0"/>
+          <a:chOff x="0" y="0"/>
+          <a:chExt cx="0" cy="0"/>
+        </a:xfrm>
+      </p:grpSpPr>
+      <p:sp>
+        <p:nvSpPr>
+          <p:cNvPr id="2" name="Title 1"/>
+          <p:cNvSpPr>
+            <a:spLocks noGrp="1"/>
+          </p:cNvSpPr>
+          <p:nvPr>
+            <p:ph type="title"/>
+          </p:nvPr>
+        </p:nvSpPr>
+        <p:spPr/>
+        <p:txBody>
+          <a:bodyPr/>
+          <a:lstStyle/>
+          <a:p>
+            <a:r>
+              <a:rPr lang="da-DK" dirty="0" smtClean="0">
+                <a:solidFill>
+                  <a:schemeClr val="bg1"/>
+                </a:solidFill>
+              </a:rPr>
+              <a:t>Exercise:  </a:t>
+            </a:r>
+            <a:r>
+              <a:rPr lang="da-DK" dirty="0" smtClean="0">
+                <a:solidFill>
+                  <a:schemeClr val="bg1"/>
+                </a:solidFill>
+              </a:rPr>
+              <a:t>Find Usages</a:t>
+            </a:r>
+            <a:endParaRPr lang="da-DK" dirty="0">
+              <a:solidFill>
+                <a:schemeClr val="bg1"/>
+              </a:solidFill>
+            </a:endParaRPr>
+          </a:p>
+        </p:txBody>
+      </p:sp>
+      <p:sp>
+        <p:nvSpPr>
+          <p:cNvPr id="3" name="Content Placeholder 2"/>
+          <p:cNvSpPr>
+            <a:spLocks noGrp="1"/>
+          </p:cNvSpPr>
+          <p:nvPr>
+            <p:ph idx="1"/>
+          </p:nvPr>
+        </p:nvSpPr>
+        <p:spPr/>
+        <p:txBody>
+          <a:bodyPr>
+            <a:normAutofit/>
+          </a:bodyPr>
+          <a:lstStyle/>
+          <a:p>
+            <a:endParaRPr lang="da-DK" dirty="0" smtClean="0">
+              <a:solidFill>
+                <a:schemeClr val="bg1"/>
+              </a:solidFill>
+            </a:endParaRPr>
+          </a:p>
+          <a:p>
+            <a:r>
+              <a:rPr lang="da-DK" dirty="0" smtClean="0">
+                <a:solidFill>
+                  <a:schemeClr val="bg1"/>
+                </a:solidFill>
+              </a:rPr>
+              <a:t>Quick fix</a:t>
+            </a:r>
+          </a:p>
+          <a:p>
+            <a:pPr lvl="1"/>
+            <a:r>
+              <a:rPr lang="da-DK" b="1" dirty="0" smtClean="0">
+                <a:solidFill>
+                  <a:schemeClr val="accent6"/>
+                </a:solidFill>
+              </a:rPr>
+              <a:t>Alt + Enter</a:t>
+            </a:r>
+            <a:endParaRPr lang="da-DK" dirty="0" smtClean="0">
+              <a:solidFill>
+                <a:schemeClr val="bg1"/>
+              </a:solidFill>
+            </a:endParaRPr>
+          </a:p>
+          <a:p>
+            <a:endParaRPr lang="da-DK" dirty="0" smtClean="0">
+              <a:solidFill>
+                <a:schemeClr val="bg1"/>
+              </a:solidFill>
+            </a:endParaRPr>
+          </a:p>
+          <a:p>
+            <a:r>
+              <a:rPr lang="da-DK" dirty="0" smtClean="0">
+                <a:solidFill>
+                  <a:schemeClr val="bg1"/>
+                </a:solidFill>
+              </a:rPr>
+              <a:t>Generate </a:t>
+            </a:r>
+            <a:r>
+              <a:rPr lang="da-DK" dirty="0" smtClean="0">
+                <a:solidFill>
+                  <a:schemeClr val="bg1"/>
+                </a:solidFill>
+              </a:rPr>
+              <a:t>code</a:t>
+            </a:r>
+          </a:p>
+          <a:p>
+            <a:pPr lvl="1"/>
+            <a:r>
+              <a:rPr lang="da-DK" b="1" dirty="0" smtClean="0">
+                <a:solidFill>
+                  <a:schemeClr val="accent6"/>
+                </a:solidFill>
+              </a:rPr>
+              <a:t>Alt + </a:t>
+            </a:r>
+            <a:r>
+              <a:rPr lang="da-DK" b="1" dirty="0" smtClean="0">
+                <a:solidFill>
+                  <a:schemeClr val="accent6"/>
+                </a:solidFill>
+              </a:rPr>
+              <a:t>Insert</a:t>
+            </a:r>
+            <a:endParaRPr lang="da-DK" b="1" dirty="0" smtClean="0">
+              <a:solidFill>
+                <a:schemeClr val="accent6"/>
+              </a:solidFill>
+            </a:endParaRPr>
+          </a:p>
+        </p:txBody>
+      </p:sp>
+    </p:spTree>
+  </p:cSld>
+  <p:clrMapOvr>
+    <a:masterClrMapping/>
+  </p:clrMapOvr>
+  <p:timing>
+    <p:tnLst>
+      <p:par>
+        <p:cTn id="1" dur="indefinite" restart="never" nodeType="tmRoot"/>
+      </p:par>
+    </p:tnLst>
+  </p:timing>
+</p:sld>
+</file>
+
+<file path=ppt/slides/slide22.xml><?xml version="1.0" encoding="utf-8"?>
 <p:sld xmlns:a="http://schemas.openxmlformats.org/drawingml/2006/main" xmlns:r="http://schemas.openxmlformats.org/officeDocument/2006/relationships" xmlns:p="http://schemas.openxmlformats.org/presentationml/2006/main">
   <p:cSld>
     <p:spTree>
@@ -4757,14 +5636,12 @@
         </p:nvSpPr>
         <p:spPr/>
         <p:txBody>
-          <a:bodyPr>
-            <a:normAutofit/>
-          </a:bodyPr>
-          <a:lstStyle/>
-          <a:p>
-            <a:r>
-              <a:rPr lang="da-DK" dirty="0" smtClean="0"/>
-              <a:t>Inspect This!</a:t>
+          <a:bodyPr/>
+          <a:lstStyle/>
+          <a:p>
+            <a:r>
+              <a:rPr lang="da-DK" dirty="0" smtClean="0"/>
+              <a:t>Navigating Hierarchies</a:t>
             </a:r>
             <a:endParaRPr lang="da-DK" dirty="0"/>
           </a:p>
@@ -4787,29 +5664,41 @@
           <a:p>
             <a:r>
               <a:rPr lang="da-DK" dirty="0" smtClean="0"/>
-              <a:t>Powerful analysis</a:t>
+              <a:t>Type Hierarchy</a:t>
+            </a:r>
+          </a:p>
+          <a:p>
+            <a:endParaRPr lang="da-DK" dirty="0" smtClean="0"/>
+          </a:p>
+          <a:p>
+            <a:endParaRPr lang="da-DK" dirty="0" smtClean="0"/>
+          </a:p>
+          <a:p>
+            <a:r>
+              <a:rPr lang="da-DK" dirty="0" smtClean="0"/>
+              <a:t>Go to</a:t>
             </a:r>
           </a:p>
           <a:p>
             <a:pPr lvl="1"/>
             <a:r>
               <a:rPr lang="da-DK" dirty="0" smtClean="0"/>
-              <a:t>Values</a:t>
+              <a:t>Declaration</a:t>
             </a:r>
           </a:p>
           <a:p>
             <a:pPr lvl="1"/>
             <a:r>
               <a:rPr lang="da-DK" dirty="0" smtClean="0"/>
-              <a:t>Methods</a:t>
-            </a:r>
-          </a:p>
-          <a:p>
-            <a:endParaRPr lang="da-DK" dirty="0" smtClean="0"/>
+              <a:t>Base</a:t>
+            </a:r>
           </a:p>
           <a:p>
             <a:pPr lvl="1"/>
-            <a:endParaRPr lang="da-DK" dirty="0"/>
+            <a:r>
+              <a:rPr lang="da-DK" dirty="0" smtClean="0"/>
+              <a:t>Derived</a:t>
+            </a:r>
           </a:p>
         </p:txBody>
       </p:sp>
@@ -4818,6 +5707,988 @@
   <p:clrMapOvr>
     <a:masterClrMapping/>
   </p:clrMapOvr>
+</p:sld>
+</file>
+
+<file path=ppt/slides/slide23.xml><?xml version="1.0" encoding="utf-8"?>
+<p:sld xmlns:a="http://schemas.openxmlformats.org/drawingml/2006/main" xmlns:r="http://schemas.openxmlformats.org/officeDocument/2006/relationships" xmlns:p="http://schemas.openxmlformats.org/presentationml/2006/main">
+  <p:cSld>
+    <p:bg>
+      <p:bgPr>
+        <a:solidFill>
+          <a:schemeClr val="tx1"/>
+        </a:solidFill>
+        <a:effectLst/>
+      </p:bgPr>
+    </p:bg>
+    <p:spTree>
+      <p:nvGrpSpPr>
+        <p:cNvPr id="1" name=""/>
+        <p:cNvGrpSpPr/>
+        <p:nvPr/>
+      </p:nvGrpSpPr>
+      <p:grpSpPr>
+        <a:xfrm>
+          <a:off x="0" y="0"/>
+          <a:ext cx="0" cy="0"/>
+          <a:chOff x="0" y="0"/>
+          <a:chExt cx="0" cy="0"/>
+        </a:xfrm>
+      </p:grpSpPr>
+      <p:sp>
+        <p:nvSpPr>
+          <p:cNvPr id="2" name="Title 1"/>
+          <p:cNvSpPr>
+            <a:spLocks noGrp="1"/>
+          </p:cNvSpPr>
+          <p:nvPr>
+            <p:ph type="title"/>
+          </p:nvPr>
+        </p:nvSpPr>
+        <p:spPr/>
+        <p:txBody>
+          <a:bodyPr/>
+          <a:lstStyle/>
+          <a:p>
+            <a:r>
+              <a:rPr lang="da-DK" dirty="0" smtClean="0">
+                <a:solidFill>
+                  <a:schemeClr val="bg1"/>
+                </a:solidFill>
+              </a:rPr>
+              <a:t>Exercise:  </a:t>
+            </a:r>
+            <a:r>
+              <a:rPr lang="da-DK" dirty="0" smtClean="0">
+                <a:solidFill>
+                  <a:schemeClr val="bg1"/>
+                </a:solidFill>
+              </a:rPr>
+              <a:t>Navigate hierarchies</a:t>
+            </a:r>
+            <a:endParaRPr lang="da-DK" dirty="0">
+              <a:solidFill>
+                <a:schemeClr val="bg1"/>
+              </a:solidFill>
+            </a:endParaRPr>
+          </a:p>
+        </p:txBody>
+      </p:sp>
+      <p:sp>
+        <p:nvSpPr>
+          <p:cNvPr id="3" name="Content Placeholder 2"/>
+          <p:cNvSpPr>
+            <a:spLocks noGrp="1"/>
+          </p:cNvSpPr>
+          <p:nvPr>
+            <p:ph idx="1"/>
+          </p:nvPr>
+        </p:nvSpPr>
+        <p:spPr/>
+        <p:txBody>
+          <a:bodyPr>
+            <a:normAutofit/>
+          </a:bodyPr>
+          <a:lstStyle/>
+          <a:p>
+            <a:endParaRPr lang="da-DK" dirty="0" smtClean="0">
+              <a:solidFill>
+                <a:schemeClr val="bg1"/>
+              </a:solidFill>
+            </a:endParaRPr>
+          </a:p>
+          <a:p>
+            <a:r>
+              <a:rPr lang="da-DK" dirty="0" smtClean="0">
+                <a:solidFill>
+                  <a:schemeClr val="bg1"/>
+                </a:solidFill>
+              </a:rPr>
+              <a:t>Quick fix</a:t>
+            </a:r>
+          </a:p>
+          <a:p>
+            <a:pPr lvl="1"/>
+            <a:r>
+              <a:rPr lang="da-DK" b="1" dirty="0" smtClean="0">
+                <a:solidFill>
+                  <a:schemeClr val="accent6"/>
+                </a:solidFill>
+              </a:rPr>
+              <a:t>Alt + Enter</a:t>
+            </a:r>
+            <a:endParaRPr lang="da-DK" dirty="0" smtClean="0">
+              <a:solidFill>
+                <a:schemeClr val="bg1"/>
+              </a:solidFill>
+            </a:endParaRPr>
+          </a:p>
+          <a:p>
+            <a:endParaRPr lang="da-DK" dirty="0" smtClean="0">
+              <a:solidFill>
+                <a:schemeClr val="bg1"/>
+              </a:solidFill>
+            </a:endParaRPr>
+          </a:p>
+          <a:p>
+            <a:r>
+              <a:rPr lang="da-DK" dirty="0" smtClean="0">
+                <a:solidFill>
+                  <a:schemeClr val="bg1"/>
+                </a:solidFill>
+              </a:rPr>
+              <a:t>Generate </a:t>
+            </a:r>
+            <a:r>
+              <a:rPr lang="da-DK" dirty="0" smtClean="0">
+                <a:solidFill>
+                  <a:schemeClr val="bg1"/>
+                </a:solidFill>
+              </a:rPr>
+              <a:t>code</a:t>
+            </a:r>
+          </a:p>
+          <a:p>
+            <a:pPr lvl="1"/>
+            <a:r>
+              <a:rPr lang="da-DK" b="1" dirty="0" smtClean="0">
+                <a:solidFill>
+                  <a:schemeClr val="accent6"/>
+                </a:solidFill>
+              </a:rPr>
+              <a:t>Alt + </a:t>
+            </a:r>
+            <a:r>
+              <a:rPr lang="da-DK" b="1" dirty="0" smtClean="0">
+                <a:solidFill>
+                  <a:schemeClr val="accent6"/>
+                </a:solidFill>
+              </a:rPr>
+              <a:t>Insert</a:t>
+            </a:r>
+            <a:endParaRPr lang="da-DK" b="1" dirty="0" smtClean="0">
+              <a:solidFill>
+                <a:schemeClr val="accent6"/>
+              </a:solidFill>
+            </a:endParaRPr>
+          </a:p>
+        </p:txBody>
+      </p:sp>
+    </p:spTree>
+  </p:cSld>
+  <p:clrMapOvr>
+    <a:masterClrMapping/>
+  </p:clrMapOvr>
+  <p:timing>
+    <p:tnLst>
+      <p:par>
+        <p:cTn id="1" dur="indefinite" restart="never" nodeType="tmRoot"/>
+      </p:par>
+    </p:tnLst>
+  </p:timing>
+</p:sld>
+</file>
+
+<file path=ppt/slides/slide24.xml><?xml version="1.0" encoding="utf-8"?>
+<p:sld xmlns:a="http://schemas.openxmlformats.org/drawingml/2006/main" xmlns:r="http://schemas.openxmlformats.org/officeDocument/2006/relationships" xmlns:p="http://schemas.openxmlformats.org/presentationml/2006/main">
+  <p:cSld>
+    <p:spTree>
+      <p:nvGrpSpPr>
+        <p:cNvPr id="1" name=""/>
+        <p:cNvGrpSpPr/>
+        <p:nvPr/>
+      </p:nvGrpSpPr>
+      <p:grpSpPr>
+        <a:xfrm>
+          <a:off x="0" y="0"/>
+          <a:ext cx="0" cy="0"/>
+          <a:chOff x="0" y="0"/>
+          <a:chExt cx="0" cy="0"/>
+        </a:xfrm>
+      </p:grpSpPr>
+      <p:sp>
+        <p:nvSpPr>
+          <p:cNvPr id="2" name="Title 1"/>
+          <p:cNvSpPr>
+            <a:spLocks noGrp="1"/>
+          </p:cNvSpPr>
+          <p:nvPr>
+            <p:ph type="title"/>
+          </p:nvPr>
+        </p:nvSpPr>
+        <p:spPr/>
+        <p:txBody>
+          <a:bodyPr/>
+          <a:lstStyle/>
+          <a:p>
+            <a:r>
+              <a:rPr lang="da-DK" dirty="0" smtClean="0"/>
+              <a:t>Solution Explorer Refactorings</a:t>
+            </a:r>
+            <a:endParaRPr lang="da-DK" dirty="0"/>
+          </a:p>
+        </p:txBody>
+      </p:sp>
+      <p:sp>
+        <p:nvSpPr>
+          <p:cNvPr id="3" name="Content Placeholder 2"/>
+          <p:cNvSpPr>
+            <a:spLocks noGrp="1"/>
+          </p:cNvSpPr>
+          <p:nvPr>
+            <p:ph idx="1"/>
+          </p:nvPr>
+        </p:nvSpPr>
+        <p:spPr/>
+        <p:txBody>
+          <a:bodyPr/>
+          <a:lstStyle/>
+          <a:p>
+            <a:r>
+              <a:rPr lang="da-DK" dirty="0" smtClean="0"/>
+              <a:t>Move types into matching files</a:t>
+            </a:r>
+          </a:p>
+          <a:p>
+            <a:endParaRPr lang="da-DK" dirty="0" smtClean="0"/>
+          </a:p>
+          <a:p>
+            <a:r>
+              <a:rPr lang="da-DK" dirty="0" smtClean="0"/>
+              <a:t>Adjust namespaces</a:t>
+            </a:r>
+          </a:p>
+          <a:p>
+            <a:endParaRPr lang="da-DK" dirty="0" smtClean="0"/>
+          </a:p>
+          <a:p>
+            <a:r>
+              <a:rPr lang="da-DK" dirty="0" smtClean="0"/>
+              <a:t>Move files into folder</a:t>
+            </a:r>
+            <a:endParaRPr lang="da-DK" dirty="0"/>
+          </a:p>
+        </p:txBody>
+      </p:sp>
+    </p:spTree>
+  </p:cSld>
+  <p:clrMapOvr>
+    <a:masterClrMapping/>
+  </p:clrMapOvr>
+</p:sld>
+</file>
+
+<file path=ppt/slides/slide25.xml><?xml version="1.0" encoding="utf-8"?>
+<p:sld xmlns:a="http://schemas.openxmlformats.org/drawingml/2006/main" xmlns:r="http://schemas.openxmlformats.org/officeDocument/2006/relationships" xmlns:p="http://schemas.openxmlformats.org/presentationml/2006/main">
+  <p:cSld>
+    <p:bg>
+      <p:bgPr>
+        <a:solidFill>
+          <a:schemeClr val="tx1"/>
+        </a:solidFill>
+        <a:effectLst/>
+      </p:bgPr>
+    </p:bg>
+    <p:spTree>
+      <p:nvGrpSpPr>
+        <p:cNvPr id="1" name=""/>
+        <p:cNvGrpSpPr/>
+        <p:nvPr/>
+      </p:nvGrpSpPr>
+      <p:grpSpPr>
+        <a:xfrm>
+          <a:off x="0" y="0"/>
+          <a:ext cx="0" cy="0"/>
+          <a:chOff x="0" y="0"/>
+          <a:chExt cx="0" cy="0"/>
+        </a:xfrm>
+      </p:grpSpPr>
+      <p:sp>
+        <p:nvSpPr>
+          <p:cNvPr id="2" name="Title 1"/>
+          <p:cNvSpPr>
+            <a:spLocks noGrp="1"/>
+          </p:cNvSpPr>
+          <p:nvPr>
+            <p:ph type="title"/>
+          </p:nvPr>
+        </p:nvSpPr>
+        <p:spPr/>
+        <p:txBody>
+          <a:bodyPr>
+            <a:normAutofit fontScale="90000"/>
+          </a:bodyPr>
+          <a:lstStyle/>
+          <a:p>
+            <a:r>
+              <a:rPr lang="da-DK" dirty="0" smtClean="0">
+                <a:solidFill>
+                  <a:schemeClr val="bg1"/>
+                </a:solidFill>
+              </a:rPr>
+              <a:t>Exercise:  </a:t>
+            </a:r>
+            <a:r>
+              <a:rPr lang="da-DK" dirty="0" smtClean="0">
+                <a:solidFill>
+                  <a:schemeClr val="bg1"/>
+                </a:solidFill>
+              </a:rPr>
+              <a:t/>
+            </a:r>
+            <a:br>
+              <a:rPr lang="da-DK" dirty="0" smtClean="0">
+                <a:solidFill>
+                  <a:schemeClr val="bg1"/>
+                </a:solidFill>
+              </a:rPr>
+            </a:br>
+            <a:r>
+              <a:rPr lang="da-DK" dirty="0" smtClean="0">
+                <a:solidFill>
+                  <a:schemeClr val="bg1"/>
+                </a:solidFill>
+              </a:rPr>
+              <a:t>Solution Explorer Refactorings</a:t>
+            </a:r>
+            <a:endParaRPr lang="da-DK" dirty="0">
+              <a:solidFill>
+                <a:schemeClr val="bg1"/>
+              </a:solidFill>
+            </a:endParaRPr>
+          </a:p>
+        </p:txBody>
+      </p:sp>
+      <p:sp>
+        <p:nvSpPr>
+          <p:cNvPr id="3" name="Content Placeholder 2"/>
+          <p:cNvSpPr>
+            <a:spLocks noGrp="1"/>
+          </p:cNvSpPr>
+          <p:nvPr>
+            <p:ph idx="1"/>
+          </p:nvPr>
+        </p:nvSpPr>
+        <p:spPr/>
+        <p:txBody>
+          <a:bodyPr>
+            <a:normAutofit/>
+          </a:bodyPr>
+          <a:lstStyle/>
+          <a:p>
+            <a:endParaRPr lang="da-DK" dirty="0" smtClean="0">
+              <a:solidFill>
+                <a:schemeClr val="bg1"/>
+              </a:solidFill>
+            </a:endParaRPr>
+          </a:p>
+          <a:p>
+            <a:r>
+              <a:rPr lang="da-DK" dirty="0" smtClean="0">
+                <a:solidFill>
+                  <a:schemeClr val="bg1"/>
+                </a:solidFill>
+              </a:rPr>
+              <a:t>Quick fix</a:t>
+            </a:r>
+          </a:p>
+          <a:p>
+            <a:pPr lvl="1"/>
+            <a:r>
+              <a:rPr lang="da-DK" b="1" dirty="0" smtClean="0">
+                <a:solidFill>
+                  <a:schemeClr val="accent6"/>
+                </a:solidFill>
+              </a:rPr>
+              <a:t>Alt + Enter</a:t>
+            </a:r>
+            <a:endParaRPr lang="da-DK" dirty="0" smtClean="0">
+              <a:solidFill>
+                <a:schemeClr val="bg1"/>
+              </a:solidFill>
+            </a:endParaRPr>
+          </a:p>
+          <a:p>
+            <a:endParaRPr lang="da-DK" dirty="0" smtClean="0">
+              <a:solidFill>
+                <a:schemeClr val="bg1"/>
+              </a:solidFill>
+            </a:endParaRPr>
+          </a:p>
+          <a:p>
+            <a:r>
+              <a:rPr lang="da-DK" dirty="0" smtClean="0">
+                <a:solidFill>
+                  <a:schemeClr val="bg1"/>
+                </a:solidFill>
+              </a:rPr>
+              <a:t>Generate </a:t>
+            </a:r>
+            <a:r>
+              <a:rPr lang="da-DK" dirty="0" smtClean="0">
+                <a:solidFill>
+                  <a:schemeClr val="bg1"/>
+                </a:solidFill>
+              </a:rPr>
+              <a:t>code</a:t>
+            </a:r>
+          </a:p>
+          <a:p>
+            <a:pPr lvl="1"/>
+            <a:r>
+              <a:rPr lang="da-DK" b="1" dirty="0" smtClean="0">
+                <a:solidFill>
+                  <a:schemeClr val="accent6"/>
+                </a:solidFill>
+              </a:rPr>
+              <a:t>Alt + </a:t>
+            </a:r>
+            <a:r>
+              <a:rPr lang="da-DK" b="1" dirty="0" smtClean="0">
+                <a:solidFill>
+                  <a:schemeClr val="accent6"/>
+                </a:solidFill>
+              </a:rPr>
+              <a:t>Insert</a:t>
+            </a:r>
+            <a:endParaRPr lang="da-DK" b="1" dirty="0" smtClean="0">
+              <a:solidFill>
+                <a:schemeClr val="accent6"/>
+              </a:solidFill>
+            </a:endParaRPr>
+          </a:p>
+        </p:txBody>
+      </p:sp>
+    </p:spTree>
+  </p:cSld>
+  <p:clrMapOvr>
+    <a:masterClrMapping/>
+  </p:clrMapOvr>
+  <p:timing>
+    <p:tnLst>
+      <p:par>
+        <p:cTn id="1" dur="indefinite" restart="never" nodeType="tmRoot"/>
+      </p:par>
+    </p:tnLst>
+  </p:timing>
+</p:sld>
+</file>
+
+<file path=ppt/slides/slide26.xml><?xml version="1.0" encoding="utf-8"?>
+<p:sld xmlns:a="http://schemas.openxmlformats.org/drawingml/2006/main" xmlns:r="http://schemas.openxmlformats.org/officeDocument/2006/relationships" xmlns:p="http://schemas.openxmlformats.org/presentationml/2006/main">
+  <p:cSld>
+    <p:spTree>
+      <p:nvGrpSpPr>
+        <p:cNvPr id="1" name=""/>
+        <p:cNvGrpSpPr/>
+        <p:nvPr/>
+      </p:nvGrpSpPr>
+      <p:grpSpPr>
+        <a:xfrm>
+          <a:off x="0" y="0"/>
+          <a:ext cx="0" cy="0"/>
+          <a:chOff x="0" y="0"/>
+          <a:chExt cx="0" cy="0"/>
+        </a:xfrm>
+      </p:grpSpPr>
+      <p:sp>
+        <p:nvSpPr>
+          <p:cNvPr id="2" name="Title 1"/>
+          <p:cNvSpPr>
+            <a:spLocks noGrp="1"/>
+          </p:cNvSpPr>
+          <p:nvPr>
+            <p:ph type="title"/>
+          </p:nvPr>
+        </p:nvSpPr>
+        <p:spPr/>
+        <p:txBody>
+          <a:bodyPr/>
+          <a:lstStyle/>
+          <a:p>
+            <a:r>
+              <a:rPr lang="da-DK" dirty="0" smtClean="0"/>
+              <a:t>Move Code</a:t>
+            </a:r>
+            <a:endParaRPr lang="da-DK" dirty="0"/>
+          </a:p>
+        </p:txBody>
+      </p:sp>
+      <p:sp>
+        <p:nvSpPr>
+          <p:cNvPr id="3" name="Content Placeholder 2"/>
+          <p:cNvSpPr>
+            <a:spLocks noGrp="1"/>
+          </p:cNvSpPr>
+          <p:nvPr>
+            <p:ph idx="1"/>
+          </p:nvPr>
+        </p:nvSpPr>
+        <p:spPr/>
+        <p:txBody>
+          <a:bodyPr/>
+          <a:lstStyle/>
+          <a:p>
+            <a:endParaRPr lang="da-DK" dirty="0"/>
+          </a:p>
+        </p:txBody>
+      </p:sp>
+    </p:spTree>
+  </p:cSld>
+  <p:clrMapOvr>
+    <a:masterClrMapping/>
+  </p:clrMapOvr>
+</p:sld>
+</file>
+
+<file path=ppt/slides/slide27.xml><?xml version="1.0" encoding="utf-8"?>
+<p:sld xmlns:a="http://schemas.openxmlformats.org/drawingml/2006/main" xmlns:r="http://schemas.openxmlformats.org/officeDocument/2006/relationships" xmlns:p="http://schemas.openxmlformats.org/presentationml/2006/main">
+  <p:cSld>
+    <p:bg>
+      <p:bgPr>
+        <a:solidFill>
+          <a:schemeClr val="tx1"/>
+        </a:solidFill>
+        <a:effectLst/>
+      </p:bgPr>
+    </p:bg>
+    <p:spTree>
+      <p:nvGrpSpPr>
+        <p:cNvPr id="1" name=""/>
+        <p:cNvGrpSpPr/>
+        <p:nvPr/>
+      </p:nvGrpSpPr>
+      <p:grpSpPr>
+        <a:xfrm>
+          <a:off x="0" y="0"/>
+          <a:ext cx="0" cy="0"/>
+          <a:chOff x="0" y="0"/>
+          <a:chExt cx="0" cy="0"/>
+        </a:xfrm>
+      </p:grpSpPr>
+      <p:sp>
+        <p:nvSpPr>
+          <p:cNvPr id="2" name="Title 1"/>
+          <p:cNvSpPr>
+            <a:spLocks noGrp="1"/>
+          </p:cNvSpPr>
+          <p:nvPr>
+            <p:ph type="title"/>
+          </p:nvPr>
+        </p:nvSpPr>
+        <p:spPr/>
+        <p:txBody>
+          <a:bodyPr/>
+          <a:lstStyle/>
+          <a:p>
+            <a:r>
+              <a:rPr lang="da-DK" dirty="0" smtClean="0">
+                <a:solidFill>
+                  <a:schemeClr val="bg1"/>
+                </a:solidFill>
+              </a:rPr>
+              <a:t>Exercise:  </a:t>
+            </a:r>
+            <a:r>
+              <a:rPr lang="da-DK" dirty="0" smtClean="0">
+                <a:solidFill>
+                  <a:schemeClr val="bg1"/>
+                </a:solidFill>
+              </a:rPr>
+              <a:t>Move Code</a:t>
+            </a:r>
+            <a:endParaRPr lang="da-DK" dirty="0">
+              <a:solidFill>
+                <a:schemeClr val="bg1"/>
+              </a:solidFill>
+            </a:endParaRPr>
+          </a:p>
+        </p:txBody>
+      </p:sp>
+      <p:sp>
+        <p:nvSpPr>
+          <p:cNvPr id="3" name="Content Placeholder 2"/>
+          <p:cNvSpPr>
+            <a:spLocks noGrp="1"/>
+          </p:cNvSpPr>
+          <p:nvPr>
+            <p:ph idx="1"/>
+          </p:nvPr>
+        </p:nvSpPr>
+        <p:spPr/>
+        <p:txBody>
+          <a:bodyPr>
+            <a:normAutofit/>
+          </a:bodyPr>
+          <a:lstStyle/>
+          <a:p>
+            <a:endParaRPr lang="da-DK" dirty="0" smtClean="0">
+              <a:solidFill>
+                <a:schemeClr val="bg1"/>
+              </a:solidFill>
+            </a:endParaRPr>
+          </a:p>
+          <a:p>
+            <a:r>
+              <a:rPr lang="da-DK" dirty="0" smtClean="0">
+                <a:solidFill>
+                  <a:schemeClr val="bg1"/>
+                </a:solidFill>
+              </a:rPr>
+              <a:t>Quick fix</a:t>
+            </a:r>
+          </a:p>
+          <a:p>
+            <a:pPr lvl="1"/>
+            <a:r>
+              <a:rPr lang="da-DK" b="1" dirty="0" smtClean="0">
+                <a:solidFill>
+                  <a:schemeClr val="accent6"/>
+                </a:solidFill>
+              </a:rPr>
+              <a:t>Alt + Enter</a:t>
+            </a:r>
+            <a:endParaRPr lang="da-DK" dirty="0" smtClean="0">
+              <a:solidFill>
+                <a:schemeClr val="bg1"/>
+              </a:solidFill>
+            </a:endParaRPr>
+          </a:p>
+          <a:p>
+            <a:endParaRPr lang="da-DK" dirty="0" smtClean="0">
+              <a:solidFill>
+                <a:schemeClr val="bg1"/>
+              </a:solidFill>
+            </a:endParaRPr>
+          </a:p>
+          <a:p>
+            <a:r>
+              <a:rPr lang="da-DK" dirty="0" smtClean="0">
+                <a:solidFill>
+                  <a:schemeClr val="bg1"/>
+                </a:solidFill>
+              </a:rPr>
+              <a:t>Generate </a:t>
+            </a:r>
+            <a:r>
+              <a:rPr lang="da-DK" dirty="0" smtClean="0">
+                <a:solidFill>
+                  <a:schemeClr val="bg1"/>
+                </a:solidFill>
+              </a:rPr>
+              <a:t>code</a:t>
+            </a:r>
+          </a:p>
+          <a:p>
+            <a:pPr lvl="1"/>
+            <a:r>
+              <a:rPr lang="da-DK" b="1" dirty="0" smtClean="0">
+                <a:solidFill>
+                  <a:schemeClr val="accent6"/>
+                </a:solidFill>
+              </a:rPr>
+              <a:t>Alt + </a:t>
+            </a:r>
+            <a:r>
+              <a:rPr lang="da-DK" b="1" dirty="0" smtClean="0">
+                <a:solidFill>
+                  <a:schemeClr val="accent6"/>
+                </a:solidFill>
+              </a:rPr>
+              <a:t>Insert</a:t>
+            </a:r>
+            <a:endParaRPr lang="da-DK" b="1" dirty="0" smtClean="0">
+              <a:solidFill>
+                <a:schemeClr val="accent6"/>
+              </a:solidFill>
+            </a:endParaRPr>
+          </a:p>
+        </p:txBody>
+      </p:sp>
+    </p:spTree>
+  </p:cSld>
+  <p:clrMapOvr>
+    <a:masterClrMapping/>
+  </p:clrMapOvr>
+  <p:timing>
+    <p:tnLst>
+      <p:par>
+        <p:cTn id="1" dur="indefinite" restart="never" nodeType="tmRoot"/>
+      </p:par>
+    </p:tnLst>
+  </p:timing>
+</p:sld>
+</file>
+
+<file path=ppt/slides/slide28.xml><?xml version="1.0" encoding="utf-8"?>
+<p:sld xmlns:a="http://schemas.openxmlformats.org/drawingml/2006/main" xmlns:r="http://schemas.openxmlformats.org/officeDocument/2006/relationships" xmlns:p="http://schemas.openxmlformats.org/presentationml/2006/main">
+  <p:cSld>
+    <p:spTree>
+      <p:nvGrpSpPr>
+        <p:cNvPr id="1" name=""/>
+        <p:cNvGrpSpPr/>
+        <p:nvPr/>
+      </p:nvGrpSpPr>
+      <p:grpSpPr>
+        <a:xfrm>
+          <a:off x="0" y="0"/>
+          <a:ext cx="0" cy="0"/>
+          <a:chOff x="0" y="0"/>
+          <a:chExt cx="0" cy="0"/>
+        </a:xfrm>
+      </p:grpSpPr>
+      <p:sp>
+        <p:nvSpPr>
+          <p:cNvPr id="2" name="Title 1"/>
+          <p:cNvSpPr>
+            <a:spLocks noGrp="1"/>
+          </p:cNvSpPr>
+          <p:nvPr>
+            <p:ph type="title"/>
+          </p:nvPr>
+        </p:nvSpPr>
+        <p:spPr/>
+        <p:txBody>
+          <a:bodyPr>
+            <a:normAutofit/>
+          </a:bodyPr>
+          <a:lstStyle/>
+          <a:p>
+            <a:r>
+              <a:rPr lang="da-DK" dirty="0" smtClean="0"/>
+              <a:t>Inspect This!</a:t>
+            </a:r>
+            <a:endParaRPr lang="da-DK" dirty="0"/>
+          </a:p>
+        </p:txBody>
+      </p:sp>
+      <p:sp>
+        <p:nvSpPr>
+          <p:cNvPr id="3" name="Content Placeholder 2"/>
+          <p:cNvSpPr>
+            <a:spLocks noGrp="1"/>
+          </p:cNvSpPr>
+          <p:nvPr>
+            <p:ph idx="1"/>
+          </p:nvPr>
+        </p:nvSpPr>
+        <p:spPr/>
+        <p:txBody>
+          <a:bodyPr/>
+          <a:lstStyle/>
+          <a:p>
+            <a:r>
+              <a:rPr lang="da-DK" dirty="0" smtClean="0"/>
+              <a:t>Powerful analysis</a:t>
+            </a:r>
+          </a:p>
+          <a:p>
+            <a:pPr lvl="1"/>
+            <a:r>
+              <a:rPr lang="da-DK" dirty="0" smtClean="0"/>
+              <a:t>Values</a:t>
+            </a:r>
+          </a:p>
+          <a:p>
+            <a:pPr lvl="1"/>
+            <a:r>
+              <a:rPr lang="da-DK" dirty="0" smtClean="0"/>
+              <a:t>Methods</a:t>
+            </a:r>
+          </a:p>
+          <a:p>
+            <a:endParaRPr lang="da-DK" dirty="0" smtClean="0"/>
+          </a:p>
+          <a:p>
+            <a:pPr lvl="1"/>
+            <a:endParaRPr lang="da-DK" dirty="0"/>
+          </a:p>
+        </p:txBody>
+      </p:sp>
+    </p:spTree>
+  </p:cSld>
+  <p:clrMapOvr>
+    <a:masterClrMapping/>
+  </p:clrMapOvr>
+</p:sld>
+</file>
+
+<file path=ppt/slides/slide29.xml><?xml version="1.0" encoding="utf-8"?>
+<p:sld xmlns:a="http://schemas.openxmlformats.org/drawingml/2006/main" xmlns:r="http://schemas.openxmlformats.org/officeDocument/2006/relationships" xmlns:p="http://schemas.openxmlformats.org/presentationml/2006/main">
+  <p:cSld>
+    <p:bg>
+      <p:bgPr>
+        <a:solidFill>
+          <a:schemeClr val="tx1"/>
+        </a:solidFill>
+        <a:effectLst/>
+      </p:bgPr>
+    </p:bg>
+    <p:spTree>
+      <p:nvGrpSpPr>
+        <p:cNvPr id="1" name=""/>
+        <p:cNvGrpSpPr/>
+        <p:nvPr/>
+      </p:nvGrpSpPr>
+      <p:grpSpPr>
+        <a:xfrm>
+          <a:off x="0" y="0"/>
+          <a:ext cx="0" cy="0"/>
+          <a:chOff x="0" y="0"/>
+          <a:chExt cx="0" cy="0"/>
+        </a:xfrm>
+      </p:grpSpPr>
+      <p:sp>
+        <p:nvSpPr>
+          <p:cNvPr id="2" name="Title 1"/>
+          <p:cNvSpPr>
+            <a:spLocks noGrp="1"/>
+          </p:cNvSpPr>
+          <p:nvPr>
+            <p:ph type="title"/>
+          </p:nvPr>
+        </p:nvSpPr>
+        <p:spPr/>
+        <p:txBody>
+          <a:bodyPr/>
+          <a:lstStyle/>
+          <a:p>
+            <a:r>
+              <a:rPr lang="da-DK" dirty="0" smtClean="0">
+                <a:solidFill>
+                  <a:schemeClr val="bg1"/>
+                </a:solidFill>
+              </a:rPr>
+              <a:t>Exercise:  </a:t>
+            </a:r>
+            <a:r>
+              <a:rPr lang="da-DK" dirty="0" smtClean="0">
+                <a:solidFill>
+                  <a:schemeClr val="bg1"/>
+                </a:solidFill>
+              </a:rPr>
+              <a:t>Inspect This!</a:t>
+            </a:r>
+            <a:endParaRPr lang="da-DK" dirty="0">
+              <a:solidFill>
+                <a:schemeClr val="bg1"/>
+              </a:solidFill>
+            </a:endParaRPr>
+          </a:p>
+        </p:txBody>
+      </p:sp>
+      <p:sp>
+        <p:nvSpPr>
+          <p:cNvPr id="3" name="Content Placeholder 2"/>
+          <p:cNvSpPr>
+            <a:spLocks noGrp="1"/>
+          </p:cNvSpPr>
+          <p:nvPr>
+            <p:ph idx="1"/>
+          </p:nvPr>
+        </p:nvSpPr>
+        <p:spPr/>
+        <p:txBody>
+          <a:bodyPr>
+            <a:normAutofit/>
+          </a:bodyPr>
+          <a:lstStyle/>
+          <a:p>
+            <a:endParaRPr lang="da-DK" dirty="0" smtClean="0">
+              <a:solidFill>
+                <a:schemeClr val="bg1"/>
+              </a:solidFill>
+            </a:endParaRPr>
+          </a:p>
+          <a:p>
+            <a:r>
+              <a:rPr lang="da-DK" dirty="0" smtClean="0">
+                <a:solidFill>
+                  <a:schemeClr val="bg1"/>
+                </a:solidFill>
+              </a:rPr>
+              <a:t>Quick fix</a:t>
+            </a:r>
+          </a:p>
+          <a:p>
+            <a:pPr lvl="1"/>
+            <a:r>
+              <a:rPr lang="da-DK" b="1" dirty="0" smtClean="0">
+                <a:solidFill>
+                  <a:schemeClr val="accent6"/>
+                </a:solidFill>
+              </a:rPr>
+              <a:t>Alt + Enter</a:t>
+            </a:r>
+            <a:endParaRPr lang="da-DK" dirty="0" smtClean="0">
+              <a:solidFill>
+                <a:schemeClr val="bg1"/>
+              </a:solidFill>
+            </a:endParaRPr>
+          </a:p>
+          <a:p>
+            <a:endParaRPr lang="da-DK" dirty="0" smtClean="0">
+              <a:solidFill>
+                <a:schemeClr val="bg1"/>
+              </a:solidFill>
+            </a:endParaRPr>
+          </a:p>
+          <a:p>
+            <a:r>
+              <a:rPr lang="da-DK" dirty="0" smtClean="0">
+                <a:solidFill>
+                  <a:schemeClr val="bg1"/>
+                </a:solidFill>
+              </a:rPr>
+              <a:t>Generate </a:t>
+            </a:r>
+            <a:r>
+              <a:rPr lang="da-DK" dirty="0" smtClean="0">
+                <a:solidFill>
+                  <a:schemeClr val="bg1"/>
+                </a:solidFill>
+              </a:rPr>
+              <a:t>code</a:t>
+            </a:r>
+          </a:p>
+          <a:p>
+            <a:pPr lvl="1"/>
+            <a:r>
+              <a:rPr lang="da-DK" b="1" dirty="0" smtClean="0">
+                <a:solidFill>
+                  <a:schemeClr val="accent6"/>
+                </a:solidFill>
+              </a:rPr>
+              <a:t>Alt + </a:t>
+            </a:r>
+            <a:r>
+              <a:rPr lang="da-DK" b="1" dirty="0" smtClean="0">
+                <a:solidFill>
+                  <a:schemeClr val="accent6"/>
+                </a:solidFill>
+              </a:rPr>
+              <a:t>Insert</a:t>
+            </a:r>
+            <a:endParaRPr lang="da-DK" b="1" dirty="0" smtClean="0">
+              <a:solidFill>
+                <a:schemeClr val="accent6"/>
+              </a:solidFill>
+            </a:endParaRPr>
+          </a:p>
+        </p:txBody>
+      </p:sp>
+    </p:spTree>
+  </p:cSld>
+  <p:clrMapOvr>
+    <a:masterClrMapping/>
+  </p:clrMapOvr>
+  <p:timing>
+    <p:tnLst>
+      <p:par>
+        <p:cTn id="1" dur="indefinite" restart="never" nodeType="tmRoot"/>
+      </p:par>
+    </p:tnLst>
+  </p:timing>
 </p:sld>
 </file>
 
@@ -5206,7 +7077,7 @@
     </p:spTree>
     <p:extLst>
       <p:ext uri="{BB962C8B-B14F-4D97-AF65-F5344CB8AC3E}">
-        <p14:creationId xmlns="" xmlns:p14="http://schemas.microsoft.com/office/powerpoint/2010/main" val="1712164881"/>
+        <p14:creationId xmlns:p14="http://schemas.microsoft.com/office/powerpoint/2010/main" xmlns="" val="1712164881"/>
       </p:ext>
     </p:extLst>
   </p:cSld>
@@ -5825,23 +7696,7 @@
                   <a:schemeClr val="bg1"/>
                 </a:solidFill>
               </a:rPr>
-              <a:t>Find </a:t>
-            </a:r>
-            <a:r>
-              <a:rPr lang="da-DK" dirty="0" smtClean="0">
-                <a:solidFill>
-                  <a:schemeClr val="bg1"/>
-                </a:solidFill>
-              </a:rPr>
-              <a:t>shortest key </a:t>
-            </a:r>
-            <a:r>
-              <a:rPr lang="da-DK" dirty="0" smtClean="0">
-                <a:solidFill>
-                  <a:schemeClr val="bg1"/>
-                </a:solidFill>
-              </a:rPr>
-              <a:t>sequence</a:t>
+              <a:t>Find shortest key sequence</a:t>
             </a:r>
           </a:p>
           <a:p>
@@ -5892,11 +7747,6 @@
               </a:rPr>
               <a:t>Ctrl + Shift + T</a:t>
             </a:r>
-            <a:endParaRPr lang="da-DK" b="1" dirty="0" smtClean="0">
-              <a:solidFill>
-                <a:schemeClr val="accent6"/>
-              </a:solidFill>
-            </a:endParaRPr>
           </a:p>
           <a:p>
             <a:r>
@@ -6088,7 +7938,7 @@
     </p:spTree>
     <p:extLst>
       <p:ext uri="{BB962C8B-B14F-4D97-AF65-F5344CB8AC3E}">
-        <p14:creationId xmlns="" xmlns:p14="http://schemas.microsoft.com/office/powerpoint/2010/main" val="1649822022"/>
+        <p14:creationId xmlns:p14="http://schemas.microsoft.com/office/powerpoint/2010/main" xmlns="" val="1649822022"/>
       </p:ext>
     </p:extLst>
   </p:cSld>
@@ -6134,7 +7984,11 @@
           <a:p>
             <a:r>
               <a:rPr lang="da-DK" dirty="0" smtClean="0"/>
-              <a:t>Code Inspections</a:t>
+              <a:t>Code </a:t>
+            </a:r>
+            <a:r>
+              <a:rPr lang="da-DK" dirty="0" smtClean="0"/>
+              <a:t>Analysis</a:t>
             </a:r>
             <a:endParaRPr lang="da-DK" dirty="0"/>
           </a:p>
@@ -6569,7 +8423,15 @@
                   <a:schemeClr val="bg1"/>
                 </a:solidFill>
               </a:rPr>
-              <a:t>Exercise:  Code Inspections</a:t>
+              <a:t>Exercise:  Code </a:t>
+            </a:r>
+            <a:r>
+              <a:rPr lang="da-DK" dirty="0" smtClean="0">
+                <a:solidFill>
+                  <a:schemeClr val="bg1"/>
+                </a:solidFill>
+              </a:rPr>
+              <a:t>Analysis</a:t>
             </a:r>
             <a:endParaRPr lang="da-DK" dirty="0">
               <a:solidFill>
@@ -6609,8 +8471,13 @@
                   <a:schemeClr val="bg1"/>
                 </a:solidFill>
               </a:rPr>
-              <a:t>CodeInspections.sln</a:t>
-            </a:r>
+              <a:t>CodeAnalysis.sln</a:t>
+            </a:r>
+            <a:endParaRPr lang="da-DK" b="1" dirty="0" smtClean="0">
+              <a:solidFill>
+                <a:schemeClr val="bg1"/>
+              </a:solidFill>
+            </a:endParaRPr>
           </a:p>
           <a:p>
             <a:endParaRPr lang="da-DK" dirty="0" smtClean="0">
@@ -6652,31 +8519,7 @@
                   <a:schemeClr val="bg1"/>
                 </a:solidFill>
               </a:rPr>
-              <a:t>Go </a:t>
-            </a:r>
-            <a:r>
-              <a:rPr lang="da-DK" dirty="0" smtClean="0">
-                <a:solidFill>
-                  <a:schemeClr val="bg1"/>
-                </a:solidFill>
-              </a:rPr>
-              <a:t>to </a:t>
-            </a:r>
-            <a:r>
-              <a:rPr lang="da-DK" dirty="0" smtClean="0">
-                <a:solidFill>
-                  <a:schemeClr val="bg1"/>
-                </a:solidFill>
-              </a:rPr>
-              <a:t>next / previous </a:t>
-            </a:r>
-            <a:r>
-              <a:rPr lang="da-DK" dirty="0" smtClean="0">
-                <a:solidFill>
-                  <a:schemeClr val="bg1"/>
-                </a:solidFill>
-              </a:rPr>
-              <a:t>error</a:t>
+              <a:t>Go to next / previous error</a:t>
             </a:r>
           </a:p>
           <a:p>

</xml_diff>

<commit_message>
Finished inline / introduce and split introduce from import completion.
</commit_message>
<xml_diff>
--- a/Presentations/2 - Exercises - ReSharper Course.pptx
+++ b/Presentations/2 - Exercises - ReSharper Course.pptx
@@ -5,7 +5,7 @@
     <p:sldMasterId id="2147483648" r:id="rId1"/>
   </p:sldMasterIdLst>
   <p:notesMasterIdLst>
-    <p:notesMasterId r:id="rId31"/>
+    <p:notesMasterId r:id="rId34"/>
   </p:notesMasterIdLst>
   <p:sldIdLst>
     <p:sldId id="272" r:id="rId2"/>
@@ -24,19 +24,22 @@
     <p:sldId id="288" r:id="rId15"/>
     <p:sldId id="306" r:id="rId16"/>
     <p:sldId id="299" r:id="rId17"/>
-    <p:sldId id="294" r:id="rId18"/>
-    <p:sldId id="286" r:id="rId19"/>
-    <p:sldId id="300" r:id="rId20"/>
-    <p:sldId id="275" r:id="rId21"/>
-    <p:sldId id="301" r:id="rId22"/>
-    <p:sldId id="278" r:id="rId23"/>
-    <p:sldId id="302" r:id="rId24"/>
-    <p:sldId id="287" r:id="rId25"/>
-    <p:sldId id="303" r:id="rId26"/>
-    <p:sldId id="289" r:id="rId27"/>
-    <p:sldId id="304" r:id="rId28"/>
-    <p:sldId id="279" r:id="rId29"/>
-    <p:sldId id="305" r:id="rId30"/>
+    <p:sldId id="308" r:id="rId18"/>
+    <p:sldId id="309" r:id="rId19"/>
+    <p:sldId id="307" r:id="rId20"/>
+    <p:sldId id="294" r:id="rId21"/>
+    <p:sldId id="286" r:id="rId22"/>
+    <p:sldId id="300" r:id="rId23"/>
+    <p:sldId id="275" r:id="rId24"/>
+    <p:sldId id="301" r:id="rId25"/>
+    <p:sldId id="278" r:id="rId26"/>
+    <p:sldId id="302" r:id="rId27"/>
+    <p:sldId id="287" r:id="rId28"/>
+    <p:sldId id="303" r:id="rId29"/>
+    <p:sldId id="289" r:id="rId30"/>
+    <p:sldId id="304" r:id="rId31"/>
+    <p:sldId id="279" r:id="rId32"/>
+    <p:sldId id="305" r:id="rId33"/>
   </p:sldIdLst>
   <p:sldSz cx="9144000" cy="6858000" type="screen4x3"/>
   <p:notesSz cx="6858000" cy="9144000"/>
@@ -390,7 +393,7 @@
     </p:spTree>
     <p:extLst>
       <p:ext uri="{BB962C8B-B14F-4D97-AF65-F5344CB8AC3E}">
-        <p14:creationId xmlns:p14="http://schemas.microsoft.com/office/powerpoint/2010/main" xmlns="" val="1746408167"/>
+        <p14:creationId xmlns="" xmlns:p14="http://schemas.microsoft.com/office/powerpoint/2010/main" val="1746408167"/>
       </p:ext>
     </p:extLst>
   </p:cSld>
@@ -3606,7 +3609,7 @@
     </p:spTree>
     <p:extLst>
       <p:ext uri="{BB962C8B-B14F-4D97-AF65-F5344CB8AC3E}">
-        <p14:creationId xmlns:p14="http://schemas.microsoft.com/office/powerpoint/2010/main" xmlns="" val="1917661024"/>
+        <p14:creationId xmlns="" xmlns:p14="http://schemas.microsoft.com/office/powerpoint/2010/main" val="1917661024"/>
       </p:ext>
     </p:extLst>
   </p:cSld>
@@ -3868,7 +3871,6 @@
               <a:rPr lang="da-DK" dirty="0" smtClean="0"/>
               <a:t>Classes</a:t>
             </a:r>
-            <a:endParaRPr lang="da-DK" dirty="0" smtClean="0"/>
           </a:p>
           <a:p>
             <a:endParaRPr lang="da-DK" dirty="0" smtClean="0"/>
@@ -3988,11 +3990,7 @@
           <a:p>
             <a:r>
               <a:rPr lang="da-DK" dirty="0" smtClean="0"/>
-              <a:t>Generate </a:t>
-            </a:r>
-            <a:r>
-              <a:rPr lang="da-DK" dirty="0" smtClean="0"/>
-              <a:t>code</a:t>
+              <a:t>Generate code</a:t>
             </a:r>
           </a:p>
           <a:p>
@@ -4001,15 +3999,14 @@
               <a:rPr lang="da-DK" dirty="0" smtClean="0"/>
               <a:t>Interacts with fields</a:t>
             </a:r>
+          </a:p>
+          <a:p>
             <a:endParaRPr lang="da-DK" dirty="0" smtClean="0"/>
           </a:p>
           <a:p>
             <a:endParaRPr lang="da-DK" dirty="0" smtClean="0"/>
           </a:p>
           <a:p>
-            <a:endParaRPr lang="da-DK" dirty="0" smtClean="0"/>
-          </a:p>
-          <a:p>
             <a:r>
               <a:rPr lang="da-DK" dirty="0" smtClean="0"/>
               <a:t>Generate code</a:t>
@@ -4021,7 +4018,6 @@
               <a:rPr lang="da-DK" dirty="0" smtClean="0"/>
               <a:t>Solution Explorer</a:t>
             </a:r>
-            <a:endParaRPr lang="da-DK" dirty="0" smtClean="0"/>
           </a:p>
         </p:txBody>
       </p:sp>
@@ -4238,15 +4234,7 @@
                   <a:schemeClr val="bg1"/>
                 </a:solidFill>
               </a:rPr>
-              <a:t>Generate </a:t>
-            </a:r>
-            <a:r>
-              <a:rPr lang="da-DK" dirty="0" smtClean="0">
-                <a:solidFill>
-                  <a:schemeClr val="bg1"/>
-                </a:solidFill>
-              </a:rPr>
-              <a:t>code</a:t>
+              <a:t>Generate code</a:t>
             </a:r>
           </a:p>
           <a:p>
@@ -4257,21 +4245,8 @@
                   <a:schemeClr val="accent6"/>
                 </a:solidFill>
               </a:rPr>
-              <a:t>Alt + </a:t>
-            </a:r>
-            <a:r>
-              <a:rPr lang="da-DK" b="1" dirty="0" smtClean="0">
-                <a:solidFill>
-                  <a:schemeClr val="accent6"/>
-                </a:solidFill>
-              </a:rPr>
-              <a:t>Insert</a:t>
-            </a:r>
-            <a:endParaRPr lang="da-DK" b="1" dirty="0" smtClean="0">
-              <a:solidFill>
-                <a:schemeClr val="accent6"/>
-              </a:solidFill>
-            </a:endParaRPr>
+              <a:t>Alt + Insert</a:t>
+            </a:r>
           </a:p>
         </p:txBody>
       </p:sp>
@@ -4356,7 +4331,6 @@
               <a:rPr lang="da-DK" dirty="0" smtClean="0"/>
               <a:t>Refactor this</a:t>
             </a:r>
-            <a:endParaRPr lang="da-DK" dirty="0" smtClean="0"/>
           </a:p>
           <a:p>
             <a:r>
@@ -4684,15 +4658,7 @@
                   <a:schemeClr val="bg1"/>
                 </a:solidFill>
               </a:rPr>
-              <a:t>Exercise:  </a:t>
-            </a:r>
-            <a:r>
-              <a:rPr lang="da-DK" dirty="0" smtClean="0">
-                <a:solidFill>
-                  <a:schemeClr val="bg1"/>
-                </a:solidFill>
-              </a:rPr>
-              <a:t>Refactor - Rename</a:t>
+              <a:t>Exercise:  Refactor - Rename</a:t>
             </a:r>
             <a:endParaRPr lang="da-DK" dirty="0">
               <a:solidFill>
@@ -4725,8 +4691,26 @@
                   <a:schemeClr val="bg1"/>
                 </a:solidFill>
               </a:rPr>
-              <a:t>Cleaning up very bad variable names</a:t>
-            </a:r>
+              <a:t>Cleaning up </a:t>
+            </a:r>
+            <a:r>
+              <a:rPr lang="da-DK" dirty="0" smtClean="0">
+                <a:solidFill>
+                  <a:schemeClr val="bg1"/>
+                </a:solidFill>
+              </a:rPr>
+              <a:t>bad </a:t>
+            </a:r>
+            <a:r>
+              <a:rPr lang="da-DK" dirty="0" smtClean="0">
+                <a:solidFill>
+                  <a:schemeClr val="bg1"/>
+                </a:solidFill>
+              </a:rPr>
+              <a:t>variable names</a:t>
+            </a:r>
+          </a:p>
+          <a:p>
             <a:endParaRPr lang="da-DK" dirty="0" smtClean="0">
               <a:solidFill>
                 <a:schemeClr val="bg1"/>
@@ -4734,6 +4718,25 @@
             </a:endParaRPr>
           </a:p>
           <a:p>
+            <a:r>
+              <a:rPr lang="da-DK" dirty="0" smtClean="0">
+                <a:solidFill>
+                  <a:schemeClr val="bg1"/>
+                </a:solidFill>
+              </a:rPr>
+              <a:t>Refactor this</a:t>
+            </a:r>
+          </a:p>
+          <a:p>
+            <a:pPr lvl="1"/>
+            <a:r>
+              <a:rPr lang="da-DK" b="1" dirty="0" smtClean="0">
+                <a:solidFill>
+                  <a:schemeClr val="accent6"/>
+                </a:solidFill>
+              </a:rPr>
+              <a:t>Ctrl + Shift + R</a:t>
+            </a:r>
             <a:endParaRPr lang="da-DK" dirty="0" smtClean="0">
               <a:solidFill>
                 <a:schemeClr val="bg1"/>
@@ -4741,14 +4744,6 @@
             </a:endParaRPr>
           </a:p>
           <a:p>
-            <a:r>
-              <a:rPr lang="da-DK" dirty="0" smtClean="0">
-                <a:solidFill>
-                  <a:schemeClr val="bg1"/>
-                </a:solidFill>
-              </a:rPr>
-              <a:t>Refactor this</a:t>
-            </a:r>
             <a:endParaRPr lang="da-DK" dirty="0" smtClean="0">
               <a:solidFill>
                 <a:schemeClr val="bg1"/>
@@ -4756,6 +4751,16 @@
             </a:endParaRPr>
           </a:p>
           <a:p>
+            <a:r>
+              <a:rPr lang="da-DK" dirty="0" smtClean="0">
+                <a:solidFill>
+                  <a:schemeClr val="bg1"/>
+                </a:solidFill>
+              </a:rPr>
+              <a:t>Refactor: Rename</a:t>
+            </a:r>
+          </a:p>
+          <a:p>
             <a:pPr lvl="1"/>
             <a:r>
               <a:rPr lang="da-DK" b="1" dirty="0" smtClean="0">
@@ -4763,51 +4768,8 @@
                   <a:schemeClr val="accent6"/>
                 </a:solidFill>
               </a:rPr>
-              <a:t>Ctrl + Shift + R</a:t>
-            </a:r>
-            <a:endParaRPr lang="da-DK" dirty="0" smtClean="0">
-              <a:solidFill>
-                <a:schemeClr val="bg1"/>
-              </a:solidFill>
-            </a:endParaRPr>
-          </a:p>
-          <a:p>
-            <a:endParaRPr lang="da-DK" dirty="0" smtClean="0">
-              <a:solidFill>
-                <a:schemeClr val="bg1"/>
-              </a:solidFill>
-            </a:endParaRPr>
-          </a:p>
-          <a:p>
-            <a:r>
-              <a:rPr lang="da-DK" dirty="0" smtClean="0">
-                <a:solidFill>
-                  <a:schemeClr val="bg1"/>
-                </a:solidFill>
-              </a:rPr>
-              <a:t>Refactor: Rename</a:t>
-            </a:r>
-            <a:endParaRPr lang="da-DK" dirty="0" smtClean="0">
-              <a:solidFill>
-                <a:schemeClr val="bg1"/>
-              </a:solidFill>
-            </a:endParaRPr>
-          </a:p>
-          <a:p>
-            <a:pPr lvl="1"/>
-            <a:r>
-              <a:rPr lang="da-DK" b="1" dirty="0" smtClean="0">
-                <a:solidFill>
-                  <a:schemeClr val="accent6"/>
-                </a:solidFill>
-              </a:rPr>
               <a:t>Ctrl + R, Ctrl + R</a:t>
             </a:r>
-            <a:endParaRPr lang="da-DK" b="1" dirty="0" smtClean="0">
-              <a:solidFill>
-                <a:schemeClr val="accent6"/>
-              </a:solidFill>
-            </a:endParaRPr>
           </a:p>
         </p:txBody>
       </p:sp>
@@ -4829,14 +4791,6 @@
 <file path=ppt/slides/slide17.xml><?xml version="1.0" encoding="utf-8"?>
 <p:sld xmlns:a="http://schemas.openxmlformats.org/drawingml/2006/main" xmlns:r="http://schemas.openxmlformats.org/officeDocument/2006/relationships" xmlns:p="http://schemas.openxmlformats.org/presentationml/2006/main">
   <p:cSld>
-    <p:bg>
-      <p:bgPr>
-        <a:solidFill>
-          <a:srgbClr val="00B050"/>
-        </a:solidFill>
-        <a:effectLst/>
-      </p:bgPr>
-    </p:bg>
     <p:spTree>
       <p:nvGrpSpPr>
         <p:cNvPr id="1" name=""/>
@@ -4851,18 +4805,229 @@
           <a:chExt cx="0" cy="0"/>
         </a:xfrm>
       </p:grpSpPr>
+      <p:sp>
+        <p:nvSpPr>
+          <p:cNvPr id="2" name="Title 1"/>
+          <p:cNvSpPr>
+            <a:spLocks noGrp="1"/>
+          </p:cNvSpPr>
+          <p:nvPr>
+            <p:ph type="title"/>
+          </p:nvPr>
+        </p:nvSpPr>
+        <p:spPr/>
+        <p:txBody>
+          <a:bodyPr/>
+          <a:lstStyle/>
+          <a:p>
+            <a:r>
+              <a:rPr lang="da-DK" dirty="0" smtClean="0"/>
+              <a:t>Refactor: Introduce variable</a:t>
+            </a:r>
+            <a:endParaRPr lang="da-DK" dirty="0"/>
+          </a:p>
+        </p:txBody>
+      </p:sp>
+      <p:sp>
+        <p:nvSpPr>
+          <p:cNvPr id="3" name="Content Placeholder 2"/>
+          <p:cNvSpPr>
+            <a:spLocks noGrp="1"/>
+          </p:cNvSpPr>
+          <p:nvPr>
+            <p:ph idx="1"/>
+          </p:nvPr>
+        </p:nvSpPr>
+        <p:spPr/>
+        <p:txBody>
+          <a:bodyPr/>
+          <a:lstStyle/>
+          <a:p>
+            <a:r>
+              <a:rPr lang="da-DK" dirty="0" smtClean="0"/>
+              <a:t>Extract an expression into a variable</a:t>
+            </a:r>
+            <a:endParaRPr lang="da-DK" dirty="0"/>
+          </a:p>
+        </p:txBody>
+      </p:sp>
+      <p:pic>
+        <p:nvPicPr>
+          <p:cNvPr id="1026" name="Picture 2"/>
+          <p:cNvPicPr>
+            <a:picLocks noChangeAspect="1" noChangeArrowheads="1"/>
+          </p:cNvPicPr>
+          <p:nvPr/>
+        </p:nvPicPr>
+        <p:blipFill>
+          <a:blip r:embed="rId2" cstate="print"/>
+          <a:srcRect/>
+          <a:stretch>
+            <a:fillRect/>
+          </a:stretch>
+        </p:blipFill>
+        <p:spPr bwMode="auto">
+          <a:xfrm>
+            <a:off x="228600" y="3048000"/>
+            <a:ext cx="2916485" cy="1190625"/>
+          </a:xfrm>
+          <a:prstGeom prst="rect">
+            <a:avLst/>
+          </a:prstGeom>
+          <a:ln>
+            <a:headEnd/>
+            <a:tailEnd/>
+          </a:ln>
+        </p:spPr>
+        <p:style>
+          <a:lnRef idx="2">
+            <a:schemeClr val="accent1"/>
+          </a:lnRef>
+          <a:fillRef idx="1">
+            <a:schemeClr val="lt1"/>
+          </a:fillRef>
+          <a:effectRef idx="0">
+            <a:schemeClr val="accent1"/>
+          </a:effectRef>
+          <a:fontRef idx="minor">
+            <a:schemeClr val="dk1"/>
+          </a:fontRef>
+        </p:style>
+      </p:pic>
+      <p:pic>
+        <p:nvPicPr>
+          <p:cNvPr id="1027" name="Picture 3"/>
+          <p:cNvPicPr>
+            <a:picLocks noChangeAspect="1" noChangeArrowheads="1"/>
+          </p:cNvPicPr>
+          <p:nvPr/>
+        </p:nvPicPr>
+        <p:blipFill>
+          <a:blip r:embed="rId3" cstate="print"/>
+          <a:srcRect/>
+          <a:stretch>
+            <a:fillRect/>
+          </a:stretch>
+        </p:blipFill>
+        <p:spPr bwMode="auto">
+          <a:xfrm>
+            <a:off x="1371600" y="4724400"/>
+            <a:ext cx="3922806" cy="1123950"/>
+          </a:xfrm>
+          <a:prstGeom prst="rect">
+            <a:avLst/>
+          </a:prstGeom>
+          <a:ln>
+            <a:headEnd/>
+            <a:tailEnd/>
+          </a:ln>
+        </p:spPr>
+        <p:style>
+          <a:lnRef idx="2">
+            <a:schemeClr val="accent1"/>
+          </a:lnRef>
+          <a:fillRef idx="1">
+            <a:schemeClr val="lt1"/>
+          </a:fillRef>
+          <a:effectRef idx="0">
+            <a:schemeClr val="accent1"/>
+          </a:effectRef>
+          <a:fontRef idx="minor">
+            <a:schemeClr val="dk1"/>
+          </a:fontRef>
+        </p:style>
+      </p:pic>
+      <p:pic>
+        <p:nvPicPr>
+          <p:cNvPr id="1028" name="Picture 4"/>
+          <p:cNvPicPr>
+            <a:picLocks noChangeAspect="1" noChangeArrowheads="1"/>
+          </p:cNvPicPr>
+          <p:nvPr/>
+        </p:nvPicPr>
+        <p:blipFill>
+          <a:blip r:embed="rId4" cstate="print"/>
+          <a:srcRect/>
+          <a:stretch>
+            <a:fillRect/>
+          </a:stretch>
+        </p:blipFill>
+        <p:spPr bwMode="auto">
+          <a:xfrm>
+            <a:off x="6400800" y="4191000"/>
+            <a:ext cx="2257425" cy="858923"/>
+          </a:xfrm>
+          <a:prstGeom prst="rect">
+            <a:avLst/>
+          </a:prstGeom>
+          <a:ln>
+            <a:headEnd/>
+            <a:tailEnd/>
+          </a:ln>
+        </p:spPr>
+        <p:style>
+          <a:lnRef idx="2">
+            <a:schemeClr val="accent1"/>
+          </a:lnRef>
+          <a:fillRef idx="1">
+            <a:schemeClr val="lt1"/>
+          </a:fillRef>
+          <a:effectRef idx="0">
+            <a:schemeClr val="accent1"/>
+          </a:effectRef>
+          <a:fontRef idx="minor">
+            <a:schemeClr val="dk1"/>
+          </a:fontRef>
+        </p:style>
+      </p:pic>
+      <p:pic>
+        <p:nvPicPr>
+          <p:cNvPr id="1029" name="Picture 5"/>
+          <p:cNvPicPr>
+            <a:picLocks noChangeAspect="1" noChangeArrowheads="1"/>
+          </p:cNvPicPr>
+          <p:nvPr/>
+        </p:nvPicPr>
+        <p:blipFill>
+          <a:blip r:embed="rId5" cstate="print"/>
+          <a:srcRect/>
+          <a:stretch>
+            <a:fillRect/>
+          </a:stretch>
+        </p:blipFill>
+        <p:spPr bwMode="auto">
+          <a:xfrm>
+            <a:off x="4343400" y="3352800"/>
+            <a:ext cx="4450842" cy="628650"/>
+          </a:xfrm>
+          <a:prstGeom prst="rect">
+            <a:avLst/>
+          </a:prstGeom>
+          <a:ln>
+            <a:headEnd/>
+            <a:tailEnd/>
+          </a:ln>
+        </p:spPr>
+        <p:style>
+          <a:lnRef idx="2">
+            <a:schemeClr val="accent1"/>
+          </a:lnRef>
+          <a:fillRef idx="1">
+            <a:schemeClr val="lt1"/>
+          </a:fillRef>
+          <a:effectRef idx="0">
+            <a:schemeClr val="accent1"/>
+          </a:effectRef>
+          <a:fontRef idx="minor">
+            <a:schemeClr val="dk1"/>
+          </a:fontRef>
+        </p:style>
+      </p:pic>
     </p:spTree>
   </p:cSld>
   <p:clrMapOvr>
     <a:masterClrMapping/>
   </p:clrMapOvr>
-  <p:timing>
-    <p:tnLst>
-      <p:par>
-        <p:cTn id="1" dur="indefinite" restart="never" nodeType="tmRoot"/>
-      </p:par>
-    </p:tnLst>
-  </p:timing>
 </p:sld>
 </file>
 
@@ -4900,7 +5065,7 @@
           <a:p>
             <a:r>
               <a:rPr lang="da-DK" dirty="0" smtClean="0"/>
-              <a:t>Completion Modes</a:t>
+              <a:t>Refactor: Inline variable</a:t>
             </a:r>
             <a:endParaRPr lang="da-DK" dirty="0"/>
           </a:p>
@@ -4923,39 +5088,147 @@
           <a:p>
             <a:r>
               <a:rPr lang="da-DK" dirty="0" smtClean="0"/>
-              <a:t>IntelliSense</a:t>
-            </a:r>
-          </a:p>
-          <a:p>
-            <a:endParaRPr lang="da-DK" dirty="0" smtClean="0"/>
-          </a:p>
-          <a:p>
-            <a:r>
-              <a:rPr lang="da-DK" dirty="0" smtClean="0"/>
-              <a:t>Import Completion</a:t>
-            </a:r>
-          </a:p>
-          <a:p>
-            <a:endParaRPr lang="da-DK" dirty="0" smtClean="0"/>
-          </a:p>
-          <a:p>
-            <a:r>
-              <a:rPr lang="da-DK" dirty="0" smtClean="0"/>
-              <a:t>Smart Completion</a:t>
-            </a:r>
-          </a:p>
-          <a:p>
-            <a:pPr>
-              <a:buNone/>
-            </a:pPr>
-            <a:r>
-              <a:rPr lang="da-DK" dirty="0" smtClean="0"/>
-              <a:t>	</a:t>
+              <a:t>Opposite of Introduce variable</a:t>
+            </a:r>
+          </a:p>
+          <a:p>
+            <a:r>
+              <a:rPr lang="da-DK" dirty="0" smtClean="0"/>
+              <a:t>Replaces variable with expression</a:t>
             </a:r>
             <a:endParaRPr lang="da-DK" dirty="0"/>
           </a:p>
         </p:txBody>
       </p:sp>
+      <p:pic>
+        <p:nvPicPr>
+          <p:cNvPr id="2050" name="Picture 2"/>
+          <p:cNvPicPr>
+            <a:picLocks noChangeAspect="1" noChangeArrowheads="1"/>
+          </p:cNvPicPr>
+          <p:nvPr/>
+        </p:nvPicPr>
+        <p:blipFill>
+          <a:blip r:embed="rId2" cstate="print"/>
+          <a:srcRect/>
+          <a:stretch>
+            <a:fillRect/>
+          </a:stretch>
+        </p:blipFill>
+        <p:spPr bwMode="auto">
+          <a:xfrm>
+            <a:off x="4572000" y="5181600"/>
+            <a:ext cx="4059939" cy="1062037"/>
+          </a:xfrm>
+          <a:prstGeom prst="rect">
+            <a:avLst/>
+          </a:prstGeom>
+          <a:ln>
+            <a:headEnd/>
+            <a:tailEnd/>
+          </a:ln>
+        </p:spPr>
+        <p:style>
+          <a:lnRef idx="2">
+            <a:schemeClr val="accent1"/>
+          </a:lnRef>
+          <a:fillRef idx="1">
+            <a:schemeClr val="lt1"/>
+          </a:fillRef>
+          <a:effectRef idx="0">
+            <a:schemeClr val="accent1"/>
+          </a:effectRef>
+          <a:fontRef idx="minor">
+            <a:schemeClr val="dk1"/>
+          </a:fontRef>
+        </p:style>
+      </p:pic>
+      <p:pic>
+        <p:nvPicPr>
+          <p:cNvPr id="5" name="Picture 4"/>
+          <p:cNvPicPr>
+            <a:picLocks noChangeAspect="1" noChangeArrowheads="1"/>
+          </p:cNvPicPr>
+          <p:nvPr/>
+        </p:nvPicPr>
+        <p:blipFill>
+          <a:blip r:embed="rId3" cstate="print"/>
+          <a:srcRect/>
+          <a:stretch>
+            <a:fillRect/>
+          </a:stretch>
+        </p:blipFill>
+        <p:spPr bwMode="auto">
+          <a:xfrm>
+            <a:off x="457200" y="4648200"/>
+            <a:ext cx="2257425" cy="858923"/>
+          </a:xfrm>
+          <a:prstGeom prst="rect">
+            <a:avLst/>
+          </a:prstGeom>
+          <a:ln>
+            <a:headEnd/>
+            <a:tailEnd/>
+          </a:ln>
+        </p:spPr>
+        <p:style>
+          <a:lnRef idx="2">
+            <a:schemeClr val="accent1"/>
+          </a:lnRef>
+          <a:fillRef idx="1">
+            <a:schemeClr val="lt1"/>
+          </a:fillRef>
+          <a:effectRef idx="0">
+            <a:schemeClr val="accent1"/>
+          </a:effectRef>
+          <a:fontRef idx="minor">
+            <a:schemeClr val="dk1"/>
+          </a:fontRef>
+        </p:style>
+      </p:pic>
+      <p:pic>
+        <p:nvPicPr>
+          <p:cNvPr id="6" name="Picture 5"/>
+          <p:cNvPicPr>
+            <a:picLocks noChangeAspect="1" noChangeArrowheads="1"/>
+          </p:cNvPicPr>
+          <p:nvPr/>
+        </p:nvPicPr>
+        <p:blipFill>
+          <a:blip r:embed="rId4" cstate="print"/>
+          <a:srcRect/>
+          <a:stretch>
+            <a:fillRect/>
+          </a:stretch>
+        </p:blipFill>
+        <p:spPr bwMode="auto">
+          <a:xfrm>
+            <a:off x="457200" y="3657600"/>
+            <a:ext cx="4450842" cy="628650"/>
+          </a:xfrm>
+          <a:prstGeom prst="rect">
+            <a:avLst/>
+          </a:prstGeom>
+          <a:ln>
+            <a:headEnd/>
+            <a:tailEnd/>
+          </a:ln>
+        </p:spPr>
+        <p:style>
+          <a:lnRef idx="2">
+            <a:schemeClr val="accent1"/>
+          </a:lnRef>
+          <a:fillRef idx="1">
+            <a:schemeClr val="lt1"/>
+          </a:fillRef>
+          <a:effectRef idx="0">
+            <a:schemeClr val="accent1"/>
+          </a:effectRef>
+          <a:fontRef idx="minor">
+            <a:schemeClr val="dk1"/>
+          </a:fontRef>
+        </p:style>
+      </p:pic>
     </p:spTree>
   </p:cSld>
   <p:clrMapOvr>
@@ -5020,22 +5293,7 @@
                   <a:schemeClr val="bg1"/>
                 </a:solidFill>
               </a:rPr>
-              <a:t>Variables </a:t>
-            </a:r>
-            <a:br>
-              <a:rPr lang="da-DK" dirty="0" smtClean="0">
-                <a:solidFill>
-                  <a:schemeClr val="bg1"/>
-                </a:solidFill>
-              </a:rPr>
-            </a:br>
-            <a:r>
-              <a:rPr lang="da-DK" dirty="0" smtClean="0">
-                <a:solidFill>
-                  <a:schemeClr val="bg1"/>
-                </a:solidFill>
-              </a:rPr>
-              <a:t>and Code Completion</a:t>
+              <a:t>Introduce and Inline variable</a:t>
             </a:r>
             <a:endParaRPr lang="da-DK" dirty="0">
               <a:solidFill>
@@ -5058,7 +5316,7 @@
         <p:spPr/>
         <p:txBody>
           <a:bodyPr>
-            <a:normAutofit/>
+            <a:normAutofit fontScale="92500" lnSpcReduction="10000"/>
           </a:bodyPr>
           <a:lstStyle/>
           <a:p>
@@ -5075,18 +5333,7 @@
                   <a:schemeClr val="bg1"/>
                 </a:solidFill>
               </a:rPr>
-              <a:t>Quick fix</a:t>
-            </a:r>
-          </a:p>
-          <a:p>
-            <a:pPr lvl="1"/>
-            <a:r>
-              <a:rPr lang="da-DK" b="1" dirty="0" smtClean="0">
-                <a:solidFill>
-                  <a:schemeClr val="accent6"/>
-                </a:solidFill>
-              </a:rPr>
-              <a:t>Alt + Enter</a:t>
+              <a:t>Refactor this</a:t>
             </a:r>
             <a:endParaRPr lang="da-DK" dirty="0" smtClean="0">
               <a:solidFill>
@@ -5095,6 +5342,15 @@
             </a:endParaRPr>
           </a:p>
           <a:p>
+            <a:pPr lvl="1"/>
+            <a:r>
+              <a:rPr lang="da-DK" b="1" dirty="0" smtClean="0">
+                <a:solidFill>
+                  <a:schemeClr val="accent6"/>
+                </a:solidFill>
+              </a:rPr>
+              <a:t>Ctrl + Shift + R</a:t>
+            </a:r>
             <a:endParaRPr lang="da-DK" dirty="0" smtClean="0">
               <a:solidFill>
                 <a:schemeClr val="bg1"/>
@@ -5102,22 +5358,68 @@
             </a:endParaRPr>
           </a:p>
           <a:p>
+            <a:endParaRPr lang="da-DK" dirty="0" smtClean="0">
+              <a:solidFill>
+                <a:schemeClr val="bg1"/>
+              </a:solidFill>
+            </a:endParaRPr>
+          </a:p>
+          <a:p>
             <a:r>
               <a:rPr lang="da-DK" dirty="0" smtClean="0">
                 <a:solidFill>
                   <a:schemeClr val="bg1"/>
                 </a:solidFill>
               </a:rPr>
-              <a:t>Generate </a:t>
-            </a:r>
+              <a:t>Refactor: Introduce variable</a:t>
+            </a:r>
+            <a:endParaRPr lang="da-DK" dirty="0" smtClean="0">
+              <a:solidFill>
+                <a:schemeClr val="bg1"/>
+              </a:solidFill>
+            </a:endParaRPr>
+          </a:p>
+          <a:p>
+            <a:pPr lvl="1"/>
+            <a:r>
+              <a:rPr lang="da-DK" b="1" dirty="0" smtClean="0">
+                <a:solidFill>
+                  <a:schemeClr val="accent6"/>
+                </a:solidFill>
+              </a:rPr>
+              <a:t>Ctrl + R, Ctrl + V</a:t>
+            </a:r>
+          </a:p>
+          <a:p>
+            <a:pPr lvl="1"/>
+            <a:endParaRPr lang="da-DK" b="1" dirty="0" smtClean="0">
+              <a:solidFill>
+                <a:schemeClr val="accent6"/>
+              </a:solidFill>
+            </a:endParaRPr>
+          </a:p>
+          <a:p>
             <a:r>
               <a:rPr lang="da-DK" dirty="0" smtClean="0">
                 <a:solidFill>
                   <a:schemeClr val="bg1"/>
                 </a:solidFill>
               </a:rPr>
-              <a:t>code</a:t>
-            </a:r>
+              <a:t>Refactor: </a:t>
+            </a:r>
+            <a:r>
+              <a:rPr lang="da-DK" dirty="0" smtClean="0">
+                <a:solidFill>
+                  <a:schemeClr val="bg1"/>
+                </a:solidFill>
+              </a:rPr>
+              <a:t>Inline variable (or method)</a:t>
+            </a:r>
+            <a:endParaRPr lang="da-DK" dirty="0" smtClean="0">
+              <a:solidFill>
+                <a:schemeClr val="bg1"/>
+              </a:solidFill>
+            </a:endParaRPr>
           </a:p>
           <a:p>
             <a:pPr lvl="1"/>
@@ -5127,7 +5429,7 @@
                   <a:schemeClr val="accent6"/>
                 </a:solidFill>
               </a:rPr>
-              <a:t>Alt + </a:t>
+              <a:t>Ctrl + R, Ctrl + </a:t>
             </a:r>
             <a:r>
               <a:rPr lang="da-DK" b="1" dirty="0" smtClean="0">
@@ -5135,8 +5437,16 @@
                   <a:schemeClr val="accent6"/>
                 </a:solidFill>
               </a:rPr>
-              <a:t>Insert</a:t>
-            </a:r>
+              <a:t>I</a:t>
+            </a:r>
+            <a:endParaRPr lang="da-DK" b="1" dirty="0" smtClean="0">
+              <a:solidFill>
+                <a:schemeClr val="accent6"/>
+              </a:solidFill>
+            </a:endParaRPr>
+          </a:p>
+          <a:p>
+            <a:pPr lvl="1"/>
             <a:endParaRPr lang="da-DK" b="1" dirty="0" smtClean="0">
               <a:solidFill>
                 <a:schemeClr val="accent6"/>
@@ -5315,6 +5625,14 @@
 <file path=ppt/slides/slide20.xml><?xml version="1.0" encoding="utf-8"?>
 <p:sld xmlns:a="http://schemas.openxmlformats.org/drawingml/2006/main" xmlns:r="http://schemas.openxmlformats.org/officeDocument/2006/relationships" xmlns:p="http://schemas.openxmlformats.org/presentationml/2006/main">
   <p:cSld>
+    <p:bg>
+      <p:bgPr>
+        <a:solidFill>
+          <a:srgbClr val="00B050"/>
+        </a:solidFill>
+        <a:effectLst/>
+      </p:bgPr>
+    </p:bg>
     <p:spTree>
       <p:nvGrpSpPr>
         <p:cNvPr id="1" name=""/>
@@ -5329,6 +5647,38 @@
           <a:chExt cx="0" cy="0"/>
         </a:xfrm>
       </p:grpSpPr>
+    </p:spTree>
+  </p:cSld>
+  <p:clrMapOvr>
+    <a:masterClrMapping/>
+  </p:clrMapOvr>
+  <p:timing>
+    <p:tnLst>
+      <p:par>
+        <p:cTn id="1" dur="indefinite" restart="never" nodeType="tmRoot"/>
+      </p:par>
+    </p:tnLst>
+  </p:timing>
+</p:sld>
+</file>
+
+<file path=ppt/slides/slide21.xml><?xml version="1.0" encoding="utf-8"?>
+<p:sld xmlns:a="http://schemas.openxmlformats.org/drawingml/2006/main" xmlns:r="http://schemas.openxmlformats.org/officeDocument/2006/relationships" xmlns:p="http://schemas.openxmlformats.org/presentationml/2006/main">
+  <p:cSld>
+    <p:spTree>
+      <p:nvGrpSpPr>
+        <p:cNvPr id="1" name=""/>
+        <p:cNvGrpSpPr/>
+        <p:nvPr/>
+      </p:nvGrpSpPr>
+      <p:grpSpPr>
+        <a:xfrm>
+          <a:off x="0" y="0"/>
+          <a:ext cx="0" cy="0"/>
+          <a:chOff x="0" y="0"/>
+          <a:chExt cx="0" cy="0"/>
+        </a:xfrm>
+      </p:grpSpPr>
       <p:sp>
         <p:nvSpPr>
           <p:cNvPr id="2" name="Title 1"/>
@@ -5341,14 +5691,12 @@
         </p:nvSpPr>
         <p:spPr/>
         <p:txBody>
-          <a:bodyPr>
-            <a:normAutofit/>
-          </a:bodyPr>
-          <a:lstStyle/>
-          <a:p>
-            <a:r>
-              <a:rPr lang="da-DK" dirty="0" smtClean="0"/>
-              <a:t>Usage Inspection</a:t>
+          <a:bodyPr/>
+          <a:lstStyle/>
+          <a:p>
+            <a:r>
+              <a:rPr lang="da-DK" dirty="0" smtClean="0"/>
+              <a:t>Completion Modes</a:t>
             </a:r>
             <a:endParaRPr lang="da-DK" dirty="0"/>
           </a:p>
@@ -5371,51 +5719,35 @@
           <a:p>
             <a:r>
               <a:rPr lang="da-DK" dirty="0" smtClean="0"/>
-              <a:t>Highlight symbols</a:t>
-            </a:r>
-          </a:p>
-          <a:p>
-            <a:pPr lvl="1"/>
-            <a:r>
-              <a:rPr lang="da-DK" dirty="0" smtClean="0"/>
-              <a:t>Single method or small class</a:t>
-            </a:r>
-          </a:p>
-          <a:p>
-            <a:pPr lvl="1"/>
+              <a:t>IntelliSense</a:t>
+            </a:r>
+          </a:p>
+          <a:p>
             <a:endParaRPr lang="da-DK" dirty="0" smtClean="0"/>
           </a:p>
           <a:p>
             <a:r>
               <a:rPr lang="da-DK" dirty="0" smtClean="0"/>
-              <a:t>Find usages</a:t>
-            </a:r>
-          </a:p>
-          <a:p>
-            <a:pPr lvl="1"/>
-            <a:r>
-              <a:rPr lang="da-DK" dirty="0" smtClean="0"/>
-              <a:t>Single public method or property</a:t>
-            </a:r>
-          </a:p>
-          <a:p>
-            <a:pPr lvl="1"/>
+              <a:t>Import Completion</a:t>
+            </a:r>
+          </a:p>
+          <a:p>
             <a:endParaRPr lang="da-DK" dirty="0" smtClean="0"/>
           </a:p>
           <a:p>
             <a:r>
               <a:rPr lang="da-DK" dirty="0" smtClean="0"/>
-              <a:t>Method tracking</a:t>
-            </a:r>
-          </a:p>
-          <a:p>
-            <a:pPr lvl="1"/>
-            <a:r>
-              <a:rPr lang="da-DK" dirty="0" smtClean="0"/>
-              <a:t>Entire flows</a:t>
-            </a:r>
-          </a:p>
-          <a:p>
+              <a:t>Smart Completion</a:t>
+            </a:r>
+          </a:p>
+          <a:p>
+            <a:pPr>
+              <a:buNone/>
+            </a:pPr>
+            <a:r>
+              <a:rPr lang="da-DK" dirty="0" smtClean="0"/>
+              <a:t>	</a:t>
+            </a:r>
             <a:endParaRPr lang="da-DK" dirty="0"/>
           </a:p>
         </p:txBody>
@@ -5428,7 +5760,7 @@
 </p:sld>
 </file>
 
-<file path=ppt/slides/slide21.xml><?xml version="1.0" encoding="utf-8"?>
+<file path=ppt/slides/slide22.xml><?xml version="1.0" encoding="utf-8"?>
 <p:sld xmlns:a="http://schemas.openxmlformats.org/drawingml/2006/main" xmlns:r="http://schemas.openxmlformats.org/officeDocument/2006/relationships" xmlns:p="http://schemas.openxmlformats.org/presentationml/2006/main">
   <p:cSld>
     <p:bg>
@@ -5465,7 +5797,9 @@
         </p:nvSpPr>
         <p:spPr/>
         <p:txBody>
-          <a:bodyPr/>
+          <a:bodyPr>
+            <a:normAutofit/>
+          </a:bodyPr>
           <a:lstStyle/>
           <a:p>
             <a:r>
@@ -5482,7 +5816,7 @@
                   <a:schemeClr val="bg1"/>
                 </a:solidFill>
               </a:rPr>
-              <a:t>Find Usages</a:t>
+              <a:t>Import Completion</a:t>
             </a:r>
             <a:endParaRPr lang="da-DK" dirty="0">
               <a:solidFill>
@@ -5555,15 +5889,7 @@
                   <a:schemeClr val="bg1"/>
                 </a:solidFill>
               </a:rPr>
-              <a:t>Generate </a:t>
-            </a:r>
-            <a:r>
-              <a:rPr lang="da-DK" dirty="0" smtClean="0">
-                <a:solidFill>
-                  <a:schemeClr val="bg1"/>
-                </a:solidFill>
-              </a:rPr>
-              <a:t>code</a:t>
+              <a:t>Generate code</a:t>
             </a:r>
           </a:p>
           <a:p>
@@ -5574,21 +5900,8 @@
                   <a:schemeClr val="accent6"/>
                 </a:solidFill>
               </a:rPr>
-              <a:t>Alt + </a:t>
-            </a:r>
-            <a:r>
-              <a:rPr lang="da-DK" b="1" dirty="0" smtClean="0">
-                <a:solidFill>
-                  <a:schemeClr val="accent6"/>
-                </a:solidFill>
-              </a:rPr>
-              <a:t>Insert</a:t>
-            </a:r>
-            <a:endParaRPr lang="da-DK" b="1" dirty="0" smtClean="0">
-              <a:solidFill>
-                <a:schemeClr val="accent6"/>
-              </a:solidFill>
-            </a:endParaRPr>
+              <a:t>Alt + Insert</a:t>
+            </a:r>
           </a:p>
         </p:txBody>
       </p:sp>
@@ -5607,7 +5920,7 @@
 </p:sld>
 </file>
 
-<file path=ppt/slides/slide22.xml><?xml version="1.0" encoding="utf-8"?>
+<file path=ppt/slides/slide23.xml><?xml version="1.0" encoding="utf-8"?>
 <p:sld xmlns:a="http://schemas.openxmlformats.org/drawingml/2006/main" xmlns:r="http://schemas.openxmlformats.org/officeDocument/2006/relationships" xmlns:p="http://schemas.openxmlformats.org/presentationml/2006/main">
   <p:cSld>
     <p:spTree>
@@ -5636,69 +5949,82 @@
         </p:nvSpPr>
         <p:spPr/>
         <p:txBody>
+          <a:bodyPr>
+            <a:normAutofit/>
+          </a:bodyPr>
+          <a:lstStyle/>
+          <a:p>
+            <a:r>
+              <a:rPr lang="da-DK" dirty="0" smtClean="0"/>
+              <a:t>Usage Inspection</a:t>
+            </a:r>
+            <a:endParaRPr lang="da-DK" dirty="0"/>
+          </a:p>
+        </p:txBody>
+      </p:sp>
+      <p:sp>
+        <p:nvSpPr>
+          <p:cNvPr id="3" name="Content Placeholder 2"/>
+          <p:cNvSpPr>
+            <a:spLocks noGrp="1"/>
+          </p:cNvSpPr>
+          <p:nvPr>
+            <p:ph idx="1"/>
+          </p:nvPr>
+        </p:nvSpPr>
+        <p:spPr/>
+        <p:txBody>
           <a:bodyPr/>
           <a:lstStyle/>
           <a:p>
             <a:r>
               <a:rPr lang="da-DK" dirty="0" smtClean="0"/>
-              <a:t>Navigating Hierarchies</a:t>
-            </a:r>
+              <a:t>Highlight symbols</a:t>
+            </a:r>
+          </a:p>
+          <a:p>
+            <a:pPr lvl="1"/>
+            <a:r>
+              <a:rPr lang="da-DK" dirty="0" smtClean="0"/>
+              <a:t>Single method or small class</a:t>
+            </a:r>
+          </a:p>
+          <a:p>
+            <a:pPr lvl="1"/>
+            <a:endParaRPr lang="da-DK" dirty="0" smtClean="0"/>
+          </a:p>
+          <a:p>
+            <a:r>
+              <a:rPr lang="da-DK" dirty="0" smtClean="0"/>
+              <a:t>Find usages</a:t>
+            </a:r>
+          </a:p>
+          <a:p>
+            <a:pPr lvl="1"/>
+            <a:r>
+              <a:rPr lang="da-DK" dirty="0" smtClean="0"/>
+              <a:t>Single public method or property</a:t>
+            </a:r>
+          </a:p>
+          <a:p>
+            <a:pPr lvl="1"/>
+            <a:endParaRPr lang="da-DK" dirty="0" smtClean="0"/>
+          </a:p>
+          <a:p>
+            <a:r>
+              <a:rPr lang="da-DK" dirty="0" smtClean="0"/>
+              <a:t>Method tracking</a:t>
+            </a:r>
+          </a:p>
+          <a:p>
+            <a:pPr lvl="1"/>
+            <a:r>
+              <a:rPr lang="da-DK" dirty="0" smtClean="0"/>
+              <a:t>Entire flows</a:t>
+            </a:r>
+          </a:p>
+          <a:p>
             <a:endParaRPr lang="da-DK" dirty="0"/>
-          </a:p>
-        </p:txBody>
-      </p:sp>
-      <p:sp>
-        <p:nvSpPr>
-          <p:cNvPr id="3" name="Content Placeholder 2"/>
-          <p:cNvSpPr>
-            <a:spLocks noGrp="1"/>
-          </p:cNvSpPr>
-          <p:nvPr>
-            <p:ph idx="1"/>
-          </p:nvPr>
-        </p:nvSpPr>
-        <p:spPr/>
-        <p:txBody>
-          <a:bodyPr/>
-          <a:lstStyle/>
-          <a:p>
-            <a:r>
-              <a:rPr lang="da-DK" dirty="0" smtClean="0"/>
-              <a:t>Type Hierarchy</a:t>
-            </a:r>
-          </a:p>
-          <a:p>
-            <a:endParaRPr lang="da-DK" dirty="0" smtClean="0"/>
-          </a:p>
-          <a:p>
-            <a:endParaRPr lang="da-DK" dirty="0" smtClean="0"/>
-          </a:p>
-          <a:p>
-            <a:r>
-              <a:rPr lang="da-DK" dirty="0" smtClean="0"/>
-              <a:t>Go to</a:t>
-            </a:r>
-          </a:p>
-          <a:p>
-            <a:pPr lvl="1"/>
-            <a:r>
-              <a:rPr lang="da-DK" dirty="0" smtClean="0"/>
-              <a:t>Declaration</a:t>
-            </a:r>
-          </a:p>
-          <a:p>
-            <a:pPr lvl="1"/>
-            <a:r>
-              <a:rPr lang="da-DK" dirty="0" smtClean="0"/>
-              <a:t>Base</a:t>
-            </a:r>
-          </a:p>
-          <a:p>
-            <a:pPr lvl="1"/>
-            <a:r>
-              <a:rPr lang="da-DK" dirty="0" smtClean="0"/>
-              <a:t>Derived</a:t>
-            </a:r>
           </a:p>
         </p:txBody>
       </p:sp>
@@ -5710,7 +6036,7 @@
 </p:sld>
 </file>
 
-<file path=ppt/slides/slide23.xml><?xml version="1.0" encoding="utf-8"?>
+<file path=ppt/slides/slide24.xml><?xml version="1.0" encoding="utf-8"?>
 <p:sld xmlns:a="http://schemas.openxmlformats.org/drawingml/2006/main" xmlns:r="http://schemas.openxmlformats.org/officeDocument/2006/relationships" xmlns:p="http://schemas.openxmlformats.org/presentationml/2006/main">
   <p:cSld>
     <p:bg>
@@ -5756,15 +6082,7 @@
                   <a:schemeClr val="bg1"/>
                 </a:solidFill>
               </a:rPr>
-              <a:t>Exercise:  </a:t>
-            </a:r>
-            <a:r>
-              <a:rPr lang="da-DK" dirty="0" smtClean="0">
-                <a:solidFill>
-                  <a:schemeClr val="bg1"/>
-                </a:solidFill>
-              </a:rPr>
-              <a:t>Navigate hierarchies</a:t>
+              <a:t>Exercise:  Find Usages</a:t>
             </a:r>
             <a:endParaRPr lang="da-DK" dirty="0">
               <a:solidFill>
@@ -5837,15 +6155,7 @@
                   <a:schemeClr val="bg1"/>
                 </a:solidFill>
               </a:rPr>
-              <a:t>Generate </a:t>
-            </a:r>
-            <a:r>
-              <a:rPr lang="da-DK" dirty="0" smtClean="0">
-                <a:solidFill>
-                  <a:schemeClr val="bg1"/>
-                </a:solidFill>
-              </a:rPr>
-              <a:t>code</a:t>
+              <a:t>Generate code</a:t>
             </a:r>
           </a:p>
           <a:p>
@@ -5856,21 +6166,8 @@
                   <a:schemeClr val="accent6"/>
                 </a:solidFill>
               </a:rPr>
-              <a:t>Alt + </a:t>
-            </a:r>
-            <a:r>
-              <a:rPr lang="da-DK" b="1" dirty="0" smtClean="0">
-                <a:solidFill>
-                  <a:schemeClr val="accent6"/>
-                </a:solidFill>
-              </a:rPr>
-              <a:t>Insert</a:t>
-            </a:r>
-            <a:endParaRPr lang="da-DK" b="1" dirty="0" smtClean="0">
-              <a:solidFill>
-                <a:schemeClr val="accent6"/>
-              </a:solidFill>
-            </a:endParaRPr>
+              <a:t>Alt + Insert</a:t>
+            </a:r>
           </a:p>
         </p:txBody>
       </p:sp>
@@ -5889,7 +6186,7 @@
 </p:sld>
 </file>
 
-<file path=ppt/slides/slide24.xml><?xml version="1.0" encoding="utf-8"?>
+<file path=ppt/slides/slide25.xml><?xml version="1.0" encoding="utf-8"?>
 <p:sld xmlns:a="http://schemas.openxmlformats.org/drawingml/2006/main" xmlns:r="http://schemas.openxmlformats.org/officeDocument/2006/relationships" xmlns:p="http://schemas.openxmlformats.org/presentationml/2006/main">
   <p:cSld>
     <p:spTree>
@@ -5923,7 +6220,7 @@
           <a:p>
             <a:r>
               <a:rPr lang="da-DK" dirty="0" smtClean="0"/>
-              <a:t>Solution Explorer Refactorings</a:t>
+              <a:t>Navigating Hierarchies</a:t>
             </a:r>
             <a:endParaRPr lang="da-DK" dirty="0"/>
           </a:p>
@@ -5946,27 +6243,41 @@
           <a:p>
             <a:r>
               <a:rPr lang="da-DK" dirty="0" smtClean="0"/>
-              <a:t>Move types into matching files</a:t>
+              <a:t>Type Hierarchy</a:t>
             </a:r>
           </a:p>
           <a:p>
             <a:endParaRPr lang="da-DK" dirty="0" smtClean="0"/>
           </a:p>
           <a:p>
-            <a:r>
-              <a:rPr lang="da-DK" dirty="0" smtClean="0"/>
-              <a:t>Adjust namespaces</a:t>
-            </a:r>
-          </a:p>
-          <a:p>
             <a:endParaRPr lang="da-DK" dirty="0" smtClean="0"/>
           </a:p>
           <a:p>
             <a:r>
               <a:rPr lang="da-DK" dirty="0" smtClean="0"/>
-              <a:t>Move files into folder</a:t>
-            </a:r>
-            <a:endParaRPr lang="da-DK" dirty="0"/>
+              <a:t>Go to</a:t>
+            </a:r>
+          </a:p>
+          <a:p>
+            <a:pPr lvl="1"/>
+            <a:r>
+              <a:rPr lang="da-DK" dirty="0" smtClean="0"/>
+              <a:t>Declaration</a:t>
+            </a:r>
+          </a:p>
+          <a:p>
+            <a:pPr lvl="1"/>
+            <a:r>
+              <a:rPr lang="da-DK" dirty="0" smtClean="0"/>
+              <a:t>Base</a:t>
+            </a:r>
+          </a:p>
+          <a:p>
+            <a:pPr lvl="1"/>
+            <a:r>
+              <a:rPr lang="da-DK" dirty="0" smtClean="0"/>
+              <a:t>Derived</a:t>
+            </a:r>
           </a:p>
         </p:txBody>
       </p:sp>
@@ -5978,7 +6289,7 @@
 </p:sld>
 </file>
 
-<file path=ppt/slides/slide25.xml><?xml version="1.0" encoding="utf-8"?>
+<file path=ppt/slides/slide26.xml><?xml version="1.0" encoding="utf-8"?>
 <p:sld xmlns:a="http://schemas.openxmlformats.org/drawingml/2006/main" xmlns:r="http://schemas.openxmlformats.org/officeDocument/2006/relationships" xmlns:p="http://schemas.openxmlformats.org/presentationml/2006/main">
   <p:cSld>
     <p:bg>
@@ -6015,9 +6326,7 @@
         </p:nvSpPr>
         <p:spPr/>
         <p:txBody>
-          <a:bodyPr>
-            <a:normAutofit fontScale="90000"/>
-          </a:bodyPr>
+          <a:bodyPr/>
           <a:lstStyle/>
           <a:p>
             <a:r>
@@ -6026,30 +6335,7 @@
                   <a:schemeClr val="bg1"/>
                 </a:solidFill>
               </a:rPr>
-              <a:t>Exercise:  </a:t>
-            </a:r>
-            <a:r>
-              <a:rPr lang="da-DK" dirty="0" smtClean="0">
-                <a:solidFill>
-                  <a:schemeClr val="bg1"/>
-                </a:solidFill>
-              </a:rPr>
-              <a:t/>
-            </a:r>
-            <a:br>
-              <a:rPr lang="da-DK" dirty="0" smtClean="0">
-                <a:solidFill>
-                  <a:schemeClr val="bg1"/>
-                </a:solidFill>
-              </a:rPr>
-            </a:br>
-            <a:r>
-              <a:rPr lang="da-DK" dirty="0" smtClean="0">
-                <a:solidFill>
-                  <a:schemeClr val="bg1"/>
-                </a:solidFill>
-              </a:rPr>
-              <a:t>Solution Explorer Refactorings</a:t>
+              <a:t>Exercise:  Navigate hierarchies</a:t>
             </a:r>
             <a:endParaRPr lang="da-DK" dirty="0">
               <a:solidFill>
@@ -6122,15 +6408,7 @@
                   <a:schemeClr val="bg1"/>
                 </a:solidFill>
               </a:rPr>
-              <a:t>Generate </a:t>
-            </a:r>
-            <a:r>
-              <a:rPr lang="da-DK" dirty="0" smtClean="0">
-                <a:solidFill>
-                  <a:schemeClr val="bg1"/>
-                </a:solidFill>
-              </a:rPr>
-              <a:t>code</a:t>
+              <a:t>Generate code</a:t>
             </a:r>
           </a:p>
           <a:p>
@@ -6141,21 +6419,8 @@
                   <a:schemeClr val="accent6"/>
                 </a:solidFill>
               </a:rPr>
-              <a:t>Alt + </a:t>
-            </a:r>
-            <a:r>
-              <a:rPr lang="da-DK" b="1" dirty="0" smtClean="0">
-                <a:solidFill>
-                  <a:schemeClr val="accent6"/>
-                </a:solidFill>
-              </a:rPr>
-              <a:t>Insert</a:t>
-            </a:r>
-            <a:endParaRPr lang="da-DK" b="1" dirty="0" smtClean="0">
-              <a:solidFill>
-                <a:schemeClr val="accent6"/>
-              </a:solidFill>
-            </a:endParaRPr>
+              <a:t>Alt + Insert</a:t>
+            </a:r>
           </a:p>
         </p:txBody>
       </p:sp>
@@ -6174,7 +6439,7 @@
 </p:sld>
 </file>
 
-<file path=ppt/slides/slide26.xml><?xml version="1.0" encoding="utf-8"?>
+<file path=ppt/slides/slide27.xml><?xml version="1.0" encoding="utf-8"?>
 <p:sld xmlns:a="http://schemas.openxmlformats.org/drawingml/2006/main" xmlns:r="http://schemas.openxmlformats.org/officeDocument/2006/relationships" xmlns:p="http://schemas.openxmlformats.org/presentationml/2006/main">
   <p:cSld>
     <p:spTree>
@@ -6208,7 +6473,7 @@
           <a:p>
             <a:r>
               <a:rPr lang="da-DK" dirty="0" smtClean="0"/>
-              <a:t>Move Code</a:t>
+              <a:t>Solution Explorer Refactorings</a:t>
             </a:r>
             <a:endParaRPr lang="da-DK" dirty="0"/>
           </a:p>
@@ -6229,6 +6494,28 @@
           <a:bodyPr/>
           <a:lstStyle/>
           <a:p>
+            <a:r>
+              <a:rPr lang="da-DK" dirty="0" smtClean="0"/>
+              <a:t>Move types into matching files</a:t>
+            </a:r>
+          </a:p>
+          <a:p>
+            <a:endParaRPr lang="da-DK" dirty="0" smtClean="0"/>
+          </a:p>
+          <a:p>
+            <a:r>
+              <a:rPr lang="da-DK" dirty="0" smtClean="0"/>
+              <a:t>Adjust namespaces</a:t>
+            </a:r>
+          </a:p>
+          <a:p>
+            <a:endParaRPr lang="da-DK" dirty="0" smtClean="0"/>
+          </a:p>
+          <a:p>
+            <a:r>
+              <a:rPr lang="da-DK" dirty="0" smtClean="0"/>
+              <a:t>Move files into folder</a:t>
+            </a:r>
             <a:endParaRPr lang="da-DK" dirty="0"/>
           </a:p>
         </p:txBody>
@@ -6241,7 +6528,7 @@
 </p:sld>
 </file>
 
-<file path=ppt/slides/slide27.xml><?xml version="1.0" encoding="utf-8"?>
+<file path=ppt/slides/slide28.xml><?xml version="1.0" encoding="utf-8"?>
 <p:sld xmlns:a="http://schemas.openxmlformats.org/drawingml/2006/main" xmlns:r="http://schemas.openxmlformats.org/officeDocument/2006/relationships" xmlns:p="http://schemas.openxmlformats.org/presentationml/2006/main">
   <p:cSld>
     <p:bg>
@@ -6278,7 +6565,9 @@
         </p:nvSpPr>
         <p:spPr/>
         <p:txBody>
-          <a:bodyPr/>
+          <a:bodyPr>
+            <a:normAutofit fontScale="90000"/>
+          </a:bodyPr>
           <a:lstStyle/>
           <a:p>
             <a:r>
@@ -6289,13 +6578,20 @@
               </a:rPr>
               <a:t>Exercise:  </a:t>
             </a:r>
-            <a:r>
+            <a:br>
               <a:rPr lang="da-DK" dirty="0" smtClean="0">
                 <a:solidFill>
                   <a:schemeClr val="bg1"/>
                 </a:solidFill>
               </a:rPr>
-              <a:t>Move Code</a:t>
+            </a:br>
+            <a:r>
+              <a:rPr lang="da-DK" dirty="0" smtClean="0">
+                <a:solidFill>
+                  <a:schemeClr val="bg1"/>
+                </a:solidFill>
+              </a:rPr>
+              <a:t>Solution Explorer Refactorings</a:t>
             </a:r>
             <a:endParaRPr lang="da-DK" dirty="0">
               <a:solidFill>
@@ -6368,15 +6664,7 @@
                   <a:schemeClr val="bg1"/>
                 </a:solidFill>
               </a:rPr>
-              <a:t>Generate </a:t>
-            </a:r>
-            <a:r>
-              <a:rPr lang="da-DK" dirty="0" smtClean="0">
-                <a:solidFill>
-                  <a:schemeClr val="bg1"/>
-                </a:solidFill>
-              </a:rPr>
-              <a:t>code</a:t>
+              <a:t>Generate code</a:t>
             </a:r>
           </a:p>
           <a:p>
@@ -6387,21 +6675,8 @@
                   <a:schemeClr val="accent6"/>
                 </a:solidFill>
               </a:rPr>
-              <a:t>Alt + </a:t>
-            </a:r>
-            <a:r>
-              <a:rPr lang="da-DK" b="1" dirty="0" smtClean="0">
-                <a:solidFill>
-                  <a:schemeClr val="accent6"/>
-                </a:solidFill>
-              </a:rPr>
-              <a:t>Insert</a:t>
-            </a:r>
-            <a:endParaRPr lang="da-DK" b="1" dirty="0" smtClean="0">
-              <a:solidFill>
-                <a:schemeClr val="accent6"/>
-              </a:solidFill>
-            </a:endParaRPr>
+              <a:t>Alt + Insert</a:t>
+            </a:r>
           </a:p>
         </p:txBody>
       </p:sp>
@@ -6420,7 +6695,7 @@
 </p:sld>
 </file>
 
-<file path=ppt/slides/slide28.xml><?xml version="1.0" encoding="utf-8"?>
+<file path=ppt/slides/slide29.xml><?xml version="1.0" encoding="utf-8"?>
 <p:sld xmlns:a="http://schemas.openxmlformats.org/drawingml/2006/main" xmlns:r="http://schemas.openxmlformats.org/officeDocument/2006/relationships" xmlns:p="http://schemas.openxmlformats.org/presentationml/2006/main">
   <p:cSld>
     <p:spTree>
@@ -6449,14 +6724,12 @@
         </p:nvSpPr>
         <p:spPr/>
         <p:txBody>
-          <a:bodyPr>
-            <a:normAutofit/>
-          </a:bodyPr>
-          <a:lstStyle/>
-          <a:p>
-            <a:r>
-              <a:rPr lang="da-DK" dirty="0" smtClean="0"/>
-              <a:t>Inspect This!</a:t>
+          <a:bodyPr/>
+          <a:lstStyle/>
+          <a:p>
+            <a:r>
+              <a:rPr lang="da-DK" dirty="0" smtClean="0"/>
+              <a:t>Move Code</a:t>
             </a:r>
             <a:endParaRPr lang="da-DK" dirty="0"/>
           </a:p>
@@ -6477,30 +6750,6 @@
           <a:bodyPr/>
           <a:lstStyle/>
           <a:p>
-            <a:r>
-              <a:rPr lang="da-DK" dirty="0" smtClean="0"/>
-              <a:t>Powerful analysis</a:t>
-            </a:r>
-          </a:p>
-          <a:p>
-            <a:pPr lvl="1"/>
-            <a:r>
-              <a:rPr lang="da-DK" dirty="0" smtClean="0"/>
-              <a:t>Values</a:t>
-            </a:r>
-          </a:p>
-          <a:p>
-            <a:pPr lvl="1"/>
-            <a:r>
-              <a:rPr lang="da-DK" dirty="0" smtClean="0"/>
-              <a:t>Methods</a:t>
-            </a:r>
-          </a:p>
-          <a:p>
-            <a:endParaRPr lang="da-DK" dirty="0" smtClean="0"/>
-          </a:p>
-          <a:p>
-            <a:pPr lvl="1"/>
             <a:endParaRPr lang="da-DK" dirty="0"/>
           </a:p>
         </p:txBody>
@@ -6510,185 +6759,6 @@
   <p:clrMapOvr>
     <a:masterClrMapping/>
   </p:clrMapOvr>
-</p:sld>
-</file>
-
-<file path=ppt/slides/slide29.xml><?xml version="1.0" encoding="utf-8"?>
-<p:sld xmlns:a="http://schemas.openxmlformats.org/drawingml/2006/main" xmlns:r="http://schemas.openxmlformats.org/officeDocument/2006/relationships" xmlns:p="http://schemas.openxmlformats.org/presentationml/2006/main">
-  <p:cSld>
-    <p:bg>
-      <p:bgPr>
-        <a:solidFill>
-          <a:schemeClr val="tx1"/>
-        </a:solidFill>
-        <a:effectLst/>
-      </p:bgPr>
-    </p:bg>
-    <p:spTree>
-      <p:nvGrpSpPr>
-        <p:cNvPr id="1" name=""/>
-        <p:cNvGrpSpPr/>
-        <p:nvPr/>
-      </p:nvGrpSpPr>
-      <p:grpSpPr>
-        <a:xfrm>
-          <a:off x="0" y="0"/>
-          <a:ext cx="0" cy="0"/>
-          <a:chOff x="0" y="0"/>
-          <a:chExt cx="0" cy="0"/>
-        </a:xfrm>
-      </p:grpSpPr>
-      <p:sp>
-        <p:nvSpPr>
-          <p:cNvPr id="2" name="Title 1"/>
-          <p:cNvSpPr>
-            <a:spLocks noGrp="1"/>
-          </p:cNvSpPr>
-          <p:nvPr>
-            <p:ph type="title"/>
-          </p:nvPr>
-        </p:nvSpPr>
-        <p:spPr/>
-        <p:txBody>
-          <a:bodyPr/>
-          <a:lstStyle/>
-          <a:p>
-            <a:r>
-              <a:rPr lang="da-DK" dirty="0" smtClean="0">
-                <a:solidFill>
-                  <a:schemeClr val="bg1"/>
-                </a:solidFill>
-              </a:rPr>
-              <a:t>Exercise:  </a:t>
-            </a:r>
-            <a:r>
-              <a:rPr lang="da-DK" dirty="0" smtClean="0">
-                <a:solidFill>
-                  <a:schemeClr val="bg1"/>
-                </a:solidFill>
-              </a:rPr>
-              <a:t>Inspect This!</a:t>
-            </a:r>
-            <a:endParaRPr lang="da-DK" dirty="0">
-              <a:solidFill>
-                <a:schemeClr val="bg1"/>
-              </a:solidFill>
-            </a:endParaRPr>
-          </a:p>
-        </p:txBody>
-      </p:sp>
-      <p:sp>
-        <p:nvSpPr>
-          <p:cNvPr id="3" name="Content Placeholder 2"/>
-          <p:cNvSpPr>
-            <a:spLocks noGrp="1"/>
-          </p:cNvSpPr>
-          <p:nvPr>
-            <p:ph idx="1"/>
-          </p:nvPr>
-        </p:nvSpPr>
-        <p:spPr/>
-        <p:txBody>
-          <a:bodyPr>
-            <a:normAutofit/>
-          </a:bodyPr>
-          <a:lstStyle/>
-          <a:p>
-            <a:endParaRPr lang="da-DK" dirty="0" smtClean="0">
-              <a:solidFill>
-                <a:schemeClr val="bg1"/>
-              </a:solidFill>
-            </a:endParaRPr>
-          </a:p>
-          <a:p>
-            <a:r>
-              <a:rPr lang="da-DK" dirty="0" smtClean="0">
-                <a:solidFill>
-                  <a:schemeClr val="bg1"/>
-                </a:solidFill>
-              </a:rPr>
-              <a:t>Quick fix</a:t>
-            </a:r>
-          </a:p>
-          <a:p>
-            <a:pPr lvl="1"/>
-            <a:r>
-              <a:rPr lang="da-DK" b="1" dirty="0" smtClean="0">
-                <a:solidFill>
-                  <a:schemeClr val="accent6"/>
-                </a:solidFill>
-              </a:rPr>
-              <a:t>Alt + Enter</a:t>
-            </a:r>
-            <a:endParaRPr lang="da-DK" dirty="0" smtClean="0">
-              <a:solidFill>
-                <a:schemeClr val="bg1"/>
-              </a:solidFill>
-            </a:endParaRPr>
-          </a:p>
-          <a:p>
-            <a:endParaRPr lang="da-DK" dirty="0" smtClean="0">
-              <a:solidFill>
-                <a:schemeClr val="bg1"/>
-              </a:solidFill>
-            </a:endParaRPr>
-          </a:p>
-          <a:p>
-            <a:r>
-              <a:rPr lang="da-DK" dirty="0" smtClean="0">
-                <a:solidFill>
-                  <a:schemeClr val="bg1"/>
-                </a:solidFill>
-              </a:rPr>
-              <a:t>Generate </a:t>
-            </a:r>
-            <a:r>
-              <a:rPr lang="da-DK" dirty="0" smtClean="0">
-                <a:solidFill>
-                  <a:schemeClr val="bg1"/>
-                </a:solidFill>
-              </a:rPr>
-              <a:t>code</a:t>
-            </a:r>
-          </a:p>
-          <a:p>
-            <a:pPr lvl="1"/>
-            <a:r>
-              <a:rPr lang="da-DK" b="1" dirty="0" smtClean="0">
-                <a:solidFill>
-                  <a:schemeClr val="accent6"/>
-                </a:solidFill>
-              </a:rPr>
-              <a:t>Alt + </a:t>
-            </a:r>
-            <a:r>
-              <a:rPr lang="da-DK" b="1" dirty="0" smtClean="0">
-                <a:solidFill>
-                  <a:schemeClr val="accent6"/>
-                </a:solidFill>
-              </a:rPr>
-              <a:t>Insert</a:t>
-            </a:r>
-            <a:endParaRPr lang="da-DK" b="1" dirty="0" smtClean="0">
-              <a:solidFill>
-                <a:schemeClr val="accent6"/>
-              </a:solidFill>
-            </a:endParaRPr>
-          </a:p>
-        </p:txBody>
-      </p:sp>
-    </p:spTree>
-  </p:cSld>
-  <p:clrMapOvr>
-    <a:masterClrMapping/>
-  </p:clrMapOvr>
-  <p:timing>
-    <p:tnLst>
-      <p:par>
-        <p:cTn id="1" dur="indefinite" restart="never" nodeType="tmRoot"/>
-      </p:par>
-    </p:tnLst>
-  </p:timing>
 </p:sld>
 </file>
 
@@ -7077,9 +7147,402 @@
     </p:spTree>
     <p:extLst>
       <p:ext uri="{BB962C8B-B14F-4D97-AF65-F5344CB8AC3E}">
-        <p14:creationId xmlns:p14="http://schemas.microsoft.com/office/powerpoint/2010/main" xmlns="" val="1712164881"/>
+        <p14:creationId xmlns="" xmlns:p14="http://schemas.microsoft.com/office/powerpoint/2010/main" val="1712164881"/>
       </p:ext>
     </p:extLst>
+  </p:cSld>
+  <p:clrMapOvr>
+    <a:masterClrMapping/>
+  </p:clrMapOvr>
+  <p:timing>
+    <p:tnLst>
+      <p:par>
+        <p:cTn id="1" dur="indefinite" restart="never" nodeType="tmRoot"/>
+      </p:par>
+    </p:tnLst>
+  </p:timing>
+</p:sld>
+</file>
+
+<file path=ppt/slides/slide30.xml><?xml version="1.0" encoding="utf-8"?>
+<p:sld xmlns:a="http://schemas.openxmlformats.org/drawingml/2006/main" xmlns:r="http://schemas.openxmlformats.org/officeDocument/2006/relationships" xmlns:p="http://schemas.openxmlformats.org/presentationml/2006/main">
+  <p:cSld>
+    <p:bg>
+      <p:bgPr>
+        <a:solidFill>
+          <a:schemeClr val="tx1"/>
+        </a:solidFill>
+        <a:effectLst/>
+      </p:bgPr>
+    </p:bg>
+    <p:spTree>
+      <p:nvGrpSpPr>
+        <p:cNvPr id="1" name=""/>
+        <p:cNvGrpSpPr/>
+        <p:nvPr/>
+      </p:nvGrpSpPr>
+      <p:grpSpPr>
+        <a:xfrm>
+          <a:off x="0" y="0"/>
+          <a:ext cx="0" cy="0"/>
+          <a:chOff x="0" y="0"/>
+          <a:chExt cx="0" cy="0"/>
+        </a:xfrm>
+      </p:grpSpPr>
+      <p:sp>
+        <p:nvSpPr>
+          <p:cNvPr id="2" name="Title 1"/>
+          <p:cNvSpPr>
+            <a:spLocks noGrp="1"/>
+          </p:cNvSpPr>
+          <p:nvPr>
+            <p:ph type="title"/>
+          </p:nvPr>
+        </p:nvSpPr>
+        <p:spPr/>
+        <p:txBody>
+          <a:bodyPr/>
+          <a:lstStyle/>
+          <a:p>
+            <a:r>
+              <a:rPr lang="da-DK" dirty="0" smtClean="0">
+                <a:solidFill>
+                  <a:schemeClr val="bg1"/>
+                </a:solidFill>
+              </a:rPr>
+              <a:t>Exercise:  Move Code</a:t>
+            </a:r>
+            <a:endParaRPr lang="da-DK" dirty="0">
+              <a:solidFill>
+                <a:schemeClr val="bg1"/>
+              </a:solidFill>
+            </a:endParaRPr>
+          </a:p>
+        </p:txBody>
+      </p:sp>
+      <p:sp>
+        <p:nvSpPr>
+          <p:cNvPr id="3" name="Content Placeholder 2"/>
+          <p:cNvSpPr>
+            <a:spLocks noGrp="1"/>
+          </p:cNvSpPr>
+          <p:nvPr>
+            <p:ph idx="1"/>
+          </p:nvPr>
+        </p:nvSpPr>
+        <p:spPr/>
+        <p:txBody>
+          <a:bodyPr>
+            <a:normAutofit/>
+          </a:bodyPr>
+          <a:lstStyle/>
+          <a:p>
+            <a:endParaRPr lang="da-DK" dirty="0" smtClean="0">
+              <a:solidFill>
+                <a:schemeClr val="bg1"/>
+              </a:solidFill>
+            </a:endParaRPr>
+          </a:p>
+          <a:p>
+            <a:r>
+              <a:rPr lang="da-DK" dirty="0" smtClean="0">
+                <a:solidFill>
+                  <a:schemeClr val="bg1"/>
+                </a:solidFill>
+              </a:rPr>
+              <a:t>Quick fix</a:t>
+            </a:r>
+          </a:p>
+          <a:p>
+            <a:pPr lvl="1"/>
+            <a:r>
+              <a:rPr lang="da-DK" b="1" dirty="0" smtClean="0">
+                <a:solidFill>
+                  <a:schemeClr val="accent6"/>
+                </a:solidFill>
+              </a:rPr>
+              <a:t>Alt + Enter</a:t>
+            </a:r>
+            <a:endParaRPr lang="da-DK" dirty="0" smtClean="0">
+              <a:solidFill>
+                <a:schemeClr val="bg1"/>
+              </a:solidFill>
+            </a:endParaRPr>
+          </a:p>
+          <a:p>
+            <a:endParaRPr lang="da-DK" dirty="0" smtClean="0">
+              <a:solidFill>
+                <a:schemeClr val="bg1"/>
+              </a:solidFill>
+            </a:endParaRPr>
+          </a:p>
+          <a:p>
+            <a:r>
+              <a:rPr lang="da-DK" dirty="0" smtClean="0">
+                <a:solidFill>
+                  <a:schemeClr val="bg1"/>
+                </a:solidFill>
+              </a:rPr>
+              <a:t>Generate code</a:t>
+            </a:r>
+          </a:p>
+          <a:p>
+            <a:pPr lvl="1"/>
+            <a:r>
+              <a:rPr lang="da-DK" b="1" dirty="0" smtClean="0">
+                <a:solidFill>
+                  <a:schemeClr val="accent6"/>
+                </a:solidFill>
+              </a:rPr>
+              <a:t>Alt + Insert</a:t>
+            </a:r>
+          </a:p>
+        </p:txBody>
+      </p:sp>
+    </p:spTree>
+  </p:cSld>
+  <p:clrMapOvr>
+    <a:masterClrMapping/>
+  </p:clrMapOvr>
+  <p:timing>
+    <p:tnLst>
+      <p:par>
+        <p:cTn id="1" dur="indefinite" restart="never" nodeType="tmRoot"/>
+      </p:par>
+    </p:tnLst>
+  </p:timing>
+</p:sld>
+</file>
+
+<file path=ppt/slides/slide31.xml><?xml version="1.0" encoding="utf-8"?>
+<p:sld xmlns:a="http://schemas.openxmlformats.org/drawingml/2006/main" xmlns:r="http://schemas.openxmlformats.org/officeDocument/2006/relationships" xmlns:p="http://schemas.openxmlformats.org/presentationml/2006/main">
+  <p:cSld>
+    <p:spTree>
+      <p:nvGrpSpPr>
+        <p:cNvPr id="1" name=""/>
+        <p:cNvGrpSpPr/>
+        <p:nvPr/>
+      </p:nvGrpSpPr>
+      <p:grpSpPr>
+        <a:xfrm>
+          <a:off x="0" y="0"/>
+          <a:ext cx="0" cy="0"/>
+          <a:chOff x="0" y="0"/>
+          <a:chExt cx="0" cy="0"/>
+        </a:xfrm>
+      </p:grpSpPr>
+      <p:sp>
+        <p:nvSpPr>
+          <p:cNvPr id="2" name="Title 1"/>
+          <p:cNvSpPr>
+            <a:spLocks noGrp="1"/>
+          </p:cNvSpPr>
+          <p:nvPr>
+            <p:ph type="title"/>
+          </p:nvPr>
+        </p:nvSpPr>
+        <p:spPr/>
+        <p:txBody>
+          <a:bodyPr>
+            <a:normAutofit/>
+          </a:bodyPr>
+          <a:lstStyle/>
+          <a:p>
+            <a:r>
+              <a:rPr lang="da-DK" dirty="0" smtClean="0"/>
+              <a:t>Inspect This!</a:t>
+            </a:r>
+            <a:endParaRPr lang="da-DK" dirty="0"/>
+          </a:p>
+        </p:txBody>
+      </p:sp>
+      <p:sp>
+        <p:nvSpPr>
+          <p:cNvPr id="3" name="Content Placeholder 2"/>
+          <p:cNvSpPr>
+            <a:spLocks noGrp="1"/>
+          </p:cNvSpPr>
+          <p:nvPr>
+            <p:ph idx="1"/>
+          </p:nvPr>
+        </p:nvSpPr>
+        <p:spPr/>
+        <p:txBody>
+          <a:bodyPr/>
+          <a:lstStyle/>
+          <a:p>
+            <a:r>
+              <a:rPr lang="da-DK" dirty="0" smtClean="0"/>
+              <a:t>Powerful analysis</a:t>
+            </a:r>
+          </a:p>
+          <a:p>
+            <a:pPr lvl="1"/>
+            <a:r>
+              <a:rPr lang="da-DK" dirty="0" smtClean="0"/>
+              <a:t>Values</a:t>
+            </a:r>
+          </a:p>
+          <a:p>
+            <a:pPr lvl="1"/>
+            <a:r>
+              <a:rPr lang="da-DK" dirty="0" smtClean="0"/>
+              <a:t>Methods</a:t>
+            </a:r>
+          </a:p>
+          <a:p>
+            <a:endParaRPr lang="da-DK" dirty="0" smtClean="0"/>
+          </a:p>
+          <a:p>
+            <a:pPr lvl="1"/>
+            <a:endParaRPr lang="da-DK" dirty="0"/>
+          </a:p>
+        </p:txBody>
+      </p:sp>
+    </p:spTree>
+  </p:cSld>
+  <p:clrMapOvr>
+    <a:masterClrMapping/>
+  </p:clrMapOvr>
+</p:sld>
+</file>
+
+<file path=ppt/slides/slide32.xml><?xml version="1.0" encoding="utf-8"?>
+<p:sld xmlns:a="http://schemas.openxmlformats.org/drawingml/2006/main" xmlns:r="http://schemas.openxmlformats.org/officeDocument/2006/relationships" xmlns:p="http://schemas.openxmlformats.org/presentationml/2006/main">
+  <p:cSld>
+    <p:bg>
+      <p:bgPr>
+        <a:solidFill>
+          <a:schemeClr val="tx1"/>
+        </a:solidFill>
+        <a:effectLst/>
+      </p:bgPr>
+    </p:bg>
+    <p:spTree>
+      <p:nvGrpSpPr>
+        <p:cNvPr id="1" name=""/>
+        <p:cNvGrpSpPr/>
+        <p:nvPr/>
+      </p:nvGrpSpPr>
+      <p:grpSpPr>
+        <a:xfrm>
+          <a:off x="0" y="0"/>
+          <a:ext cx="0" cy="0"/>
+          <a:chOff x="0" y="0"/>
+          <a:chExt cx="0" cy="0"/>
+        </a:xfrm>
+      </p:grpSpPr>
+      <p:sp>
+        <p:nvSpPr>
+          <p:cNvPr id="2" name="Title 1"/>
+          <p:cNvSpPr>
+            <a:spLocks noGrp="1"/>
+          </p:cNvSpPr>
+          <p:nvPr>
+            <p:ph type="title"/>
+          </p:nvPr>
+        </p:nvSpPr>
+        <p:spPr/>
+        <p:txBody>
+          <a:bodyPr/>
+          <a:lstStyle/>
+          <a:p>
+            <a:r>
+              <a:rPr lang="da-DK" dirty="0" smtClean="0">
+                <a:solidFill>
+                  <a:schemeClr val="bg1"/>
+                </a:solidFill>
+              </a:rPr>
+              <a:t>Exercise:  Inspect This!</a:t>
+            </a:r>
+            <a:endParaRPr lang="da-DK" dirty="0">
+              <a:solidFill>
+                <a:schemeClr val="bg1"/>
+              </a:solidFill>
+            </a:endParaRPr>
+          </a:p>
+        </p:txBody>
+      </p:sp>
+      <p:sp>
+        <p:nvSpPr>
+          <p:cNvPr id="3" name="Content Placeholder 2"/>
+          <p:cNvSpPr>
+            <a:spLocks noGrp="1"/>
+          </p:cNvSpPr>
+          <p:nvPr>
+            <p:ph idx="1"/>
+          </p:nvPr>
+        </p:nvSpPr>
+        <p:spPr/>
+        <p:txBody>
+          <a:bodyPr>
+            <a:normAutofit/>
+          </a:bodyPr>
+          <a:lstStyle/>
+          <a:p>
+            <a:endParaRPr lang="da-DK" dirty="0" smtClean="0">
+              <a:solidFill>
+                <a:schemeClr val="bg1"/>
+              </a:solidFill>
+            </a:endParaRPr>
+          </a:p>
+          <a:p>
+            <a:r>
+              <a:rPr lang="da-DK" dirty="0" smtClean="0">
+                <a:solidFill>
+                  <a:schemeClr val="bg1"/>
+                </a:solidFill>
+              </a:rPr>
+              <a:t>Quick fix</a:t>
+            </a:r>
+          </a:p>
+          <a:p>
+            <a:pPr lvl="1"/>
+            <a:r>
+              <a:rPr lang="da-DK" b="1" dirty="0" smtClean="0">
+                <a:solidFill>
+                  <a:schemeClr val="accent6"/>
+                </a:solidFill>
+              </a:rPr>
+              <a:t>Alt + Enter</a:t>
+            </a:r>
+            <a:endParaRPr lang="da-DK" dirty="0" smtClean="0">
+              <a:solidFill>
+                <a:schemeClr val="bg1"/>
+              </a:solidFill>
+            </a:endParaRPr>
+          </a:p>
+          <a:p>
+            <a:endParaRPr lang="da-DK" dirty="0" smtClean="0">
+              <a:solidFill>
+                <a:schemeClr val="bg1"/>
+              </a:solidFill>
+            </a:endParaRPr>
+          </a:p>
+          <a:p>
+            <a:r>
+              <a:rPr lang="da-DK" dirty="0" smtClean="0">
+                <a:solidFill>
+                  <a:schemeClr val="bg1"/>
+                </a:solidFill>
+              </a:rPr>
+              <a:t>Generate code</a:t>
+            </a:r>
+          </a:p>
+          <a:p>
+            <a:pPr lvl="1"/>
+            <a:r>
+              <a:rPr lang="da-DK" b="1" dirty="0" smtClean="0">
+                <a:solidFill>
+                  <a:schemeClr val="accent6"/>
+                </a:solidFill>
+              </a:rPr>
+              <a:t>Alt + Insert</a:t>
+            </a:r>
+          </a:p>
+        </p:txBody>
+      </p:sp>
+    </p:spTree>
   </p:cSld>
   <p:clrMapOvr>
     <a:masterClrMapping/>
@@ -7938,7 +8401,7 @@
     </p:spTree>
     <p:extLst>
       <p:ext uri="{BB962C8B-B14F-4D97-AF65-F5344CB8AC3E}">
-        <p14:creationId xmlns:p14="http://schemas.microsoft.com/office/powerpoint/2010/main" xmlns="" val="1649822022"/>
+        <p14:creationId xmlns="" xmlns:p14="http://schemas.microsoft.com/office/powerpoint/2010/main" val="1649822022"/>
       </p:ext>
     </p:extLst>
   </p:cSld>
@@ -7984,11 +8447,7 @@
           <a:p>
             <a:r>
               <a:rPr lang="da-DK" dirty="0" smtClean="0"/>
-              <a:t>Code </a:t>
-            </a:r>
-            <a:r>
-              <a:rPr lang="da-DK" dirty="0" smtClean="0"/>
-              <a:t>Analysis</a:t>
+              <a:t>Code Analysis</a:t>
             </a:r>
             <a:endParaRPr lang="da-DK" dirty="0"/>
           </a:p>
@@ -8423,15 +8882,7 @@
                   <a:schemeClr val="bg1"/>
                 </a:solidFill>
               </a:rPr>
-              <a:t>Exercise:  Code </a:t>
-            </a:r>
-            <a:r>
-              <a:rPr lang="da-DK" dirty="0" smtClean="0">
-                <a:solidFill>
-                  <a:schemeClr val="bg1"/>
-                </a:solidFill>
-              </a:rPr>
-              <a:t>Analysis</a:t>
+              <a:t>Exercise:  Code Analysis</a:t>
             </a:r>
             <a:endParaRPr lang="da-DK" dirty="0">
               <a:solidFill>
@@ -8473,11 +8924,6 @@
               </a:rPr>
               <a:t>CodeAnalysis.sln</a:t>
             </a:r>
-            <a:endParaRPr lang="da-DK" b="1" dirty="0" smtClean="0">
-              <a:solidFill>
-                <a:schemeClr val="bg1"/>
-              </a:solidFill>
-            </a:endParaRPr>
           </a:p>
           <a:p>
             <a:endParaRPr lang="da-DK" dirty="0" smtClean="0">

</xml_diff>

<commit_message>
Fixed wrong shortcut on import completion slide.
</commit_message>
<xml_diff>
--- a/Presentations/2 - Exercises - ReSharper Course.pptx
+++ b/Presentations/2 - Exercises - ReSharper Course.pptx
@@ -233,7 +233,7 @@
             <a:fld id="{25D31F56-D80D-4507-AC0F-AB5E545C4181}" type="datetimeFigureOut">
               <a:rPr lang="da-DK" smtClean="0"/>
               <a:pPr/>
-              <a:t>23-05-2012</a:t>
+              <a:t>24-05-2012</a:t>
             </a:fld>
             <a:endParaRPr lang="da-DK"/>
           </a:p>
@@ -766,7 +766,7 @@
             <a:fld id="{1D8BD707-D9CF-40AE-B4C6-C98DA3205C09}" type="datetimeFigureOut">
               <a:rPr lang="en-US" smtClean="0"/>
               <a:pPr/>
-              <a:t>5/23/2012</a:t>
+              <a:t>5/24/2012</a:t>
             </a:fld>
             <a:endParaRPr lang="en-US"/>
           </a:p>
@@ -933,7 +933,7 @@
             <a:fld id="{1D8BD707-D9CF-40AE-B4C6-C98DA3205C09}" type="datetimeFigureOut">
               <a:rPr lang="en-US" smtClean="0"/>
               <a:pPr/>
-              <a:t>5/23/2012</a:t>
+              <a:t>5/24/2012</a:t>
             </a:fld>
             <a:endParaRPr lang="en-US"/>
           </a:p>
@@ -1110,7 +1110,7 @@
             <a:fld id="{1D8BD707-D9CF-40AE-B4C6-C98DA3205C09}" type="datetimeFigureOut">
               <a:rPr lang="en-US" smtClean="0"/>
               <a:pPr/>
-              <a:t>5/23/2012</a:t>
+              <a:t>5/24/2012</a:t>
             </a:fld>
             <a:endParaRPr lang="en-US"/>
           </a:p>
@@ -1277,7 +1277,7 @@
             <a:fld id="{1D8BD707-D9CF-40AE-B4C6-C98DA3205C09}" type="datetimeFigureOut">
               <a:rPr lang="en-US" smtClean="0"/>
               <a:pPr/>
-              <a:t>5/23/2012</a:t>
+              <a:t>5/24/2012</a:t>
             </a:fld>
             <a:endParaRPr lang="en-US"/>
           </a:p>
@@ -1520,7 +1520,7 @@
             <a:fld id="{1D8BD707-D9CF-40AE-B4C6-C98DA3205C09}" type="datetimeFigureOut">
               <a:rPr lang="en-US" smtClean="0"/>
               <a:pPr/>
-              <a:t>5/23/2012</a:t>
+              <a:t>5/24/2012</a:t>
             </a:fld>
             <a:endParaRPr lang="en-US"/>
           </a:p>
@@ -1805,7 +1805,7 @@
             <a:fld id="{1D8BD707-D9CF-40AE-B4C6-C98DA3205C09}" type="datetimeFigureOut">
               <a:rPr lang="en-US" smtClean="0"/>
               <a:pPr/>
-              <a:t>5/23/2012</a:t>
+              <a:t>5/24/2012</a:t>
             </a:fld>
             <a:endParaRPr lang="en-US"/>
           </a:p>
@@ -2224,7 +2224,7 @@
             <a:fld id="{1D8BD707-D9CF-40AE-B4C6-C98DA3205C09}" type="datetimeFigureOut">
               <a:rPr lang="en-US" smtClean="0"/>
               <a:pPr/>
-              <a:t>5/23/2012</a:t>
+              <a:t>5/24/2012</a:t>
             </a:fld>
             <a:endParaRPr lang="en-US"/>
           </a:p>
@@ -2339,7 +2339,7 @@
             <a:fld id="{1D8BD707-D9CF-40AE-B4C6-C98DA3205C09}" type="datetimeFigureOut">
               <a:rPr lang="en-US" smtClean="0"/>
               <a:pPr/>
-              <a:t>5/23/2012</a:t>
+              <a:t>5/24/2012</a:t>
             </a:fld>
             <a:endParaRPr lang="en-US"/>
           </a:p>
@@ -2431,7 +2431,7 @@
             <a:fld id="{1D8BD707-D9CF-40AE-B4C6-C98DA3205C09}" type="datetimeFigureOut">
               <a:rPr lang="en-US" smtClean="0"/>
               <a:pPr/>
-              <a:t>5/23/2012</a:t>
+              <a:t>5/24/2012</a:t>
             </a:fld>
             <a:endParaRPr lang="en-US"/>
           </a:p>
@@ -2705,7 +2705,7 @@
             <a:fld id="{1D8BD707-D9CF-40AE-B4C6-C98DA3205C09}" type="datetimeFigureOut">
               <a:rPr lang="en-US" smtClean="0"/>
               <a:pPr/>
-              <a:t>5/23/2012</a:t>
+              <a:t>5/24/2012</a:t>
             </a:fld>
             <a:endParaRPr lang="en-US"/>
           </a:p>
@@ -2955,7 +2955,7 @@
             <a:fld id="{1D8BD707-D9CF-40AE-B4C6-C98DA3205C09}" type="datetimeFigureOut">
               <a:rPr lang="en-US" smtClean="0"/>
               <a:pPr/>
-              <a:t>5/23/2012</a:t>
+              <a:t>5/24/2012</a:t>
             </a:fld>
             <a:endParaRPr lang="en-US"/>
           </a:p>
@@ -3165,7 +3165,7 @@
             <a:fld id="{1D8BD707-D9CF-40AE-B4C6-C98DA3205C09}" type="datetimeFigureOut">
               <a:rPr lang="en-US" smtClean="0"/>
               <a:pPr/>
-              <a:t>5/23/2012</a:t>
+              <a:t>5/24/2012</a:t>
             </a:fld>
             <a:endParaRPr lang="en-US"/>
           </a:p>
@@ -3619,6 +3619,13 @@
   <p:clrMapOvr>
     <a:masterClrMapping/>
   </p:clrMapOvr>
+  <p:timing>
+    <p:tnLst>
+      <p:par>
+        <p:cTn id="1" dur="indefinite" restart="never" nodeType="tmRoot"/>
+      </p:par>
+    </p:tnLst>
+  </p:timing>
 </p:sld>
 </file>
 
@@ -5545,6 +5552,13 @@
   <p:clrMapOvr>
     <a:masterClrMapping/>
   </p:clrMapOvr>
+  <p:timing>
+    <p:tnLst>
+      <p:par>
+        <p:cTn id="1" dur="indefinite" restart="never" nodeType="tmRoot"/>
+      </p:par>
+    </p:tnLst>
+  </p:timing>
 </p:sld>
 </file>
 
@@ -6527,7 +6541,31 @@
                   <a:schemeClr val="accent6"/>
                 </a:solidFill>
               </a:rPr>
-              <a:t>Alt + Enter</a:t>
+              <a:t>Alt + </a:t>
+            </a:r>
+            <a:r>
+              <a:rPr lang="da-DK" b="1" dirty="0" err="1" smtClean="0">
+                <a:solidFill>
+                  <a:schemeClr val="accent6"/>
+                </a:solidFill>
+              </a:rPr>
+              <a:t>Shift</a:t>
+            </a:r>
+            <a:r>
+              <a:rPr lang="da-DK" b="1" dirty="0" smtClean="0">
+                <a:solidFill>
+                  <a:schemeClr val="accent6"/>
+                </a:solidFill>
+              </a:rPr>
+              <a:t> </a:t>
+            </a:r>
+            <a:r>
+              <a:rPr lang="da-DK" b="1" smtClean="0">
+                <a:solidFill>
+                  <a:schemeClr val="accent6"/>
+                </a:solidFill>
+              </a:rPr>
+              <a:t>+ Space</a:t>
             </a:r>
             <a:endParaRPr lang="da-DK" dirty="0" smtClean="0">
               <a:solidFill>
@@ -8931,7 +8969,7 @@
         <p:spPr/>
         <p:txBody>
           <a:bodyPr>
-            <a:normAutofit/>
+            <a:normAutofit fontScale="92500" lnSpcReduction="20000"/>
           </a:bodyPr>
           <a:lstStyle/>
           <a:p>
@@ -8953,6 +8991,45 @@
                 </a:solidFill>
               </a:rPr>
               <a:t>Ctrl + E, Ctrl + H</a:t>
+            </a:r>
+          </a:p>
+          <a:p>
+            <a:r>
+              <a:rPr lang="da-DK" dirty="0" smtClean="0">
+                <a:solidFill>
+                  <a:schemeClr val="bg1"/>
+                </a:solidFill>
+              </a:rPr>
+              <a:t>Go to declaration</a:t>
+            </a:r>
+          </a:p>
+          <a:p>
+            <a:pPr lvl="1"/>
+            <a:r>
+              <a:rPr lang="da-DK" b="1" dirty="0" smtClean="0">
+                <a:solidFill>
+                  <a:schemeClr val="accent6"/>
+                </a:solidFill>
+              </a:rPr>
+              <a:t>F12</a:t>
+            </a:r>
+          </a:p>
+          <a:p>
+            <a:r>
+              <a:rPr lang="da-DK" dirty="0" smtClean="0">
+                <a:solidFill>
+                  <a:schemeClr val="bg1"/>
+                </a:solidFill>
+              </a:rPr>
+              <a:t>Go to </a:t>
+            </a:r>
+            <a:r>
+              <a:rPr lang="da-DK" dirty="0" err="1" smtClean="0">
+                <a:solidFill>
+                  <a:schemeClr val="bg1"/>
+                </a:solidFill>
+              </a:rPr>
+              <a:t>implementation</a:t>
             </a:r>
             <a:endParaRPr lang="da-DK" dirty="0" smtClean="0">
               <a:solidFill>
@@ -8961,25 +9038,52 @@
             </a:endParaRPr>
           </a:p>
           <a:p>
-            <a:r>
-              <a:rPr lang="da-DK" dirty="0" smtClean="0">
-                <a:solidFill>
-                  <a:schemeClr val="bg1"/>
+            <a:pPr lvl="1"/>
+            <a:r>
+              <a:rPr lang="da-DK" b="1" dirty="0" smtClean="0">
+                <a:solidFill>
+                  <a:schemeClr val="accent6"/>
                 </a:solidFill>
               </a:rPr>
-              <a:t>Go to declaration</a:t>
-            </a:r>
-          </a:p>
-          <a:p>
-            <a:pPr lvl="1"/>
+              <a:t>Alt + </a:t>
+            </a:r>
+            <a:r>
+              <a:rPr lang="da-DK" b="1" dirty="0" err="1" smtClean="0">
+                <a:solidFill>
+                  <a:schemeClr val="accent6"/>
+                </a:solidFill>
+              </a:rPr>
+              <a:t>Ctrl</a:t>
+            </a:r>
             <a:r>
               <a:rPr lang="da-DK" b="1" dirty="0" smtClean="0">
                 <a:solidFill>
                   <a:schemeClr val="accent6"/>
                 </a:solidFill>
               </a:rPr>
-              <a:t>F12</a:t>
-            </a:r>
+              <a:t> + </a:t>
+            </a:r>
+            <a:r>
+              <a:rPr lang="da-DK" b="1" dirty="0" err="1" smtClean="0">
+                <a:solidFill>
+                  <a:schemeClr val="accent6"/>
+                </a:solidFill>
+              </a:rPr>
+              <a:t>Shift</a:t>
+            </a:r>
+            <a:r>
+              <a:rPr lang="da-DK" b="1" dirty="0" smtClean="0">
+                <a:solidFill>
+                  <a:schemeClr val="accent6"/>
+                </a:solidFill>
+              </a:rPr>
+              <a:t> + B</a:t>
+            </a:r>
+            <a:endParaRPr lang="da-DK" dirty="0" smtClean="0">
+              <a:solidFill>
+                <a:schemeClr val="bg1"/>
+              </a:solidFill>
+            </a:endParaRPr>
           </a:p>
           <a:p>
             <a:r>
@@ -10876,7 +10980,15 @@
                   <a:schemeClr val="accent6"/>
                 </a:solidFill>
               </a:rPr>
-              <a:t>Alt + &lt;</a:t>
+              <a:t>Alt </a:t>
+            </a:r>
+            <a:r>
+              <a:rPr lang="da-DK" b="1" smtClean="0">
+                <a:solidFill>
+                  <a:schemeClr val="accent6"/>
+                </a:solidFill>
+              </a:rPr>
+              <a:t>+ &lt;</a:t>
             </a:r>
             <a:endParaRPr lang="da-DK" b="1" dirty="0">
               <a:solidFill>
@@ -10891,6 +11003,13 @@
   <p:clrMapOvr>
     <a:masterClrMapping/>
   </p:clrMapOvr>
+  <p:timing>
+    <p:tnLst>
+      <p:par>
+        <p:cTn id="1" dur="indefinite" restart="never" nodeType="tmRoot"/>
+      </p:par>
+    </p:tnLst>
+  </p:timing>
 </p:sld>
 </file>
 
@@ -11029,6 +11148,13 @@
   <p:clrMapOvr>
     <a:masterClrMapping/>
   </p:clrMapOvr>
+  <p:timing>
+    <p:tnLst>
+      <p:par>
+        <p:cTn id="1" dur="indefinite" restart="never" nodeType="tmRoot"/>
+      </p:par>
+    </p:tnLst>
+  </p:timing>
 </p:sld>
 </file>
 

</xml_diff>